<commit_message>
Add figures for manuscript
</commit_message>
<xml_diff>
--- a/figures/figures.pptx
+++ b/figures/figures.pptx
@@ -5,11 +5,13 @@
     <p:sldMasterId id="2147483648" r:id="rId1"/>
   </p:sldMasterIdLst>
   <p:notesMasterIdLst>
-    <p:notesMasterId r:id="rId4"/>
+    <p:notesMasterId r:id="rId6"/>
   </p:notesMasterIdLst>
   <p:sldIdLst>
     <p:sldId id="256" r:id="rId2"/>
     <p:sldId id="267" r:id="rId3"/>
+    <p:sldId id="268" r:id="rId4"/>
+    <p:sldId id="269" r:id="rId5"/>
   </p:sldIdLst>
   <p:sldSz cx="12192000" cy="6858000"/>
   <p:notesSz cx="6858000" cy="9144000"/>
@@ -197,7 +199,7 @@
           </a:lstStyle>
           <a:p>
             <a:fld id="{B35BE548-DE05-8149-9395-93E03CC73C13}" type="datetimeFigureOut">
-              <a:t>02.03.23</a:t>
+              <a:t>17.03.23</a:t>
             </a:fld>
             <a:endParaRPr lang="de-DE"/>
           </a:p>
@@ -547,6 +549,174 @@
 </p:notes>
 </file>
 
+<file path=ppt/notesSlides/notesSlide2.xml><?xml version="1.0" encoding="utf-8"?>
+<p:notes xmlns:a="http://schemas.openxmlformats.org/drawingml/2006/main" xmlns:r="http://schemas.openxmlformats.org/officeDocument/2006/relationships" xmlns:p="http://schemas.openxmlformats.org/presentationml/2006/main">
+  <p:cSld>
+    <p:spTree>
+      <p:nvGrpSpPr>
+        <p:cNvPr id="1" name=""/>
+        <p:cNvGrpSpPr/>
+        <p:nvPr/>
+      </p:nvGrpSpPr>
+      <p:grpSpPr>
+        <a:xfrm>
+          <a:off x="0" y="0"/>
+          <a:ext cx="0" cy="0"/>
+          <a:chOff x="0" y="0"/>
+          <a:chExt cx="0" cy="0"/>
+        </a:xfrm>
+      </p:grpSpPr>
+      <p:sp>
+        <p:nvSpPr>
+          <p:cNvPr id="2" name="Folienbildplatzhalter 1"/>
+          <p:cNvSpPr>
+            <a:spLocks noGrp="1" noRot="1" noChangeAspect="1"/>
+          </p:cNvSpPr>
+          <p:nvPr>
+            <p:ph type="sldImg"/>
+          </p:nvPr>
+        </p:nvSpPr>
+        <p:spPr/>
+      </p:sp>
+      <p:sp>
+        <p:nvSpPr>
+          <p:cNvPr id="3" name="Notizenplatzhalter 2"/>
+          <p:cNvSpPr>
+            <a:spLocks noGrp="1"/>
+          </p:cNvSpPr>
+          <p:nvPr>
+            <p:ph type="body" idx="1"/>
+          </p:nvPr>
+        </p:nvSpPr>
+        <p:spPr/>
+        <p:txBody>
+          <a:bodyPr/>
+          <a:lstStyle/>
+          <a:p>
+            <a:endParaRPr lang="de-DE"/>
+          </a:p>
+        </p:txBody>
+      </p:sp>
+      <p:sp>
+        <p:nvSpPr>
+          <p:cNvPr id="4" name="Foliennummernplatzhalter 3"/>
+          <p:cNvSpPr>
+            <a:spLocks noGrp="1"/>
+          </p:cNvSpPr>
+          <p:nvPr>
+            <p:ph type="sldNum" sz="quarter" idx="5"/>
+          </p:nvPr>
+        </p:nvSpPr>
+        <p:spPr/>
+        <p:txBody>
+          <a:bodyPr/>
+          <a:lstStyle/>
+          <a:p>
+            <a:fld id="{8676B46A-5025-BA4D-A49D-5D1F5DB78F39}" type="slidenum">
+              <a:rPr lang="de-DE"/>
+              <a:t>3</a:t>
+            </a:fld>
+            <a:endParaRPr lang="de-DE"/>
+          </a:p>
+        </p:txBody>
+      </p:sp>
+    </p:spTree>
+    <p:extLst>
+      <p:ext uri="{BB962C8B-B14F-4D97-AF65-F5344CB8AC3E}">
+        <p14:creationId xmlns:p14="http://schemas.microsoft.com/office/powerpoint/2010/main" val="1135500833"/>
+      </p:ext>
+    </p:extLst>
+  </p:cSld>
+  <p:clrMapOvr>
+    <a:masterClrMapping/>
+  </p:clrMapOvr>
+</p:notes>
+</file>
+
+<file path=ppt/notesSlides/notesSlide3.xml><?xml version="1.0" encoding="utf-8"?>
+<p:notes xmlns:a="http://schemas.openxmlformats.org/drawingml/2006/main" xmlns:r="http://schemas.openxmlformats.org/officeDocument/2006/relationships" xmlns:p="http://schemas.openxmlformats.org/presentationml/2006/main">
+  <p:cSld>
+    <p:spTree>
+      <p:nvGrpSpPr>
+        <p:cNvPr id="1" name=""/>
+        <p:cNvGrpSpPr/>
+        <p:nvPr/>
+      </p:nvGrpSpPr>
+      <p:grpSpPr>
+        <a:xfrm>
+          <a:off x="0" y="0"/>
+          <a:ext cx="0" cy="0"/>
+          <a:chOff x="0" y="0"/>
+          <a:chExt cx="0" cy="0"/>
+        </a:xfrm>
+      </p:grpSpPr>
+      <p:sp>
+        <p:nvSpPr>
+          <p:cNvPr id="2" name="Folienbildplatzhalter 1"/>
+          <p:cNvSpPr>
+            <a:spLocks noGrp="1" noRot="1" noChangeAspect="1"/>
+          </p:cNvSpPr>
+          <p:nvPr>
+            <p:ph type="sldImg"/>
+          </p:nvPr>
+        </p:nvSpPr>
+        <p:spPr/>
+      </p:sp>
+      <p:sp>
+        <p:nvSpPr>
+          <p:cNvPr id="3" name="Notizenplatzhalter 2"/>
+          <p:cNvSpPr>
+            <a:spLocks noGrp="1"/>
+          </p:cNvSpPr>
+          <p:nvPr>
+            <p:ph type="body" idx="1"/>
+          </p:nvPr>
+        </p:nvSpPr>
+        <p:spPr/>
+        <p:txBody>
+          <a:bodyPr/>
+          <a:lstStyle/>
+          <a:p>
+            <a:endParaRPr lang="de-DE"/>
+          </a:p>
+        </p:txBody>
+      </p:sp>
+      <p:sp>
+        <p:nvSpPr>
+          <p:cNvPr id="4" name="Foliennummernplatzhalter 3"/>
+          <p:cNvSpPr>
+            <a:spLocks noGrp="1"/>
+          </p:cNvSpPr>
+          <p:nvPr>
+            <p:ph type="sldNum" sz="quarter" idx="5"/>
+          </p:nvPr>
+        </p:nvSpPr>
+        <p:spPr/>
+        <p:txBody>
+          <a:bodyPr/>
+          <a:lstStyle/>
+          <a:p>
+            <a:fld id="{8676B46A-5025-BA4D-A49D-5D1F5DB78F39}" type="slidenum">
+              <a:rPr lang="de-DE"/>
+              <a:t>4</a:t>
+            </a:fld>
+            <a:endParaRPr lang="de-DE"/>
+          </a:p>
+        </p:txBody>
+      </p:sp>
+    </p:spTree>
+    <p:extLst>
+      <p:ext uri="{BB962C8B-B14F-4D97-AF65-F5344CB8AC3E}">
+        <p14:creationId xmlns:p14="http://schemas.microsoft.com/office/powerpoint/2010/main" val="4255193168"/>
+      </p:ext>
+    </p:extLst>
+  </p:cSld>
+  <p:clrMapOvr>
+    <a:masterClrMapping/>
+  </p:clrMapOvr>
+</p:notes>
+</file>
+
 <file path=ppt/slideLayouts/slideLayout1.xml><?xml version="1.0" encoding="utf-8"?>
 <p:sldLayout xmlns:a="http://schemas.openxmlformats.org/drawingml/2006/main" xmlns:r="http://schemas.openxmlformats.org/officeDocument/2006/relationships" xmlns:p="http://schemas.openxmlformats.org/presentationml/2006/main" type="title" preserve="1">
   <p:cSld name="Titelfolie">
@@ -693,7 +863,7 @@
           <a:lstStyle/>
           <a:p>
             <a:fld id="{F7A3446A-3617-0E4A-A439-6DD0C73FFDE1}" type="datetimeFigureOut">
-              <a:t>02.03.23</a:t>
+              <a:t>17.03.23</a:t>
             </a:fld>
             <a:endParaRPr lang="de-DE"/>
           </a:p>
@@ -889,7 +1059,7 @@
           <a:lstStyle/>
           <a:p>
             <a:fld id="{F7A3446A-3617-0E4A-A439-6DD0C73FFDE1}" type="datetimeFigureOut">
-              <a:t>02.03.23</a:t>
+              <a:t>17.03.23</a:t>
             </a:fld>
             <a:endParaRPr lang="de-DE"/>
           </a:p>
@@ -1095,7 +1265,7 @@
           <a:lstStyle/>
           <a:p>
             <a:fld id="{F7A3446A-3617-0E4A-A439-6DD0C73FFDE1}" type="datetimeFigureOut">
-              <a:t>02.03.23</a:t>
+              <a:t>17.03.23</a:t>
             </a:fld>
             <a:endParaRPr lang="de-DE"/>
           </a:p>
@@ -1291,7 +1461,7 @@
           <a:lstStyle/>
           <a:p>
             <a:fld id="{F7A3446A-3617-0E4A-A439-6DD0C73FFDE1}" type="datetimeFigureOut">
-              <a:t>02.03.23</a:t>
+              <a:t>17.03.23</a:t>
             </a:fld>
             <a:endParaRPr lang="de-DE"/>
           </a:p>
@@ -1564,7 +1734,7 @@
           <a:lstStyle/>
           <a:p>
             <a:fld id="{F7A3446A-3617-0E4A-A439-6DD0C73FFDE1}" type="datetimeFigureOut">
-              <a:t>02.03.23</a:t>
+              <a:t>17.03.23</a:t>
             </a:fld>
             <a:endParaRPr lang="de-DE"/>
           </a:p>
@@ -1827,7 +1997,7 @@
           <a:lstStyle/>
           <a:p>
             <a:fld id="{F7A3446A-3617-0E4A-A439-6DD0C73FFDE1}" type="datetimeFigureOut">
-              <a:t>02.03.23</a:t>
+              <a:t>17.03.23</a:t>
             </a:fld>
             <a:endParaRPr lang="de-DE"/>
           </a:p>
@@ -2237,7 +2407,7 @@
           <a:lstStyle/>
           <a:p>
             <a:fld id="{F7A3446A-3617-0E4A-A439-6DD0C73FFDE1}" type="datetimeFigureOut">
-              <a:t>02.03.23</a:t>
+              <a:t>17.03.23</a:t>
             </a:fld>
             <a:endParaRPr lang="de-DE"/>
           </a:p>
@@ -2376,7 +2546,7 @@
           <a:lstStyle/>
           <a:p>
             <a:fld id="{F7A3446A-3617-0E4A-A439-6DD0C73FFDE1}" type="datetimeFigureOut">
-              <a:t>02.03.23</a:t>
+              <a:t>17.03.23</a:t>
             </a:fld>
             <a:endParaRPr lang="de-DE"/>
           </a:p>
@@ -2487,7 +2657,7 @@
           <a:lstStyle/>
           <a:p>
             <a:fld id="{F7A3446A-3617-0E4A-A439-6DD0C73FFDE1}" type="datetimeFigureOut">
-              <a:t>02.03.23</a:t>
+              <a:t>17.03.23</a:t>
             </a:fld>
             <a:endParaRPr lang="de-DE"/>
           </a:p>
@@ -2796,7 +2966,7 @@
           <a:lstStyle/>
           <a:p>
             <a:fld id="{F7A3446A-3617-0E4A-A439-6DD0C73FFDE1}" type="datetimeFigureOut">
-              <a:t>02.03.23</a:t>
+              <a:t>17.03.23</a:t>
             </a:fld>
             <a:endParaRPr lang="de-DE"/>
           </a:p>
@@ -3082,7 +3252,7 @@
           <a:lstStyle/>
           <a:p>
             <a:fld id="{F7A3446A-3617-0E4A-A439-6DD0C73FFDE1}" type="datetimeFigureOut">
-              <a:t>02.03.23</a:t>
+              <a:t>17.03.23</a:t>
             </a:fld>
             <a:endParaRPr lang="de-DE"/>
           </a:p>
@@ -3321,7 +3491,7 @@
           </a:lstStyle>
           <a:p>
             <a:fld id="{F7A3446A-3617-0E4A-A439-6DD0C73FFDE1}" type="datetimeFigureOut">
-              <a:t>02.03.23</a:t>
+              <a:t>17.03.23</a:t>
             </a:fld>
             <a:endParaRPr lang="de-DE"/>
           </a:p>
@@ -5438,7 +5608,7 @@
         </p:nvCxnSpPr>
         <p:spPr>
           <a:xfrm>
-            <a:off x="2499185" y="2242630"/>
+            <a:off x="2453465" y="2242630"/>
             <a:ext cx="0" cy="2046119"/>
           </a:xfrm>
           <a:prstGeom prst="straightConnector1">
@@ -6717,7 +6887,7 @@
               </a:pPr>
               <a:r>
                 <a:rPr lang="de-DE" sz="1400"/>
-                <a:t>max Pooling 2x2</a:t>
+                <a:t>max pooling 2x2</a:t>
               </a:r>
             </a:p>
             <a:p>
@@ -6728,7 +6898,7 @@
               </a:pPr>
               <a:r>
                 <a:rPr lang="de-DE" sz="1400"/>
-                <a:t>up-sampling 2x2</a:t>
+                <a:t>upsampling 2x2</a:t>
               </a:r>
             </a:p>
             <a:p>
@@ -6893,10 +7063,10 @@
         </p:nvGrpSpPr>
         <p:grpSpPr>
           <a:xfrm>
-            <a:off x="2977603" y="5298146"/>
-            <a:ext cx="2427229" cy="927273"/>
-            <a:chOff x="2986070" y="4757062"/>
-            <a:chExt cx="2427229" cy="927273"/>
+            <a:off x="2951517" y="5246781"/>
+            <a:ext cx="2453315" cy="1017889"/>
+            <a:chOff x="2959984" y="4705697"/>
+            <a:chExt cx="2453315" cy="1017889"/>
           </a:xfrm>
         </p:grpSpPr>
         <p:sp>
@@ -6913,8 +7083,8 @@
           </p:nvSpPr>
           <p:spPr>
             <a:xfrm>
-              <a:off x="2986070" y="4771878"/>
-              <a:ext cx="2427229" cy="892552"/>
+              <a:off x="2959984" y="4771878"/>
+              <a:ext cx="2453315" cy="892552"/>
             </a:xfrm>
             <a:prstGeom prst="rect">
               <a:avLst/>
@@ -6937,7 +7107,7 @@
               </a:pPr>
               <a:r>
                 <a:rPr lang="de-DE" sz="1400"/>
-                <a:t>CNN filters = [64,128,256,512]</a:t>
+                <a:t> CNN filters = [64,128,256,512]</a:t>
               </a:r>
             </a:p>
             <a:p>
@@ -6948,7 +7118,7 @@
               </a:pPr>
               <a:r>
                 <a:rPr lang="de-DE" sz="1400"/>
-                <a:t>CNN kernel size = 5x5</a:t>
+                <a:t> CNN kernel size = 5x5</a:t>
               </a:r>
             </a:p>
             <a:p>
@@ -6959,7 +7129,7 @@
               </a:pPr>
               <a:r>
                 <a:rPr lang="de-DE" sz="1400"/>
-                <a:t>21.6 Mio trainable parameters</a:t>
+                <a:t> 21.6 Mio trainable parameters</a:t>
               </a:r>
             </a:p>
           </p:txBody>
@@ -6978,8 +7148,8 @@
           </p:nvSpPr>
           <p:spPr>
             <a:xfrm>
-              <a:off x="3023599" y="4757062"/>
-              <a:ext cx="2343125" cy="927273"/>
+              <a:off x="3023599" y="4705697"/>
+              <a:ext cx="2343125" cy="1017889"/>
             </a:xfrm>
             <a:prstGeom prst="rect">
               <a:avLst/>
@@ -7017,10 +7187,3456 @@
           </p:txBody>
         </p:sp>
       </p:grpSp>
+      <mc:AlternateContent xmlns:mc="http://schemas.openxmlformats.org/markup-compatibility/2006" xmlns:a14="http://schemas.microsoft.com/office/drawing/2010/main">
+        <mc:Choice Requires="a14">
+          <p:sp>
+            <p:nvSpPr>
+              <p:cNvPr id="4" name="Textfeld 3">
+                <a:extLst>
+                  <a:ext uri="{FF2B5EF4-FFF2-40B4-BE49-F238E27FC236}">
+                    <a16:creationId xmlns:a16="http://schemas.microsoft.com/office/drawing/2014/main" id="{636E2BB5-56A7-4B28-DD90-B59A96D91442}"/>
+                  </a:ext>
+                </a:extLst>
+              </p:cNvPr>
+              <p:cNvSpPr txBox="1"/>
+              <p:nvPr/>
+            </p:nvSpPr>
+            <p:spPr>
+              <a:xfrm>
+                <a:off x="503003" y="1244217"/>
+                <a:ext cx="702372" cy="184666"/>
+              </a:xfrm>
+              <a:prstGeom prst="rect">
+                <a:avLst/>
+              </a:prstGeom>
+              <a:noFill/>
+            </p:spPr>
+            <p:txBody>
+              <a:bodyPr wrap="none" lIns="0" tIns="0" rIns="0" bIns="0" rtlCol="0">
+                <a:spAutoFit/>
+              </a:bodyPr>
+              <a:lstStyle/>
+              <a:p>
+                <a:pPr/>
+                <a14:m>
+                  <m:oMathPara xmlns:m="http://schemas.openxmlformats.org/officeDocument/2006/math">
+                    <m:oMathParaPr>
+                      <m:jc m:val="centerGroup"/>
+                    </m:oMathParaPr>
+                    <m:oMath xmlns:m="http://schemas.openxmlformats.org/officeDocument/2006/math">
+                      <m:sSub>
+                        <m:sSubPr>
+                          <m:ctrlPr>
+                            <a:rPr lang="de-DE" sz="1200" i="1">
+                              <a:latin typeface="Cambria Math" panose="02040503050406030204" pitchFamily="18" charset="0"/>
+                            </a:rPr>
+                          </m:ctrlPr>
+                        </m:sSubPr>
+                        <m:e>
+                          <m:r>
+                            <a:rPr lang="de-DE" sz="1200" b="0" i="1">
+                              <a:latin typeface="Cambria Math" panose="02040503050406030204" pitchFamily="18" charset="0"/>
+                            </a:rPr>
+                            <m:t>𝑁</m:t>
+                          </m:r>
+                        </m:e>
+                        <m:sub>
+                          <m:r>
+                            <a:rPr lang="de-DE" sz="1200" b="0" i="1">
+                              <a:latin typeface="Cambria Math" panose="02040503050406030204" pitchFamily="18" charset="0"/>
+                            </a:rPr>
+                            <m:t>𝑙𝑎𝑡</m:t>
+                          </m:r>
+                        </m:sub>
+                      </m:sSub>
+                      <m:r>
+                        <a:rPr lang="de-DE" sz="1200" i="1">
+                          <a:latin typeface="Cambria Math" panose="02040503050406030204" pitchFamily="18" charset="0"/>
+                          <a:ea typeface="Cambria Math" panose="02040503050406030204" pitchFamily="18" charset="0"/>
+                        </a:rPr>
+                        <m:t>×</m:t>
+                      </m:r>
+                      <m:sSub>
+                        <m:sSubPr>
+                          <m:ctrlPr>
+                            <a:rPr lang="de-DE" sz="1200" i="1">
+                              <a:latin typeface="Cambria Math" panose="02040503050406030204" pitchFamily="18" charset="0"/>
+                              <a:ea typeface="Cambria Math" panose="02040503050406030204" pitchFamily="18" charset="0"/>
+                            </a:rPr>
+                          </m:ctrlPr>
+                        </m:sSubPr>
+                        <m:e>
+                          <m:r>
+                            <a:rPr lang="de-DE" sz="1200" b="0" i="1">
+                              <a:latin typeface="Cambria Math" panose="02040503050406030204" pitchFamily="18" charset="0"/>
+                              <a:ea typeface="Cambria Math" panose="02040503050406030204" pitchFamily="18" charset="0"/>
+                            </a:rPr>
+                            <m:t>𝑁</m:t>
+                          </m:r>
+                        </m:e>
+                        <m:sub>
+                          <m:r>
+                            <a:rPr lang="de-DE" sz="1200" b="0" i="1">
+                              <a:latin typeface="Cambria Math" panose="02040503050406030204" pitchFamily="18" charset="0"/>
+                              <a:ea typeface="Cambria Math" panose="02040503050406030204" pitchFamily="18" charset="0"/>
+                            </a:rPr>
+                            <m:t>𝑙𝑜𝑛</m:t>
+                          </m:r>
+                        </m:sub>
+                      </m:sSub>
+                    </m:oMath>
+                  </m:oMathPara>
+                </a14:m>
+                <a:endParaRPr lang="de-DE" sz="1200"/>
+              </a:p>
+            </p:txBody>
+          </p:sp>
+        </mc:Choice>
+        <mc:Fallback xmlns="">
+          <p:sp>
+            <p:nvSpPr>
+              <p:cNvPr id="4" name="Textfeld 3">
+                <a:extLst>
+                  <a:ext uri="{FF2B5EF4-FFF2-40B4-BE49-F238E27FC236}">
+                    <a16:creationId xmlns:a16="http://schemas.microsoft.com/office/drawing/2014/main" id="{636E2BB5-56A7-4B28-DD90-B59A96D91442}"/>
+                  </a:ext>
+                </a:extLst>
+              </p:cNvPr>
+              <p:cNvSpPr txBox="1">
+                <a:spLocks noRot="1" noChangeAspect="1" noMove="1" noResize="1" noEditPoints="1" noAdjustHandles="1" noChangeArrowheads="1" noChangeShapeType="1" noTextEdit="1"/>
+              </p:cNvSpPr>
+              <p:nvPr/>
+            </p:nvSpPr>
+            <p:spPr>
+              <a:xfrm>
+                <a:off x="503003" y="1244217"/>
+                <a:ext cx="702372" cy="184666"/>
+              </a:xfrm>
+              <a:prstGeom prst="rect">
+                <a:avLst/>
+              </a:prstGeom>
+              <a:blipFill>
+                <a:blip r:embed="rId5"/>
+                <a:stretch>
+                  <a:fillRect l="-5263" b="-12500"/>
+                </a:stretch>
+              </a:blipFill>
+            </p:spPr>
+            <p:txBody>
+              <a:bodyPr/>
+              <a:lstStyle/>
+              <a:p>
+                <a:r>
+                  <a:rPr lang="de-DE">
+                    <a:noFill/>
+                  </a:rPr>
+                  <a:t> </a:t>
+                </a:r>
+              </a:p>
+            </p:txBody>
+          </p:sp>
+        </mc:Fallback>
+      </mc:AlternateContent>
+      <mc:AlternateContent xmlns:mc="http://schemas.openxmlformats.org/markup-compatibility/2006" xmlns:a14="http://schemas.microsoft.com/office/drawing/2010/main">
+        <mc:Choice Requires="a14">
+          <p:sp>
+            <p:nvSpPr>
+              <p:cNvPr id="5" name="Textfeld 4">
+                <a:extLst>
+                  <a:ext uri="{FF2B5EF4-FFF2-40B4-BE49-F238E27FC236}">
+                    <a16:creationId xmlns:a16="http://schemas.microsoft.com/office/drawing/2014/main" id="{78429FA1-5B62-D75B-7CDA-19F13AD54C8F}"/>
+                  </a:ext>
+                </a:extLst>
+              </p:cNvPr>
+              <p:cNvSpPr txBox="1"/>
+              <p:nvPr/>
+            </p:nvSpPr>
+            <p:spPr>
+              <a:xfrm>
+                <a:off x="2204718" y="1276612"/>
+                <a:ext cx="753668" cy="355803"/>
+              </a:xfrm>
+              <a:prstGeom prst="rect">
+                <a:avLst/>
+              </a:prstGeom>
+              <a:noFill/>
+            </p:spPr>
+            <p:txBody>
+              <a:bodyPr wrap="none" lIns="0" tIns="0" rIns="0" bIns="0" rtlCol="0">
+                <a:spAutoFit/>
+              </a:bodyPr>
+              <a:lstStyle/>
+              <a:p>
+                <a:pPr/>
+                <a14:m>
+                  <m:oMathPara xmlns:m="http://schemas.openxmlformats.org/officeDocument/2006/math">
+                    <m:oMathParaPr>
+                      <m:jc m:val="centerGroup"/>
+                    </m:oMathParaPr>
+                    <m:oMath xmlns:m="http://schemas.openxmlformats.org/officeDocument/2006/math">
+                      <m:f>
+                        <m:fPr>
+                          <m:ctrlPr>
+                            <a:rPr lang="de-DE" sz="1200" i="1">
+                              <a:latin typeface="Cambria Math" panose="02040503050406030204" pitchFamily="18" charset="0"/>
+                              <a:ea typeface="Cambria Math" panose="02040503050406030204" pitchFamily="18" charset="0"/>
+                            </a:rPr>
+                          </m:ctrlPr>
+                        </m:fPr>
+                        <m:num>
+                          <m:sSub>
+                            <m:sSubPr>
+                              <m:ctrlPr>
+                                <a:rPr lang="de-DE" sz="1200" i="1">
+                                  <a:latin typeface="Cambria Math" panose="02040503050406030204" pitchFamily="18" charset="0"/>
+                                  <a:ea typeface="Cambria Math" panose="02040503050406030204" pitchFamily="18" charset="0"/>
+                                </a:rPr>
+                              </m:ctrlPr>
+                            </m:sSubPr>
+                            <m:e>
+                              <m:r>
+                                <a:rPr lang="de-DE" sz="1200" b="0" i="1">
+                                  <a:latin typeface="Cambria Math" panose="02040503050406030204" pitchFamily="18" charset="0"/>
+                                  <a:ea typeface="Cambria Math" panose="02040503050406030204" pitchFamily="18" charset="0"/>
+                                </a:rPr>
+                                <m:t>𝑁</m:t>
+                              </m:r>
+                            </m:e>
+                            <m:sub>
+                              <m:r>
+                                <a:rPr lang="de-DE" sz="1200" b="0" i="1">
+                                  <a:latin typeface="Cambria Math" panose="02040503050406030204" pitchFamily="18" charset="0"/>
+                                  <a:ea typeface="Cambria Math" panose="02040503050406030204" pitchFamily="18" charset="0"/>
+                                </a:rPr>
+                                <m:t>𝑙𝑎𝑡</m:t>
+                              </m:r>
+                            </m:sub>
+                          </m:sSub>
+                        </m:num>
+                        <m:den>
+                          <m:sSup>
+                            <m:sSupPr>
+                              <m:ctrlPr>
+                                <a:rPr lang="de-DE" sz="1200" i="1">
+                                  <a:latin typeface="Cambria Math" panose="02040503050406030204" pitchFamily="18" charset="0"/>
+                                  <a:ea typeface="Cambria Math" panose="02040503050406030204" pitchFamily="18" charset="0"/>
+                                </a:rPr>
+                              </m:ctrlPr>
+                            </m:sSupPr>
+                            <m:e>
+                              <m:r>
+                                <a:rPr lang="de-DE" sz="1200" b="0" i="1">
+                                  <a:latin typeface="Cambria Math" panose="02040503050406030204" pitchFamily="18" charset="0"/>
+                                  <a:ea typeface="Cambria Math" panose="02040503050406030204" pitchFamily="18" charset="0"/>
+                                </a:rPr>
+                                <m:t>2</m:t>
+                              </m:r>
+                            </m:e>
+                            <m:sup>
+                              <m:r>
+                                <a:rPr lang="de-DE" sz="1200" b="0" i="1">
+                                  <a:latin typeface="Cambria Math" panose="02040503050406030204" pitchFamily="18" charset="0"/>
+                                  <a:ea typeface="Cambria Math" panose="02040503050406030204" pitchFamily="18" charset="0"/>
+                                </a:rPr>
+                                <m:t>1</m:t>
+                              </m:r>
+                            </m:sup>
+                          </m:sSup>
+                        </m:den>
+                      </m:f>
+                      <m:r>
+                        <a:rPr lang="de-DE" sz="1200" i="1">
+                          <a:latin typeface="Cambria Math" panose="02040503050406030204" pitchFamily="18" charset="0"/>
+                          <a:ea typeface="Cambria Math" panose="02040503050406030204" pitchFamily="18" charset="0"/>
+                        </a:rPr>
+                        <m:t>×</m:t>
+                      </m:r>
+                      <m:f>
+                        <m:fPr>
+                          <m:ctrlPr>
+                            <a:rPr lang="de-DE" sz="1200" i="1">
+                              <a:latin typeface="Cambria Math" panose="02040503050406030204" pitchFamily="18" charset="0"/>
+                              <a:ea typeface="Cambria Math" panose="02040503050406030204" pitchFamily="18" charset="0"/>
+                            </a:rPr>
+                          </m:ctrlPr>
+                        </m:fPr>
+                        <m:num>
+                          <m:sSub>
+                            <m:sSubPr>
+                              <m:ctrlPr>
+                                <a:rPr lang="de-DE" sz="1200" i="1">
+                                  <a:latin typeface="Cambria Math" panose="02040503050406030204" pitchFamily="18" charset="0"/>
+                                  <a:ea typeface="Cambria Math" panose="02040503050406030204" pitchFamily="18" charset="0"/>
+                                </a:rPr>
+                              </m:ctrlPr>
+                            </m:sSubPr>
+                            <m:e>
+                              <m:r>
+                                <a:rPr lang="de-DE" sz="1200" b="0" i="1">
+                                  <a:latin typeface="Cambria Math" panose="02040503050406030204" pitchFamily="18" charset="0"/>
+                                  <a:ea typeface="Cambria Math" panose="02040503050406030204" pitchFamily="18" charset="0"/>
+                                </a:rPr>
+                                <m:t>𝑁</m:t>
+                              </m:r>
+                            </m:e>
+                            <m:sub>
+                              <m:r>
+                                <a:rPr lang="de-DE" sz="1200" b="0" i="1">
+                                  <a:latin typeface="Cambria Math" panose="02040503050406030204" pitchFamily="18" charset="0"/>
+                                  <a:ea typeface="Cambria Math" panose="02040503050406030204" pitchFamily="18" charset="0"/>
+                                </a:rPr>
+                                <m:t>𝑙𝑜𝑛</m:t>
+                              </m:r>
+                            </m:sub>
+                          </m:sSub>
+                        </m:num>
+                        <m:den>
+                          <m:sSup>
+                            <m:sSupPr>
+                              <m:ctrlPr>
+                                <a:rPr lang="de-DE" sz="1200" i="1">
+                                  <a:latin typeface="Cambria Math" panose="02040503050406030204" pitchFamily="18" charset="0"/>
+                                  <a:ea typeface="Cambria Math" panose="02040503050406030204" pitchFamily="18" charset="0"/>
+                                </a:rPr>
+                              </m:ctrlPr>
+                            </m:sSupPr>
+                            <m:e>
+                              <m:r>
+                                <a:rPr lang="de-DE" sz="1200" b="0" i="1">
+                                  <a:latin typeface="Cambria Math" panose="02040503050406030204" pitchFamily="18" charset="0"/>
+                                  <a:ea typeface="Cambria Math" panose="02040503050406030204" pitchFamily="18" charset="0"/>
+                                </a:rPr>
+                                <m:t>2</m:t>
+                              </m:r>
+                            </m:e>
+                            <m:sup>
+                              <m:r>
+                                <a:rPr lang="de-DE" sz="1200" b="0" i="1">
+                                  <a:latin typeface="Cambria Math" panose="02040503050406030204" pitchFamily="18" charset="0"/>
+                                  <a:ea typeface="Cambria Math" panose="02040503050406030204" pitchFamily="18" charset="0"/>
+                                </a:rPr>
+                                <m:t>1</m:t>
+                              </m:r>
+                            </m:sup>
+                          </m:sSup>
+                        </m:den>
+                      </m:f>
+                    </m:oMath>
+                  </m:oMathPara>
+                </a14:m>
+                <a:endParaRPr lang="de-DE" sz="1200"/>
+              </a:p>
+            </p:txBody>
+          </p:sp>
+        </mc:Choice>
+        <mc:Fallback xmlns="">
+          <p:sp>
+            <p:nvSpPr>
+              <p:cNvPr id="5" name="Textfeld 4">
+                <a:extLst>
+                  <a:ext uri="{FF2B5EF4-FFF2-40B4-BE49-F238E27FC236}">
+                    <a16:creationId xmlns:a16="http://schemas.microsoft.com/office/drawing/2014/main" id="{78429FA1-5B62-D75B-7CDA-19F13AD54C8F}"/>
+                  </a:ext>
+                </a:extLst>
+              </p:cNvPr>
+              <p:cNvSpPr txBox="1">
+                <a:spLocks noRot="1" noChangeAspect="1" noMove="1" noResize="1" noEditPoints="1" noAdjustHandles="1" noChangeArrowheads="1" noChangeShapeType="1" noTextEdit="1"/>
+              </p:cNvSpPr>
+              <p:nvPr/>
+            </p:nvSpPr>
+            <p:spPr>
+              <a:xfrm>
+                <a:off x="2204718" y="1276612"/>
+                <a:ext cx="753668" cy="355803"/>
+              </a:xfrm>
+              <a:prstGeom prst="rect">
+                <a:avLst/>
+              </a:prstGeom>
+              <a:blipFill>
+                <a:blip r:embed="rId6"/>
+                <a:stretch>
+                  <a:fillRect l="-5000" r="-1667" b="-10345"/>
+                </a:stretch>
+              </a:blipFill>
+            </p:spPr>
+            <p:txBody>
+              <a:bodyPr/>
+              <a:lstStyle/>
+              <a:p>
+                <a:r>
+                  <a:rPr lang="de-DE">
+                    <a:noFill/>
+                  </a:rPr>
+                  <a:t> </a:t>
+                </a:r>
+              </a:p>
+            </p:txBody>
+          </p:sp>
+        </mc:Fallback>
+      </mc:AlternateContent>
+      <mc:AlternateContent xmlns:mc="http://schemas.openxmlformats.org/markup-compatibility/2006" xmlns:a14="http://schemas.microsoft.com/office/drawing/2010/main">
+        <mc:Choice Requires="a14">
+          <p:sp>
+            <p:nvSpPr>
+              <p:cNvPr id="7" name="Textfeld 6">
+                <a:extLst>
+                  <a:ext uri="{FF2B5EF4-FFF2-40B4-BE49-F238E27FC236}">
+                    <a16:creationId xmlns:a16="http://schemas.microsoft.com/office/drawing/2014/main" id="{C07D105C-0A59-530C-FF16-B97FFCF76112}"/>
+                  </a:ext>
+                </a:extLst>
+              </p:cNvPr>
+              <p:cNvSpPr txBox="1"/>
+              <p:nvPr/>
+            </p:nvSpPr>
+            <p:spPr>
+              <a:xfrm>
+                <a:off x="2920292" y="1766346"/>
+                <a:ext cx="753668" cy="355803"/>
+              </a:xfrm>
+              <a:prstGeom prst="rect">
+                <a:avLst/>
+              </a:prstGeom>
+              <a:noFill/>
+            </p:spPr>
+            <p:txBody>
+              <a:bodyPr wrap="none" lIns="0" tIns="0" rIns="0" bIns="0" rtlCol="0">
+                <a:spAutoFit/>
+              </a:bodyPr>
+              <a:lstStyle/>
+              <a:p>
+                <a:pPr/>
+                <a14:m>
+                  <m:oMathPara xmlns:m="http://schemas.openxmlformats.org/officeDocument/2006/math">
+                    <m:oMathParaPr>
+                      <m:jc m:val="centerGroup"/>
+                    </m:oMathParaPr>
+                    <m:oMath xmlns:m="http://schemas.openxmlformats.org/officeDocument/2006/math">
+                      <m:f>
+                        <m:fPr>
+                          <m:ctrlPr>
+                            <a:rPr lang="de-DE" sz="1200" i="1">
+                              <a:latin typeface="Cambria Math" panose="02040503050406030204" pitchFamily="18" charset="0"/>
+                              <a:ea typeface="Cambria Math" panose="02040503050406030204" pitchFamily="18" charset="0"/>
+                            </a:rPr>
+                          </m:ctrlPr>
+                        </m:fPr>
+                        <m:num>
+                          <m:sSub>
+                            <m:sSubPr>
+                              <m:ctrlPr>
+                                <a:rPr lang="de-DE" sz="1200" i="1">
+                                  <a:latin typeface="Cambria Math" panose="02040503050406030204" pitchFamily="18" charset="0"/>
+                                  <a:ea typeface="Cambria Math" panose="02040503050406030204" pitchFamily="18" charset="0"/>
+                                </a:rPr>
+                              </m:ctrlPr>
+                            </m:sSubPr>
+                            <m:e>
+                              <m:r>
+                                <a:rPr lang="de-DE" sz="1200" b="0" i="1">
+                                  <a:latin typeface="Cambria Math" panose="02040503050406030204" pitchFamily="18" charset="0"/>
+                                  <a:ea typeface="Cambria Math" panose="02040503050406030204" pitchFamily="18" charset="0"/>
+                                </a:rPr>
+                                <m:t>𝑁</m:t>
+                              </m:r>
+                            </m:e>
+                            <m:sub>
+                              <m:r>
+                                <a:rPr lang="de-DE" sz="1200" b="0" i="1">
+                                  <a:latin typeface="Cambria Math" panose="02040503050406030204" pitchFamily="18" charset="0"/>
+                                  <a:ea typeface="Cambria Math" panose="02040503050406030204" pitchFamily="18" charset="0"/>
+                                </a:rPr>
+                                <m:t>𝑙𝑎𝑡</m:t>
+                              </m:r>
+                            </m:sub>
+                          </m:sSub>
+                        </m:num>
+                        <m:den>
+                          <m:sSup>
+                            <m:sSupPr>
+                              <m:ctrlPr>
+                                <a:rPr lang="de-DE" sz="1200" i="1">
+                                  <a:latin typeface="Cambria Math" panose="02040503050406030204" pitchFamily="18" charset="0"/>
+                                  <a:ea typeface="Cambria Math" panose="02040503050406030204" pitchFamily="18" charset="0"/>
+                                </a:rPr>
+                              </m:ctrlPr>
+                            </m:sSupPr>
+                            <m:e>
+                              <m:r>
+                                <a:rPr lang="de-DE" sz="1200" b="0" i="1">
+                                  <a:latin typeface="Cambria Math" panose="02040503050406030204" pitchFamily="18" charset="0"/>
+                                  <a:ea typeface="Cambria Math" panose="02040503050406030204" pitchFamily="18" charset="0"/>
+                                </a:rPr>
+                                <m:t>2</m:t>
+                              </m:r>
+                            </m:e>
+                            <m:sup>
+                              <m:r>
+                                <a:rPr lang="de-DE" sz="1200" b="0" i="1">
+                                  <a:latin typeface="Cambria Math" panose="02040503050406030204" pitchFamily="18" charset="0"/>
+                                  <a:ea typeface="Cambria Math" panose="02040503050406030204" pitchFamily="18" charset="0"/>
+                                </a:rPr>
+                                <m:t>2</m:t>
+                              </m:r>
+                            </m:sup>
+                          </m:sSup>
+                        </m:den>
+                      </m:f>
+                      <m:r>
+                        <a:rPr lang="de-DE" sz="1200" i="1">
+                          <a:latin typeface="Cambria Math" panose="02040503050406030204" pitchFamily="18" charset="0"/>
+                          <a:ea typeface="Cambria Math" panose="02040503050406030204" pitchFamily="18" charset="0"/>
+                        </a:rPr>
+                        <m:t>×</m:t>
+                      </m:r>
+                      <m:f>
+                        <m:fPr>
+                          <m:ctrlPr>
+                            <a:rPr lang="de-DE" sz="1200" i="1">
+                              <a:latin typeface="Cambria Math" panose="02040503050406030204" pitchFamily="18" charset="0"/>
+                              <a:ea typeface="Cambria Math" panose="02040503050406030204" pitchFamily="18" charset="0"/>
+                            </a:rPr>
+                          </m:ctrlPr>
+                        </m:fPr>
+                        <m:num>
+                          <m:sSub>
+                            <m:sSubPr>
+                              <m:ctrlPr>
+                                <a:rPr lang="de-DE" sz="1200" i="1">
+                                  <a:latin typeface="Cambria Math" panose="02040503050406030204" pitchFamily="18" charset="0"/>
+                                  <a:ea typeface="Cambria Math" panose="02040503050406030204" pitchFamily="18" charset="0"/>
+                                </a:rPr>
+                              </m:ctrlPr>
+                            </m:sSubPr>
+                            <m:e>
+                              <m:r>
+                                <a:rPr lang="de-DE" sz="1200" b="0" i="1">
+                                  <a:latin typeface="Cambria Math" panose="02040503050406030204" pitchFamily="18" charset="0"/>
+                                  <a:ea typeface="Cambria Math" panose="02040503050406030204" pitchFamily="18" charset="0"/>
+                                </a:rPr>
+                                <m:t>𝑁</m:t>
+                              </m:r>
+                            </m:e>
+                            <m:sub>
+                              <m:r>
+                                <a:rPr lang="de-DE" sz="1200" b="0" i="1">
+                                  <a:latin typeface="Cambria Math" panose="02040503050406030204" pitchFamily="18" charset="0"/>
+                                  <a:ea typeface="Cambria Math" panose="02040503050406030204" pitchFamily="18" charset="0"/>
+                                </a:rPr>
+                                <m:t>𝑙𝑜𝑛</m:t>
+                              </m:r>
+                            </m:sub>
+                          </m:sSub>
+                        </m:num>
+                        <m:den>
+                          <m:sSup>
+                            <m:sSupPr>
+                              <m:ctrlPr>
+                                <a:rPr lang="de-DE" sz="1200" i="1">
+                                  <a:latin typeface="Cambria Math" panose="02040503050406030204" pitchFamily="18" charset="0"/>
+                                  <a:ea typeface="Cambria Math" panose="02040503050406030204" pitchFamily="18" charset="0"/>
+                                </a:rPr>
+                              </m:ctrlPr>
+                            </m:sSupPr>
+                            <m:e>
+                              <m:r>
+                                <a:rPr lang="de-DE" sz="1200" b="0" i="1">
+                                  <a:latin typeface="Cambria Math" panose="02040503050406030204" pitchFamily="18" charset="0"/>
+                                  <a:ea typeface="Cambria Math" panose="02040503050406030204" pitchFamily="18" charset="0"/>
+                                </a:rPr>
+                                <m:t>2</m:t>
+                              </m:r>
+                            </m:e>
+                            <m:sup>
+                              <m:r>
+                                <a:rPr lang="de-DE" sz="1200" b="0" i="1">
+                                  <a:latin typeface="Cambria Math" panose="02040503050406030204" pitchFamily="18" charset="0"/>
+                                  <a:ea typeface="Cambria Math" panose="02040503050406030204" pitchFamily="18" charset="0"/>
+                                </a:rPr>
+                                <m:t>2</m:t>
+                              </m:r>
+                            </m:sup>
+                          </m:sSup>
+                        </m:den>
+                      </m:f>
+                    </m:oMath>
+                  </m:oMathPara>
+                </a14:m>
+                <a:endParaRPr lang="de-DE" sz="1200"/>
+              </a:p>
+            </p:txBody>
+          </p:sp>
+        </mc:Choice>
+        <mc:Fallback xmlns="">
+          <p:sp>
+            <p:nvSpPr>
+              <p:cNvPr id="7" name="Textfeld 6">
+                <a:extLst>
+                  <a:ext uri="{FF2B5EF4-FFF2-40B4-BE49-F238E27FC236}">
+                    <a16:creationId xmlns:a16="http://schemas.microsoft.com/office/drawing/2014/main" id="{C07D105C-0A59-530C-FF16-B97FFCF76112}"/>
+                  </a:ext>
+                </a:extLst>
+              </p:cNvPr>
+              <p:cNvSpPr txBox="1">
+                <a:spLocks noRot="1" noChangeAspect="1" noMove="1" noResize="1" noEditPoints="1" noAdjustHandles="1" noChangeArrowheads="1" noChangeShapeType="1" noTextEdit="1"/>
+              </p:cNvSpPr>
+              <p:nvPr/>
+            </p:nvSpPr>
+            <p:spPr>
+              <a:xfrm>
+                <a:off x="2920292" y="1766346"/>
+                <a:ext cx="753668" cy="355803"/>
+              </a:xfrm>
+              <a:prstGeom prst="rect">
+                <a:avLst/>
+              </a:prstGeom>
+              <a:blipFill>
+                <a:blip r:embed="rId7"/>
+                <a:stretch>
+                  <a:fillRect l="-3279" t="-3448" r="-1639" b="-10345"/>
+                </a:stretch>
+              </a:blipFill>
+            </p:spPr>
+            <p:txBody>
+              <a:bodyPr/>
+              <a:lstStyle/>
+              <a:p>
+                <a:r>
+                  <a:rPr lang="de-DE">
+                    <a:noFill/>
+                  </a:rPr>
+                  <a:t> </a:t>
+                </a:r>
+              </a:p>
+            </p:txBody>
+          </p:sp>
+        </mc:Fallback>
+      </mc:AlternateContent>
+      <mc:AlternateContent xmlns:mc="http://schemas.openxmlformats.org/markup-compatibility/2006" xmlns:a14="http://schemas.microsoft.com/office/drawing/2010/main">
+        <mc:Choice Requires="a14">
+          <p:sp>
+            <p:nvSpPr>
+              <p:cNvPr id="45" name="Textfeld 44">
+                <a:extLst>
+                  <a:ext uri="{FF2B5EF4-FFF2-40B4-BE49-F238E27FC236}">
+                    <a16:creationId xmlns:a16="http://schemas.microsoft.com/office/drawing/2014/main" id="{52A64690-B9C5-28B5-A344-3B4F9A343F3B}"/>
+                  </a:ext>
+                </a:extLst>
+              </p:cNvPr>
+              <p:cNvSpPr txBox="1"/>
+              <p:nvPr/>
+            </p:nvSpPr>
+            <p:spPr>
+              <a:xfrm>
+                <a:off x="3532736" y="2339183"/>
+                <a:ext cx="753668" cy="355803"/>
+              </a:xfrm>
+              <a:prstGeom prst="rect">
+                <a:avLst/>
+              </a:prstGeom>
+              <a:noFill/>
+            </p:spPr>
+            <p:txBody>
+              <a:bodyPr wrap="none" lIns="0" tIns="0" rIns="0" bIns="0" rtlCol="0">
+                <a:spAutoFit/>
+              </a:bodyPr>
+              <a:lstStyle/>
+              <a:p>
+                <a:pPr/>
+                <a14:m>
+                  <m:oMathPara xmlns:m="http://schemas.openxmlformats.org/officeDocument/2006/math">
+                    <m:oMathParaPr>
+                      <m:jc m:val="centerGroup"/>
+                    </m:oMathParaPr>
+                    <m:oMath xmlns:m="http://schemas.openxmlformats.org/officeDocument/2006/math">
+                      <m:f>
+                        <m:fPr>
+                          <m:ctrlPr>
+                            <a:rPr lang="de-DE" sz="1200" i="1">
+                              <a:latin typeface="Cambria Math" panose="02040503050406030204" pitchFamily="18" charset="0"/>
+                              <a:ea typeface="Cambria Math" panose="02040503050406030204" pitchFamily="18" charset="0"/>
+                            </a:rPr>
+                          </m:ctrlPr>
+                        </m:fPr>
+                        <m:num>
+                          <m:sSub>
+                            <m:sSubPr>
+                              <m:ctrlPr>
+                                <a:rPr lang="de-DE" sz="1200" i="1">
+                                  <a:latin typeface="Cambria Math" panose="02040503050406030204" pitchFamily="18" charset="0"/>
+                                  <a:ea typeface="Cambria Math" panose="02040503050406030204" pitchFamily="18" charset="0"/>
+                                </a:rPr>
+                              </m:ctrlPr>
+                            </m:sSubPr>
+                            <m:e>
+                              <m:r>
+                                <a:rPr lang="de-DE" sz="1200" b="0" i="1">
+                                  <a:latin typeface="Cambria Math" panose="02040503050406030204" pitchFamily="18" charset="0"/>
+                                  <a:ea typeface="Cambria Math" panose="02040503050406030204" pitchFamily="18" charset="0"/>
+                                </a:rPr>
+                                <m:t>𝑁</m:t>
+                              </m:r>
+                            </m:e>
+                            <m:sub>
+                              <m:r>
+                                <a:rPr lang="de-DE" sz="1200" b="0" i="1">
+                                  <a:latin typeface="Cambria Math" panose="02040503050406030204" pitchFamily="18" charset="0"/>
+                                  <a:ea typeface="Cambria Math" panose="02040503050406030204" pitchFamily="18" charset="0"/>
+                                </a:rPr>
+                                <m:t>𝑙𝑎𝑡</m:t>
+                              </m:r>
+                            </m:sub>
+                          </m:sSub>
+                        </m:num>
+                        <m:den>
+                          <m:sSup>
+                            <m:sSupPr>
+                              <m:ctrlPr>
+                                <a:rPr lang="de-DE" sz="1200" i="1">
+                                  <a:latin typeface="Cambria Math" panose="02040503050406030204" pitchFamily="18" charset="0"/>
+                                  <a:ea typeface="Cambria Math" panose="02040503050406030204" pitchFamily="18" charset="0"/>
+                                </a:rPr>
+                              </m:ctrlPr>
+                            </m:sSupPr>
+                            <m:e>
+                              <m:r>
+                                <a:rPr lang="de-DE" sz="1200" b="0" i="1">
+                                  <a:latin typeface="Cambria Math" panose="02040503050406030204" pitchFamily="18" charset="0"/>
+                                  <a:ea typeface="Cambria Math" panose="02040503050406030204" pitchFamily="18" charset="0"/>
+                                </a:rPr>
+                                <m:t>2</m:t>
+                              </m:r>
+                            </m:e>
+                            <m:sup>
+                              <m:r>
+                                <a:rPr lang="de-DE" sz="1200" b="0" i="1">
+                                  <a:latin typeface="Cambria Math" panose="02040503050406030204" pitchFamily="18" charset="0"/>
+                                  <a:ea typeface="Cambria Math" panose="02040503050406030204" pitchFamily="18" charset="0"/>
+                                </a:rPr>
+                                <m:t>3</m:t>
+                              </m:r>
+                            </m:sup>
+                          </m:sSup>
+                        </m:den>
+                      </m:f>
+                      <m:r>
+                        <a:rPr lang="de-DE" sz="1200" i="1">
+                          <a:latin typeface="Cambria Math" panose="02040503050406030204" pitchFamily="18" charset="0"/>
+                          <a:ea typeface="Cambria Math" panose="02040503050406030204" pitchFamily="18" charset="0"/>
+                        </a:rPr>
+                        <m:t>×</m:t>
+                      </m:r>
+                      <m:f>
+                        <m:fPr>
+                          <m:ctrlPr>
+                            <a:rPr lang="de-DE" sz="1200" i="1">
+                              <a:latin typeface="Cambria Math" panose="02040503050406030204" pitchFamily="18" charset="0"/>
+                              <a:ea typeface="Cambria Math" panose="02040503050406030204" pitchFamily="18" charset="0"/>
+                            </a:rPr>
+                          </m:ctrlPr>
+                        </m:fPr>
+                        <m:num>
+                          <m:sSub>
+                            <m:sSubPr>
+                              <m:ctrlPr>
+                                <a:rPr lang="de-DE" sz="1200" i="1">
+                                  <a:latin typeface="Cambria Math" panose="02040503050406030204" pitchFamily="18" charset="0"/>
+                                  <a:ea typeface="Cambria Math" panose="02040503050406030204" pitchFamily="18" charset="0"/>
+                                </a:rPr>
+                              </m:ctrlPr>
+                            </m:sSubPr>
+                            <m:e>
+                              <m:r>
+                                <a:rPr lang="de-DE" sz="1200" b="0" i="1">
+                                  <a:latin typeface="Cambria Math" panose="02040503050406030204" pitchFamily="18" charset="0"/>
+                                  <a:ea typeface="Cambria Math" panose="02040503050406030204" pitchFamily="18" charset="0"/>
+                                </a:rPr>
+                                <m:t>𝑁</m:t>
+                              </m:r>
+                            </m:e>
+                            <m:sub>
+                              <m:r>
+                                <a:rPr lang="de-DE" sz="1200" b="0" i="1">
+                                  <a:latin typeface="Cambria Math" panose="02040503050406030204" pitchFamily="18" charset="0"/>
+                                  <a:ea typeface="Cambria Math" panose="02040503050406030204" pitchFamily="18" charset="0"/>
+                                </a:rPr>
+                                <m:t>𝑙𝑜𝑛</m:t>
+                              </m:r>
+                            </m:sub>
+                          </m:sSub>
+                        </m:num>
+                        <m:den>
+                          <m:sSup>
+                            <m:sSupPr>
+                              <m:ctrlPr>
+                                <a:rPr lang="de-DE" sz="1200" i="1">
+                                  <a:latin typeface="Cambria Math" panose="02040503050406030204" pitchFamily="18" charset="0"/>
+                                  <a:ea typeface="Cambria Math" panose="02040503050406030204" pitchFamily="18" charset="0"/>
+                                </a:rPr>
+                              </m:ctrlPr>
+                            </m:sSupPr>
+                            <m:e>
+                              <m:r>
+                                <a:rPr lang="de-DE" sz="1200" b="0" i="1">
+                                  <a:latin typeface="Cambria Math" panose="02040503050406030204" pitchFamily="18" charset="0"/>
+                                  <a:ea typeface="Cambria Math" panose="02040503050406030204" pitchFamily="18" charset="0"/>
+                                </a:rPr>
+                                <m:t>2</m:t>
+                              </m:r>
+                            </m:e>
+                            <m:sup>
+                              <m:r>
+                                <a:rPr lang="de-DE" sz="1200" b="0" i="1">
+                                  <a:latin typeface="Cambria Math" panose="02040503050406030204" pitchFamily="18" charset="0"/>
+                                  <a:ea typeface="Cambria Math" panose="02040503050406030204" pitchFamily="18" charset="0"/>
+                                </a:rPr>
+                                <m:t>3</m:t>
+                              </m:r>
+                            </m:sup>
+                          </m:sSup>
+                        </m:den>
+                      </m:f>
+                    </m:oMath>
+                  </m:oMathPara>
+                </a14:m>
+                <a:endParaRPr lang="de-DE" sz="1200"/>
+              </a:p>
+            </p:txBody>
+          </p:sp>
+        </mc:Choice>
+        <mc:Fallback xmlns="">
+          <p:sp>
+            <p:nvSpPr>
+              <p:cNvPr id="45" name="Textfeld 44">
+                <a:extLst>
+                  <a:ext uri="{FF2B5EF4-FFF2-40B4-BE49-F238E27FC236}">
+                    <a16:creationId xmlns:a16="http://schemas.microsoft.com/office/drawing/2014/main" id="{52A64690-B9C5-28B5-A344-3B4F9A343F3B}"/>
+                  </a:ext>
+                </a:extLst>
+              </p:cNvPr>
+              <p:cNvSpPr txBox="1">
+                <a:spLocks noRot="1" noChangeAspect="1" noMove="1" noResize="1" noEditPoints="1" noAdjustHandles="1" noChangeArrowheads="1" noChangeShapeType="1" noTextEdit="1"/>
+              </p:cNvSpPr>
+              <p:nvPr/>
+            </p:nvSpPr>
+            <p:spPr>
+              <a:xfrm>
+                <a:off x="3532736" y="2339183"/>
+                <a:ext cx="753668" cy="355803"/>
+              </a:xfrm>
+              <a:prstGeom prst="rect">
+                <a:avLst/>
+              </a:prstGeom>
+              <a:blipFill>
+                <a:blip r:embed="rId8"/>
+                <a:stretch>
+                  <a:fillRect l="-5000" t="-3448" r="-1667" b="-10345"/>
+                </a:stretch>
+              </a:blipFill>
+            </p:spPr>
+            <p:txBody>
+              <a:bodyPr/>
+              <a:lstStyle/>
+              <a:p>
+                <a:r>
+                  <a:rPr lang="de-DE">
+                    <a:noFill/>
+                  </a:rPr>
+                  <a:t> </a:t>
+                </a:r>
+              </a:p>
+            </p:txBody>
+          </p:sp>
+        </mc:Fallback>
+      </mc:AlternateContent>
+      <mc:AlternateContent xmlns:mc="http://schemas.openxmlformats.org/markup-compatibility/2006" xmlns:a14="http://schemas.microsoft.com/office/drawing/2010/main">
+        <mc:Choice Requires="a14">
+          <p:sp>
+            <p:nvSpPr>
+              <p:cNvPr id="54" name="Textfeld 53">
+                <a:extLst>
+                  <a:ext uri="{FF2B5EF4-FFF2-40B4-BE49-F238E27FC236}">
+                    <a16:creationId xmlns:a16="http://schemas.microsoft.com/office/drawing/2014/main" id="{F2D29C54-571F-00DA-5BA0-52598BFEAC62}"/>
+                  </a:ext>
+                </a:extLst>
+              </p:cNvPr>
+              <p:cNvSpPr txBox="1"/>
+              <p:nvPr/>
+            </p:nvSpPr>
+            <p:spPr>
+              <a:xfrm>
+                <a:off x="1916984" y="1454318"/>
+                <a:ext cx="181588" cy="184666"/>
+              </a:xfrm>
+              <a:prstGeom prst="rect">
+                <a:avLst/>
+              </a:prstGeom>
+              <a:noFill/>
+            </p:spPr>
+            <p:txBody>
+              <a:bodyPr wrap="none" lIns="0" tIns="0" rIns="0" bIns="0" rtlCol="0">
+                <a:spAutoFit/>
+              </a:bodyPr>
+              <a:lstStyle/>
+              <a:p>
+                <a:pPr/>
+                <a14:m>
+                  <m:oMathPara xmlns:m="http://schemas.openxmlformats.org/officeDocument/2006/math">
+                    <m:oMathParaPr>
+                      <m:jc m:val="centerGroup"/>
+                    </m:oMathParaPr>
+                    <m:oMath xmlns:m="http://schemas.openxmlformats.org/officeDocument/2006/math">
+                      <m:sSub>
+                        <m:sSubPr>
+                          <m:ctrlPr>
+                            <a:rPr lang="de-DE" sz="1200" i="1">
+                              <a:latin typeface="Cambria Math" panose="02040503050406030204" pitchFamily="18" charset="0"/>
+                            </a:rPr>
+                          </m:ctrlPr>
+                        </m:sSubPr>
+                        <m:e>
+                          <m:r>
+                            <a:rPr lang="de-DE" sz="1200" b="0" i="1">
+                              <a:latin typeface="Cambria Math" panose="02040503050406030204" pitchFamily="18" charset="0"/>
+                            </a:rPr>
+                            <m:t>𝐹</m:t>
+                          </m:r>
+                        </m:e>
+                        <m:sub>
+                          <m:r>
+                            <a:rPr lang="de-DE" sz="1200" b="0" i="1">
+                              <a:latin typeface="Cambria Math" panose="02040503050406030204" pitchFamily="18" charset="0"/>
+                            </a:rPr>
+                            <m:t>1</m:t>
+                          </m:r>
+                        </m:sub>
+                      </m:sSub>
+                    </m:oMath>
+                  </m:oMathPara>
+                </a14:m>
+                <a:endParaRPr lang="de-DE" sz="1200"/>
+              </a:p>
+            </p:txBody>
+          </p:sp>
+        </mc:Choice>
+        <mc:Fallback xmlns="">
+          <p:sp>
+            <p:nvSpPr>
+              <p:cNvPr id="54" name="Textfeld 53">
+                <a:extLst>
+                  <a:ext uri="{FF2B5EF4-FFF2-40B4-BE49-F238E27FC236}">
+                    <a16:creationId xmlns:a16="http://schemas.microsoft.com/office/drawing/2014/main" id="{F2D29C54-571F-00DA-5BA0-52598BFEAC62}"/>
+                  </a:ext>
+                </a:extLst>
+              </p:cNvPr>
+              <p:cNvSpPr txBox="1">
+                <a:spLocks noRot="1" noChangeAspect="1" noMove="1" noResize="1" noEditPoints="1" noAdjustHandles="1" noChangeArrowheads="1" noChangeShapeType="1" noTextEdit="1"/>
+              </p:cNvSpPr>
+              <p:nvPr/>
+            </p:nvSpPr>
+            <p:spPr>
+              <a:xfrm>
+                <a:off x="1916984" y="1454318"/>
+                <a:ext cx="181588" cy="184666"/>
+              </a:xfrm>
+              <a:prstGeom prst="rect">
+                <a:avLst/>
+              </a:prstGeom>
+              <a:blipFill>
+                <a:blip r:embed="rId9"/>
+                <a:stretch>
+                  <a:fillRect l="-12500" r="-6250" b="-12500"/>
+                </a:stretch>
+              </a:blipFill>
+            </p:spPr>
+            <p:txBody>
+              <a:bodyPr/>
+              <a:lstStyle/>
+              <a:p>
+                <a:r>
+                  <a:rPr lang="de-DE">
+                    <a:noFill/>
+                  </a:rPr>
+                  <a:t> </a:t>
+                </a:r>
+              </a:p>
+            </p:txBody>
+          </p:sp>
+        </mc:Fallback>
+      </mc:AlternateContent>
+      <mc:AlternateContent xmlns:mc="http://schemas.openxmlformats.org/markup-compatibility/2006" xmlns:a14="http://schemas.microsoft.com/office/drawing/2010/main">
+        <mc:Choice Requires="a14">
+          <p:sp>
+            <p:nvSpPr>
+              <p:cNvPr id="61" name="Textfeld 60">
+                <a:extLst>
+                  <a:ext uri="{FF2B5EF4-FFF2-40B4-BE49-F238E27FC236}">
+                    <a16:creationId xmlns:a16="http://schemas.microsoft.com/office/drawing/2014/main" id="{AC09E71D-E9CD-7E3A-92C1-EAD3F70EE334}"/>
+                  </a:ext>
+                </a:extLst>
+              </p:cNvPr>
+              <p:cNvSpPr txBox="1"/>
+              <p:nvPr/>
+            </p:nvSpPr>
+            <p:spPr>
+              <a:xfrm>
+                <a:off x="2025668" y="1937751"/>
+                <a:ext cx="185179" cy="184666"/>
+              </a:xfrm>
+              <a:prstGeom prst="rect">
+                <a:avLst/>
+              </a:prstGeom>
+              <a:noFill/>
+            </p:spPr>
+            <p:txBody>
+              <a:bodyPr wrap="none" lIns="0" tIns="0" rIns="0" bIns="0" rtlCol="0">
+                <a:spAutoFit/>
+              </a:bodyPr>
+              <a:lstStyle/>
+              <a:p>
+                <a:pPr/>
+                <a14:m>
+                  <m:oMathPara xmlns:m="http://schemas.openxmlformats.org/officeDocument/2006/math">
+                    <m:oMathParaPr>
+                      <m:jc m:val="centerGroup"/>
+                    </m:oMathParaPr>
+                    <m:oMath xmlns:m="http://schemas.openxmlformats.org/officeDocument/2006/math">
+                      <m:sSub>
+                        <m:sSubPr>
+                          <m:ctrlPr>
+                            <a:rPr lang="de-DE" sz="1200" i="1">
+                              <a:latin typeface="Cambria Math" panose="02040503050406030204" pitchFamily="18" charset="0"/>
+                            </a:rPr>
+                          </m:ctrlPr>
+                        </m:sSubPr>
+                        <m:e>
+                          <m:r>
+                            <a:rPr lang="de-DE" sz="1200" b="0" i="1">
+                              <a:latin typeface="Cambria Math" panose="02040503050406030204" pitchFamily="18" charset="0"/>
+                            </a:rPr>
+                            <m:t>𝐹</m:t>
+                          </m:r>
+                        </m:e>
+                        <m:sub>
+                          <m:r>
+                            <a:rPr lang="de-DE" sz="1200" b="0" i="1">
+                              <a:latin typeface="Cambria Math" panose="02040503050406030204" pitchFamily="18" charset="0"/>
+                            </a:rPr>
+                            <m:t>2</m:t>
+                          </m:r>
+                        </m:sub>
+                      </m:sSub>
+                    </m:oMath>
+                  </m:oMathPara>
+                </a14:m>
+                <a:endParaRPr lang="de-DE" sz="1200"/>
+              </a:p>
+            </p:txBody>
+          </p:sp>
+        </mc:Choice>
+        <mc:Fallback xmlns="">
+          <p:sp>
+            <p:nvSpPr>
+              <p:cNvPr id="61" name="Textfeld 60">
+                <a:extLst>
+                  <a:ext uri="{FF2B5EF4-FFF2-40B4-BE49-F238E27FC236}">
+                    <a16:creationId xmlns:a16="http://schemas.microsoft.com/office/drawing/2014/main" id="{AC09E71D-E9CD-7E3A-92C1-EAD3F70EE334}"/>
+                  </a:ext>
+                </a:extLst>
+              </p:cNvPr>
+              <p:cNvSpPr txBox="1">
+                <a:spLocks noRot="1" noChangeAspect="1" noMove="1" noResize="1" noEditPoints="1" noAdjustHandles="1" noChangeArrowheads="1" noChangeShapeType="1" noTextEdit="1"/>
+              </p:cNvSpPr>
+              <p:nvPr/>
+            </p:nvSpPr>
+            <p:spPr>
+              <a:xfrm>
+                <a:off x="2025668" y="1937751"/>
+                <a:ext cx="185179" cy="184666"/>
+              </a:xfrm>
+              <a:prstGeom prst="rect">
+                <a:avLst/>
+              </a:prstGeom>
+              <a:blipFill>
+                <a:blip r:embed="rId10"/>
+                <a:stretch>
+                  <a:fillRect l="-18750" r="-6250" b="-12500"/>
+                </a:stretch>
+              </a:blipFill>
+            </p:spPr>
+            <p:txBody>
+              <a:bodyPr/>
+              <a:lstStyle/>
+              <a:p>
+                <a:r>
+                  <a:rPr lang="de-DE">
+                    <a:noFill/>
+                  </a:rPr>
+                  <a:t> </a:t>
+                </a:r>
+              </a:p>
+            </p:txBody>
+          </p:sp>
+        </mc:Fallback>
+      </mc:AlternateContent>
+      <mc:AlternateContent xmlns:mc="http://schemas.openxmlformats.org/markup-compatibility/2006" xmlns:a14="http://schemas.microsoft.com/office/drawing/2010/main">
+        <mc:Choice Requires="a14">
+          <p:sp>
+            <p:nvSpPr>
+              <p:cNvPr id="62" name="Textfeld 61">
+                <a:extLst>
+                  <a:ext uri="{FF2B5EF4-FFF2-40B4-BE49-F238E27FC236}">
+                    <a16:creationId xmlns:a16="http://schemas.microsoft.com/office/drawing/2014/main" id="{D42E6C0F-E344-7B3E-FB62-7F3FB7F8659F}"/>
+                  </a:ext>
+                </a:extLst>
+              </p:cNvPr>
+              <p:cNvSpPr txBox="1"/>
+              <p:nvPr/>
+            </p:nvSpPr>
+            <p:spPr>
+              <a:xfrm>
+                <a:off x="2967530" y="2559664"/>
+                <a:ext cx="185179" cy="184666"/>
+              </a:xfrm>
+              <a:prstGeom prst="rect">
+                <a:avLst/>
+              </a:prstGeom>
+              <a:noFill/>
+            </p:spPr>
+            <p:txBody>
+              <a:bodyPr wrap="none" lIns="0" tIns="0" rIns="0" bIns="0" rtlCol="0">
+                <a:spAutoFit/>
+              </a:bodyPr>
+              <a:lstStyle/>
+              <a:p>
+                <a:pPr/>
+                <a14:m>
+                  <m:oMathPara xmlns:m="http://schemas.openxmlformats.org/officeDocument/2006/math">
+                    <m:oMathParaPr>
+                      <m:jc m:val="centerGroup"/>
+                    </m:oMathParaPr>
+                    <m:oMath xmlns:m="http://schemas.openxmlformats.org/officeDocument/2006/math">
+                      <m:sSub>
+                        <m:sSubPr>
+                          <m:ctrlPr>
+                            <a:rPr lang="de-DE" sz="1200" i="1">
+                              <a:latin typeface="Cambria Math" panose="02040503050406030204" pitchFamily="18" charset="0"/>
+                            </a:rPr>
+                          </m:ctrlPr>
+                        </m:sSubPr>
+                        <m:e>
+                          <m:r>
+                            <a:rPr lang="de-DE" sz="1200" b="0" i="1">
+                              <a:latin typeface="Cambria Math" panose="02040503050406030204" pitchFamily="18" charset="0"/>
+                            </a:rPr>
+                            <m:t>𝐹</m:t>
+                          </m:r>
+                        </m:e>
+                        <m:sub>
+                          <m:r>
+                            <a:rPr lang="de-DE" sz="1200" b="0" i="1">
+                              <a:latin typeface="Cambria Math" panose="02040503050406030204" pitchFamily="18" charset="0"/>
+                            </a:rPr>
+                            <m:t>3</m:t>
+                          </m:r>
+                        </m:sub>
+                      </m:sSub>
+                    </m:oMath>
+                  </m:oMathPara>
+                </a14:m>
+                <a:endParaRPr lang="de-DE" sz="1200"/>
+              </a:p>
+            </p:txBody>
+          </p:sp>
+        </mc:Choice>
+        <mc:Fallback xmlns="">
+          <p:sp>
+            <p:nvSpPr>
+              <p:cNvPr id="62" name="Textfeld 61">
+                <a:extLst>
+                  <a:ext uri="{FF2B5EF4-FFF2-40B4-BE49-F238E27FC236}">
+                    <a16:creationId xmlns:a16="http://schemas.microsoft.com/office/drawing/2014/main" id="{D42E6C0F-E344-7B3E-FB62-7F3FB7F8659F}"/>
+                  </a:ext>
+                </a:extLst>
+              </p:cNvPr>
+              <p:cNvSpPr txBox="1">
+                <a:spLocks noRot="1" noChangeAspect="1" noMove="1" noResize="1" noEditPoints="1" noAdjustHandles="1" noChangeArrowheads="1" noChangeShapeType="1" noTextEdit="1"/>
+              </p:cNvSpPr>
+              <p:nvPr/>
+            </p:nvSpPr>
+            <p:spPr>
+              <a:xfrm>
+                <a:off x="2967530" y="2559664"/>
+                <a:ext cx="185179" cy="184666"/>
+              </a:xfrm>
+              <a:prstGeom prst="rect">
+                <a:avLst/>
+              </a:prstGeom>
+              <a:blipFill>
+                <a:blip r:embed="rId11"/>
+                <a:stretch>
+                  <a:fillRect l="-18750" r="-6250" b="-12500"/>
+                </a:stretch>
+              </a:blipFill>
+            </p:spPr>
+            <p:txBody>
+              <a:bodyPr/>
+              <a:lstStyle/>
+              <a:p>
+                <a:r>
+                  <a:rPr lang="de-DE">
+                    <a:noFill/>
+                  </a:rPr>
+                  <a:t> </a:t>
+                </a:r>
+              </a:p>
+            </p:txBody>
+          </p:sp>
+        </mc:Fallback>
+      </mc:AlternateContent>
+      <mc:AlternateContent xmlns:mc="http://schemas.openxmlformats.org/markup-compatibility/2006" xmlns:a14="http://schemas.microsoft.com/office/drawing/2010/main">
+        <mc:Choice Requires="a14">
+          <p:sp>
+            <p:nvSpPr>
+              <p:cNvPr id="67" name="Textfeld 66">
+                <a:extLst>
+                  <a:ext uri="{FF2B5EF4-FFF2-40B4-BE49-F238E27FC236}">
+                    <a16:creationId xmlns:a16="http://schemas.microsoft.com/office/drawing/2014/main" id="{48ED2C7F-6087-61C4-32BE-A6E55A1E081B}"/>
+                  </a:ext>
+                </a:extLst>
+              </p:cNvPr>
+              <p:cNvSpPr txBox="1"/>
+              <p:nvPr/>
+            </p:nvSpPr>
+            <p:spPr>
+              <a:xfrm>
+                <a:off x="3841694" y="3388940"/>
+                <a:ext cx="178574" cy="184666"/>
+              </a:xfrm>
+              <a:prstGeom prst="rect">
+                <a:avLst/>
+              </a:prstGeom>
+              <a:noFill/>
+            </p:spPr>
+            <p:txBody>
+              <a:bodyPr wrap="none" lIns="0" tIns="0" rIns="0" bIns="0" rtlCol="0">
+                <a:spAutoFit/>
+              </a:bodyPr>
+              <a:lstStyle/>
+              <a:p>
+                <a:pPr/>
+                <a14:m>
+                  <m:oMathPara xmlns:m="http://schemas.openxmlformats.org/officeDocument/2006/math">
+                    <m:oMathParaPr>
+                      <m:jc m:val="centerGroup"/>
+                    </m:oMathParaPr>
+                    <m:oMath xmlns:m="http://schemas.openxmlformats.org/officeDocument/2006/math">
+                      <m:sSub>
+                        <m:sSubPr>
+                          <m:ctrlPr>
+                            <a:rPr lang="de-DE" sz="1200" i="1">
+                              <a:latin typeface="Cambria Math" panose="02040503050406030204" pitchFamily="18" charset="0"/>
+                            </a:rPr>
+                          </m:ctrlPr>
+                        </m:sSubPr>
+                        <m:e>
+                          <m:r>
+                            <a:rPr lang="de-DE" sz="1200" b="0" i="1">
+                              <a:latin typeface="Cambria Math" panose="02040503050406030204" pitchFamily="18" charset="0"/>
+                            </a:rPr>
+                            <m:t>𝐹</m:t>
+                          </m:r>
+                        </m:e>
+                        <m:sub>
+                          <m:r>
+                            <a:rPr lang="de-DE" sz="1200" b="0" i="1">
+                              <a:latin typeface="Cambria Math" panose="02040503050406030204" pitchFamily="18" charset="0"/>
+                            </a:rPr>
+                            <m:t>4</m:t>
+                          </m:r>
+                        </m:sub>
+                      </m:sSub>
+                    </m:oMath>
+                  </m:oMathPara>
+                </a14:m>
+                <a:endParaRPr lang="de-DE" sz="1200"/>
+              </a:p>
+            </p:txBody>
+          </p:sp>
+        </mc:Choice>
+        <mc:Fallback xmlns="">
+          <p:sp>
+            <p:nvSpPr>
+              <p:cNvPr id="67" name="Textfeld 66">
+                <a:extLst>
+                  <a:ext uri="{FF2B5EF4-FFF2-40B4-BE49-F238E27FC236}">
+                    <a16:creationId xmlns:a16="http://schemas.microsoft.com/office/drawing/2014/main" id="{48ED2C7F-6087-61C4-32BE-A6E55A1E081B}"/>
+                  </a:ext>
+                </a:extLst>
+              </p:cNvPr>
+              <p:cNvSpPr txBox="1">
+                <a:spLocks noRot="1" noChangeAspect="1" noMove="1" noResize="1" noEditPoints="1" noAdjustHandles="1" noChangeArrowheads="1" noChangeShapeType="1" noTextEdit="1"/>
+              </p:cNvSpPr>
+              <p:nvPr/>
+            </p:nvSpPr>
+            <p:spPr>
+              <a:xfrm>
+                <a:off x="3841694" y="3388940"/>
+                <a:ext cx="178574" cy="184666"/>
+              </a:xfrm>
+              <a:prstGeom prst="rect">
+                <a:avLst/>
+              </a:prstGeom>
+              <a:blipFill>
+                <a:blip r:embed="rId12"/>
+                <a:stretch>
+                  <a:fillRect l="-20000" r="-6667" b="-12500"/>
+                </a:stretch>
+              </a:blipFill>
+            </p:spPr>
+            <p:txBody>
+              <a:bodyPr/>
+              <a:lstStyle/>
+              <a:p>
+                <a:r>
+                  <a:rPr lang="de-DE">
+                    <a:noFill/>
+                  </a:rPr>
+                  <a:t> </a:t>
+                </a:r>
+              </a:p>
+            </p:txBody>
+          </p:sp>
+        </mc:Fallback>
+      </mc:AlternateContent>
+      <mc:AlternateContent xmlns:mc="http://schemas.openxmlformats.org/markup-compatibility/2006" xmlns:a14="http://schemas.microsoft.com/office/drawing/2010/main">
+        <mc:Choice Requires="a14">
+          <p:sp>
+            <p:nvSpPr>
+              <p:cNvPr id="69" name="Textfeld 68">
+                <a:extLst>
+                  <a:ext uri="{FF2B5EF4-FFF2-40B4-BE49-F238E27FC236}">
+                    <a16:creationId xmlns:a16="http://schemas.microsoft.com/office/drawing/2014/main" id="{3C49DE15-AA41-D2FC-381D-408391DE591F}"/>
+                  </a:ext>
+                </a:extLst>
+              </p:cNvPr>
+              <p:cNvSpPr txBox="1"/>
+              <p:nvPr/>
+            </p:nvSpPr>
+            <p:spPr>
+              <a:xfrm>
+                <a:off x="2473055" y="3548221"/>
+                <a:ext cx="512256" cy="184666"/>
+              </a:xfrm>
+              <a:prstGeom prst="rect">
+                <a:avLst/>
+              </a:prstGeom>
+              <a:noFill/>
+            </p:spPr>
+            <p:txBody>
+              <a:bodyPr wrap="none" lIns="0" tIns="0" rIns="0" bIns="0" rtlCol="0">
+                <a:spAutoFit/>
+              </a:bodyPr>
+              <a:lstStyle/>
+              <a:p>
+                <a:pPr/>
+                <a14:m>
+                  <m:oMathPara xmlns:m="http://schemas.openxmlformats.org/officeDocument/2006/math">
+                    <m:oMathParaPr>
+                      <m:jc m:val="centerGroup"/>
+                    </m:oMathParaPr>
+                    <m:oMath xmlns:m="http://schemas.openxmlformats.org/officeDocument/2006/math">
+                      <m:sSub>
+                        <m:sSubPr>
+                          <m:ctrlPr>
+                            <a:rPr lang="de-DE" sz="1200" i="1">
+                              <a:latin typeface="Cambria Math" panose="02040503050406030204" pitchFamily="18" charset="0"/>
+                            </a:rPr>
+                          </m:ctrlPr>
+                        </m:sSubPr>
+                        <m:e>
+                          <m:r>
+                            <a:rPr lang="de-DE" sz="1200" b="0" i="1">
+                              <a:latin typeface="Cambria Math" panose="02040503050406030204" pitchFamily="18" charset="0"/>
+                            </a:rPr>
+                            <m:t>𝐹</m:t>
+                          </m:r>
+                        </m:e>
+                        <m:sub>
+                          <m:r>
+                            <a:rPr lang="de-DE" sz="1200" b="0" i="1">
+                              <a:latin typeface="Cambria Math" panose="02040503050406030204" pitchFamily="18" charset="0"/>
+                            </a:rPr>
+                            <m:t>3</m:t>
+                          </m:r>
+                        </m:sub>
+                      </m:sSub>
+                      <m:r>
+                        <a:rPr lang="de-DE" sz="1200" b="0" i="1">
+                          <a:latin typeface="Cambria Math" panose="02040503050406030204" pitchFamily="18" charset="0"/>
+                        </a:rPr>
+                        <m:t>+</m:t>
+                      </m:r>
+                      <m:sSub>
+                        <m:sSubPr>
+                          <m:ctrlPr>
+                            <a:rPr lang="de-DE" sz="1200" b="0" i="1">
+                              <a:latin typeface="Cambria Math" panose="02040503050406030204" pitchFamily="18" charset="0"/>
+                            </a:rPr>
+                          </m:ctrlPr>
+                        </m:sSubPr>
+                        <m:e>
+                          <m:r>
+                            <a:rPr lang="de-DE" sz="1200" b="0" i="1">
+                              <a:latin typeface="Cambria Math" panose="02040503050406030204" pitchFamily="18" charset="0"/>
+                            </a:rPr>
+                            <m:t>𝐹</m:t>
+                          </m:r>
+                        </m:e>
+                        <m:sub>
+                          <m:r>
+                            <a:rPr lang="de-DE" sz="1200" b="0" i="1">
+                              <a:latin typeface="Cambria Math" panose="02040503050406030204" pitchFamily="18" charset="0"/>
+                            </a:rPr>
+                            <m:t>4</m:t>
+                          </m:r>
+                        </m:sub>
+                      </m:sSub>
+                    </m:oMath>
+                  </m:oMathPara>
+                </a14:m>
+                <a:endParaRPr lang="de-DE" sz="1200"/>
+              </a:p>
+            </p:txBody>
+          </p:sp>
+        </mc:Choice>
+        <mc:Fallback xmlns="">
+          <p:sp>
+            <p:nvSpPr>
+              <p:cNvPr id="69" name="Textfeld 68">
+                <a:extLst>
+                  <a:ext uri="{FF2B5EF4-FFF2-40B4-BE49-F238E27FC236}">
+                    <a16:creationId xmlns:a16="http://schemas.microsoft.com/office/drawing/2014/main" id="{3C49DE15-AA41-D2FC-381D-408391DE591F}"/>
+                  </a:ext>
+                </a:extLst>
+              </p:cNvPr>
+              <p:cNvSpPr txBox="1">
+                <a:spLocks noRot="1" noChangeAspect="1" noMove="1" noResize="1" noEditPoints="1" noAdjustHandles="1" noChangeArrowheads="1" noChangeShapeType="1" noTextEdit="1"/>
+              </p:cNvSpPr>
+              <p:nvPr/>
+            </p:nvSpPr>
+            <p:spPr>
+              <a:xfrm>
+                <a:off x="2473055" y="3548221"/>
+                <a:ext cx="512256" cy="184666"/>
+              </a:xfrm>
+              <a:prstGeom prst="rect">
+                <a:avLst/>
+              </a:prstGeom>
+              <a:blipFill>
+                <a:blip r:embed="rId13"/>
+                <a:stretch>
+                  <a:fillRect l="-4762" r="-2381" b="-20000"/>
+                </a:stretch>
+              </a:blipFill>
+            </p:spPr>
+            <p:txBody>
+              <a:bodyPr/>
+              <a:lstStyle/>
+              <a:p>
+                <a:r>
+                  <a:rPr lang="de-DE">
+                    <a:noFill/>
+                  </a:rPr>
+                  <a:t> </a:t>
+                </a:r>
+              </a:p>
+            </p:txBody>
+          </p:sp>
+        </mc:Fallback>
+      </mc:AlternateContent>
+      <mc:AlternateContent xmlns:mc="http://schemas.openxmlformats.org/markup-compatibility/2006" xmlns:a14="http://schemas.microsoft.com/office/drawing/2010/main">
+        <mc:Choice Requires="a14">
+          <p:sp>
+            <p:nvSpPr>
+              <p:cNvPr id="78" name="Textfeld 77">
+                <a:extLst>
+                  <a:ext uri="{FF2B5EF4-FFF2-40B4-BE49-F238E27FC236}">
+                    <a16:creationId xmlns:a16="http://schemas.microsoft.com/office/drawing/2014/main" id="{4E3A456B-0B0A-1AA2-2022-197DEFB1F02D}"/>
+                  </a:ext>
+                </a:extLst>
+              </p:cNvPr>
+              <p:cNvSpPr txBox="1"/>
+              <p:nvPr/>
+            </p:nvSpPr>
+            <p:spPr>
+              <a:xfrm>
+                <a:off x="3421858" y="4193794"/>
+                <a:ext cx="185179" cy="184666"/>
+              </a:xfrm>
+              <a:prstGeom prst="rect">
+                <a:avLst/>
+              </a:prstGeom>
+              <a:noFill/>
+            </p:spPr>
+            <p:txBody>
+              <a:bodyPr wrap="none" lIns="0" tIns="0" rIns="0" bIns="0" rtlCol="0">
+                <a:spAutoFit/>
+              </a:bodyPr>
+              <a:lstStyle/>
+              <a:p>
+                <a:pPr/>
+                <a14:m>
+                  <m:oMathPara xmlns:m="http://schemas.openxmlformats.org/officeDocument/2006/math">
+                    <m:oMathParaPr>
+                      <m:jc m:val="centerGroup"/>
+                    </m:oMathParaPr>
+                    <m:oMath xmlns:m="http://schemas.openxmlformats.org/officeDocument/2006/math">
+                      <m:sSub>
+                        <m:sSubPr>
+                          <m:ctrlPr>
+                            <a:rPr lang="de-DE" sz="1200" i="1">
+                              <a:latin typeface="Cambria Math" panose="02040503050406030204" pitchFamily="18" charset="0"/>
+                            </a:rPr>
+                          </m:ctrlPr>
+                        </m:sSubPr>
+                        <m:e>
+                          <m:r>
+                            <a:rPr lang="de-DE" sz="1200" b="0" i="1">
+                              <a:latin typeface="Cambria Math" panose="02040503050406030204" pitchFamily="18" charset="0"/>
+                            </a:rPr>
+                            <m:t>𝐹</m:t>
+                          </m:r>
+                        </m:e>
+                        <m:sub>
+                          <m:r>
+                            <a:rPr lang="de-DE" sz="1200" b="0" i="1">
+                              <a:latin typeface="Cambria Math" panose="02040503050406030204" pitchFamily="18" charset="0"/>
+                            </a:rPr>
+                            <m:t>3</m:t>
+                          </m:r>
+                        </m:sub>
+                      </m:sSub>
+                    </m:oMath>
+                  </m:oMathPara>
+                </a14:m>
+                <a:endParaRPr lang="de-DE" sz="1200"/>
+              </a:p>
+            </p:txBody>
+          </p:sp>
+        </mc:Choice>
+        <mc:Fallback xmlns="">
+          <p:sp>
+            <p:nvSpPr>
+              <p:cNvPr id="78" name="Textfeld 77">
+                <a:extLst>
+                  <a:ext uri="{FF2B5EF4-FFF2-40B4-BE49-F238E27FC236}">
+                    <a16:creationId xmlns:a16="http://schemas.microsoft.com/office/drawing/2014/main" id="{4E3A456B-0B0A-1AA2-2022-197DEFB1F02D}"/>
+                  </a:ext>
+                </a:extLst>
+              </p:cNvPr>
+              <p:cNvSpPr txBox="1">
+                <a:spLocks noRot="1" noChangeAspect="1" noMove="1" noResize="1" noEditPoints="1" noAdjustHandles="1" noChangeArrowheads="1" noChangeShapeType="1" noTextEdit="1"/>
+              </p:cNvSpPr>
+              <p:nvPr/>
+            </p:nvSpPr>
+            <p:spPr>
+              <a:xfrm>
+                <a:off x="3421858" y="4193794"/>
+                <a:ext cx="185179" cy="184666"/>
+              </a:xfrm>
+              <a:prstGeom prst="rect">
+                <a:avLst/>
+              </a:prstGeom>
+              <a:blipFill>
+                <a:blip r:embed="rId14"/>
+                <a:stretch>
+                  <a:fillRect l="-18750" r="-6250" b="-20000"/>
+                </a:stretch>
+              </a:blipFill>
+            </p:spPr>
+            <p:txBody>
+              <a:bodyPr/>
+              <a:lstStyle/>
+              <a:p>
+                <a:r>
+                  <a:rPr lang="de-DE">
+                    <a:noFill/>
+                  </a:rPr>
+                  <a:t> </a:t>
+                </a:r>
+              </a:p>
+            </p:txBody>
+          </p:sp>
+        </mc:Fallback>
+      </mc:AlternateContent>
+      <mc:AlternateContent xmlns:mc="http://schemas.openxmlformats.org/markup-compatibility/2006" xmlns:a14="http://schemas.microsoft.com/office/drawing/2010/main">
+        <mc:Choice Requires="a14">
+          <p:sp>
+            <p:nvSpPr>
+              <p:cNvPr id="80" name="Textfeld 79">
+                <a:extLst>
+                  <a:ext uri="{FF2B5EF4-FFF2-40B4-BE49-F238E27FC236}">
+                    <a16:creationId xmlns:a16="http://schemas.microsoft.com/office/drawing/2014/main" id="{1FDE57B4-D3F3-1D42-338A-AB22E5E07D1D}"/>
+                  </a:ext>
+                </a:extLst>
+              </p:cNvPr>
+              <p:cNvSpPr txBox="1"/>
+              <p:nvPr/>
+            </p:nvSpPr>
+            <p:spPr>
+              <a:xfrm>
+                <a:off x="1485383" y="4292108"/>
+                <a:ext cx="518860" cy="184666"/>
+              </a:xfrm>
+              <a:prstGeom prst="rect">
+                <a:avLst/>
+              </a:prstGeom>
+              <a:noFill/>
+            </p:spPr>
+            <p:txBody>
+              <a:bodyPr wrap="none" lIns="0" tIns="0" rIns="0" bIns="0" rtlCol="0">
+                <a:spAutoFit/>
+              </a:bodyPr>
+              <a:lstStyle/>
+              <a:p>
+                <a:pPr/>
+                <a14:m>
+                  <m:oMathPara xmlns:m="http://schemas.openxmlformats.org/officeDocument/2006/math">
+                    <m:oMathParaPr>
+                      <m:jc m:val="centerGroup"/>
+                    </m:oMathParaPr>
+                    <m:oMath xmlns:m="http://schemas.openxmlformats.org/officeDocument/2006/math">
+                      <m:sSub>
+                        <m:sSubPr>
+                          <m:ctrlPr>
+                            <a:rPr lang="de-DE" sz="1200" i="1">
+                              <a:latin typeface="Cambria Math" panose="02040503050406030204" pitchFamily="18" charset="0"/>
+                            </a:rPr>
+                          </m:ctrlPr>
+                        </m:sSubPr>
+                        <m:e>
+                          <m:r>
+                            <a:rPr lang="de-DE" sz="1200" b="0" i="1">
+                              <a:latin typeface="Cambria Math" panose="02040503050406030204" pitchFamily="18" charset="0"/>
+                            </a:rPr>
+                            <m:t>𝐹</m:t>
+                          </m:r>
+                        </m:e>
+                        <m:sub>
+                          <m:r>
+                            <a:rPr lang="de-DE" sz="1200" b="0" i="1">
+                              <a:latin typeface="Cambria Math" panose="02040503050406030204" pitchFamily="18" charset="0"/>
+                            </a:rPr>
+                            <m:t>2</m:t>
+                          </m:r>
+                        </m:sub>
+                      </m:sSub>
+                      <m:r>
+                        <a:rPr lang="de-DE" sz="1200" b="0" i="1">
+                          <a:latin typeface="Cambria Math" panose="02040503050406030204" pitchFamily="18" charset="0"/>
+                        </a:rPr>
+                        <m:t>+</m:t>
+                      </m:r>
+                      <m:sSub>
+                        <m:sSubPr>
+                          <m:ctrlPr>
+                            <a:rPr lang="de-DE" sz="1200" b="0" i="1">
+                              <a:latin typeface="Cambria Math" panose="02040503050406030204" pitchFamily="18" charset="0"/>
+                            </a:rPr>
+                          </m:ctrlPr>
+                        </m:sSubPr>
+                        <m:e>
+                          <m:r>
+                            <a:rPr lang="de-DE" sz="1200" b="0" i="1">
+                              <a:latin typeface="Cambria Math" panose="02040503050406030204" pitchFamily="18" charset="0"/>
+                            </a:rPr>
+                            <m:t>𝐹</m:t>
+                          </m:r>
+                        </m:e>
+                        <m:sub>
+                          <m:r>
+                            <a:rPr lang="de-DE" sz="1200" b="0" i="1">
+                              <a:latin typeface="Cambria Math" panose="02040503050406030204" pitchFamily="18" charset="0"/>
+                            </a:rPr>
+                            <m:t>3</m:t>
+                          </m:r>
+                        </m:sub>
+                      </m:sSub>
+                    </m:oMath>
+                  </m:oMathPara>
+                </a14:m>
+                <a:endParaRPr lang="de-DE" sz="1200"/>
+              </a:p>
+            </p:txBody>
+          </p:sp>
+        </mc:Choice>
+        <mc:Fallback xmlns="">
+          <p:sp>
+            <p:nvSpPr>
+              <p:cNvPr id="80" name="Textfeld 79">
+                <a:extLst>
+                  <a:ext uri="{FF2B5EF4-FFF2-40B4-BE49-F238E27FC236}">
+                    <a16:creationId xmlns:a16="http://schemas.microsoft.com/office/drawing/2014/main" id="{1FDE57B4-D3F3-1D42-338A-AB22E5E07D1D}"/>
+                  </a:ext>
+                </a:extLst>
+              </p:cNvPr>
+              <p:cNvSpPr txBox="1">
+                <a:spLocks noRot="1" noChangeAspect="1" noMove="1" noResize="1" noEditPoints="1" noAdjustHandles="1" noChangeArrowheads="1" noChangeShapeType="1" noTextEdit="1"/>
+              </p:cNvSpPr>
+              <p:nvPr/>
+            </p:nvSpPr>
+            <p:spPr>
+              <a:xfrm>
+                <a:off x="1485383" y="4292108"/>
+                <a:ext cx="518860" cy="184666"/>
+              </a:xfrm>
+              <a:prstGeom prst="rect">
+                <a:avLst/>
+              </a:prstGeom>
+              <a:blipFill>
+                <a:blip r:embed="rId15"/>
+                <a:stretch>
+                  <a:fillRect l="-7317" r="-2439" b="-12500"/>
+                </a:stretch>
+              </a:blipFill>
+            </p:spPr>
+            <p:txBody>
+              <a:bodyPr/>
+              <a:lstStyle/>
+              <a:p>
+                <a:r>
+                  <a:rPr lang="de-DE">
+                    <a:noFill/>
+                  </a:rPr>
+                  <a:t> </a:t>
+                </a:r>
+              </a:p>
+            </p:txBody>
+          </p:sp>
+        </mc:Fallback>
+      </mc:AlternateContent>
+      <mc:AlternateContent xmlns:mc="http://schemas.openxmlformats.org/markup-compatibility/2006" xmlns:a14="http://schemas.microsoft.com/office/drawing/2010/main">
+        <mc:Choice Requires="a14">
+          <p:sp>
+            <p:nvSpPr>
+              <p:cNvPr id="81" name="Textfeld 80">
+                <a:extLst>
+                  <a:ext uri="{FF2B5EF4-FFF2-40B4-BE49-F238E27FC236}">
+                    <a16:creationId xmlns:a16="http://schemas.microsoft.com/office/drawing/2014/main" id="{24AA4D01-7537-A2A3-BE2B-057C9A5F0BCA}"/>
+                  </a:ext>
+                </a:extLst>
+              </p:cNvPr>
+              <p:cNvSpPr txBox="1"/>
+              <p:nvPr/>
+            </p:nvSpPr>
+            <p:spPr>
+              <a:xfrm>
+                <a:off x="2808124" y="4814970"/>
+                <a:ext cx="185179" cy="184666"/>
+              </a:xfrm>
+              <a:prstGeom prst="rect">
+                <a:avLst/>
+              </a:prstGeom>
+              <a:noFill/>
+            </p:spPr>
+            <p:txBody>
+              <a:bodyPr wrap="none" lIns="0" tIns="0" rIns="0" bIns="0" rtlCol="0">
+                <a:spAutoFit/>
+              </a:bodyPr>
+              <a:lstStyle/>
+              <a:p>
+                <a:pPr/>
+                <a14:m>
+                  <m:oMathPara xmlns:m="http://schemas.openxmlformats.org/officeDocument/2006/math">
+                    <m:oMathParaPr>
+                      <m:jc m:val="centerGroup"/>
+                    </m:oMathParaPr>
+                    <m:oMath xmlns:m="http://schemas.openxmlformats.org/officeDocument/2006/math">
+                      <m:sSub>
+                        <m:sSubPr>
+                          <m:ctrlPr>
+                            <a:rPr lang="de-DE" sz="1200" i="1">
+                              <a:latin typeface="Cambria Math" panose="02040503050406030204" pitchFamily="18" charset="0"/>
+                            </a:rPr>
+                          </m:ctrlPr>
+                        </m:sSubPr>
+                        <m:e>
+                          <m:r>
+                            <a:rPr lang="de-DE" sz="1200" b="0" i="1">
+                              <a:latin typeface="Cambria Math" panose="02040503050406030204" pitchFamily="18" charset="0"/>
+                            </a:rPr>
+                            <m:t>𝐹</m:t>
+                          </m:r>
+                        </m:e>
+                        <m:sub>
+                          <m:r>
+                            <a:rPr lang="de-DE" sz="1200" b="0" i="1">
+                              <a:latin typeface="Cambria Math" panose="02040503050406030204" pitchFamily="18" charset="0"/>
+                            </a:rPr>
+                            <m:t>2</m:t>
+                          </m:r>
+                        </m:sub>
+                      </m:sSub>
+                    </m:oMath>
+                  </m:oMathPara>
+                </a14:m>
+                <a:endParaRPr lang="de-DE" sz="1200"/>
+              </a:p>
+            </p:txBody>
+          </p:sp>
+        </mc:Choice>
+        <mc:Fallback xmlns="">
+          <p:sp>
+            <p:nvSpPr>
+              <p:cNvPr id="81" name="Textfeld 80">
+                <a:extLst>
+                  <a:ext uri="{FF2B5EF4-FFF2-40B4-BE49-F238E27FC236}">
+                    <a16:creationId xmlns:a16="http://schemas.microsoft.com/office/drawing/2014/main" id="{24AA4D01-7537-A2A3-BE2B-057C9A5F0BCA}"/>
+                  </a:ext>
+                </a:extLst>
+              </p:cNvPr>
+              <p:cNvSpPr txBox="1">
+                <a:spLocks noRot="1" noChangeAspect="1" noMove="1" noResize="1" noEditPoints="1" noAdjustHandles="1" noChangeArrowheads="1" noChangeShapeType="1" noTextEdit="1"/>
+              </p:cNvSpPr>
+              <p:nvPr/>
+            </p:nvSpPr>
+            <p:spPr>
+              <a:xfrm>
+                <a:off x="2808124" y="4814970"/>
+                <a:ext cx="185179" cy="184666"/>
+              </a:xfrm>
+              <a:prstGeom prst="rect">
+                <a:avLst/>
+              </a:prstGeom>
+              <a:blipFill>
+                <a:blip r:embed="rId16"/>
+                <a:stretch>
+                  <a:fillRect l="-20000" r="-13333" b="-13333"/>
+                </a:stretch>
+              </a:blipFill>
+            </p:spPr>
+            <p:txBody>
+              <a:bodyPr/>
+              <a:lstStyle/>
+              <a:p>
+                <a:r>
+                  <a:rPr lang="de-DE">
+                    <a:noFill/>
+                  </a:rPr>
+                  <a:t> </a:t>
+                </a:r>
+              </a:p>
+            </p:txBody>
+          </p:sp>
+        </mc:Fallback>
+      </mc:AlternateContent>
+      <mc:AlternateContent xmlns:mc="http://schemas.openxmlformats.org/markup-compatibility/2006" xmlns:a14="http://schemas.microsoft.com/office/drawing/2010/main">
+        <mc:Choice Requires="a14">
+          <p:sp>
+            <p:nvSpPr>
+              <p:cNvPr id="82" name="Textfeld 81">
+                <a:extLst>
+                  <a:ext uri="{FF2B5EF4-FFF2-40B4-BE49-F238E27FC236}">
+                    <a16:creationId xmlns:a16="http://schemas.microsoft.com/office/drawing/2014/main" id="{91B9618C-A0A5-C1DD-724E-2FF36D0E245C}"/>
+                  </a:ext>
+                </a:extLst>
+              </p:cNvPr>
+              <p:cNvSpPr txBox="1"/>
+              <p:nvPr/>
+            </p:nvSpPr>
+            <p:spPr>
+              <a:xfrm>
+                <a:off x="338920" y="4729337"/>
+                <a:ext cx="515269" cy="184666"/>
+              </a:xfrm>
+              <a:prstGeom prst="rect">
+                <a:avLst/>
+              </a:prstGeom>
+              <a:noFill/>
+            </p:spPr>
+            <p:txBody>
+              <a:bodyPr wrap="none" lIns="0" tIns="0" rIns="0" bIns="0" rtlCol="0">
+                <a:spAutoFit/>
+              </a:bodyPr>
+              <a:lstStyle/>
+              <a:p>
+                <a:pPr/>
+                <a14:m>
+                  <m:oMathPara xmlns:m="http://schemas.openxmlformats.org/officeDocument/2006/math">
+                    <m:oMathParaPr>
+                      <m:jc m:val="centerGroup"/>
+                    </m:oMathParaPr>
+                    <m:oMath xmlns:m="http://schemas.openxmlformats.org/officeDocument/2006/math">
+                      <m:sSub>
+                        <m:sSubPr>
+                          <m:ctrlPr>
+                            <a:rPr lang="de-DE" sz="1200" i="1">
+                              <a:latin typeface="Cambria Math" panose="02040503050406030204" pitchFamily="18" charset="0"/>
+                            </a:rPr>
+                          </m:ctrlPr>
+                        </m:sSubPr>
+                        <m:e>
+                          <m:r>
+                            <a:rPr lang="de-DE" sz="1200" b="0" i="1">
+                              <a:latin typeface="Cambria Math" panose="02040503050406030204" pitchFamily="18" charset="0"/>
+                            </a:rPr>
+                            <m:t>𝐹</m:t>
+                          </m:r>
+                        </m:e>
+                        <m:sub>
+                          <m:r>
+                            <a:rPr lang="de-DE" sz="1200" b="0" i="1">
+                              <a:latin typeface="Cambria Math" panose="02040503050406030204" pitchFamily="18" charset="0"/>
+                            </a:rPr>
+                            <m:t>1</m:t>
+                          </m:r>
+                        </m:sub>
+                      </m:sSub>
+                      <m:r>
+                        <a:rPr lang="de-DE" sz="1200" b="0" i="1">
+                          <a:latin typeface="Cambria Math" panose="02040503050406030204" pitchFamily="18" charset="0"/>
+                        </a:rPr>
+                        <m:t>+</m:t>
+                      </m:r>
+                      <m:sSub>
+                        <m:sSubPr>
+                          <m:ctrlPr>
+                            <a:rPr lang="de-DE" sz="1200" b="0" i="1">
+                              <a:latin typeface="Cambria Math" panose="02040503050406030204" pitchFamily="18" charset="0"/>
+                            </a:rPr>
+                          </m:ctrlPr>
+                        </m:sSubPr>
+                        <m:e>
+                          <m:r>
+                            <a:rPr lang="de-DE" sz="1200" b="0" i="1">
+                              <a:latin typeface="Cambria Math" panose="02040503050406030204" pitchFamily="18" charset="0"/>
+                            </a:rPr>
+                            <m:t>𝐹</m:t>
+                          </m:r>
+                        </m:e>
+                        <m:sub>
+                          <m:r>
+                            <a:rPr lang="de-DE" sz="1200" b="0" i="1">
+                              <a:latin typeface="Cambria Math" panose="02040503050406030204" pitchFamily="18" charset="0"/>
+                            </a:rPr>
+                            <m:t>2</m:t>
+                          </m:r>
+                        </m:sub>
+                      </m:sSub>
+                    </m:oMath>
+                  </m:oMathPara>
+                </a14:m>
+                <a:endParaRPr lang="de-DE" sz="1200"/>
+              </a:p>
+            </p:txBody>
+          </p:sp>
+        </mc:Choice>
+        <mc:Fallback xmlns="">
+          <p:sp>
+            <p:nvSpPr>
+              <p:cNvPr id="82" name="Textfeld 81">
+                <a:extLst>
+                  <a:ext uri="{FF2B5EF4-FFF2-40B4-BE49-F238E27FC236}">
+                    <a16:creationId xmlns:a16="http://schemas.microsoft.com/office/drawing/2014/main" id="{91B9618C-A0A5-C1DD-724E-2FF36D0E245C}"/>
+                  </a:ext>
+                </a:extLst>
+              </p:cNvPr>
+              <p:cNvSpPr txBox="1">
+                <a:spLocks noRot="1" noChangeAspect="1" noMove="1" noResize="1" noEditPoints="1" noAdjustHandles="1" noChangeArrowheads="1" noChangeShapeType="1" noTextEdit="1"/>
+              </p:cNvSpPr>
+              <p:nvPr/>
+            </p:nvSpPr>
+            <p:spPr>
+              <a:xfrm>
+                <a:off x="338920" y="4729337"/>
+                <a:ext cx="515269" cy="184666"/>
+              </a:xfrm>
+              <a:prstGeom prst="rect">
+                <a:avLst/>
+              </a:prstGeom>
+              <a:blipFill>
+                <a:blip r:embed="rId17"/>
+                <a:stretch>
+                  <a:fillRect l="-4762" r="-2381" b="-20000"/>
+                </a:stretch>
+              </a:blipFill>
+            </p:spPr>
+            <p:txBody>
+              <a:bodyPr/>
+              <a:lstStyle/>
+              <a:p>
+                <a:r>
+                  <a:rPr lang="de-DE">
+                    <a:noFill/>
+                  </a:rPr>
+                  <a:t> </a:t>
+                </a:r>
+              </a:p>
+            </p:txBody>
+          </p:sp>
+        </mc:Fallback>
+      </mc:AlternateContent>
+      <mc:AlternateContent xmlns:mc="http://schemas.openxmlformats.org/markup-compatibility/2006" xmlns:a14="http://schemas.microsoft.com/office/drawing/2010/main">
+        <mc:Choice Requires="a14">
+          <p:sp>
+            <p:nvSpPr>
+              <p:cNvPr id="83" name="Textfeld 82">
+                <a:extLst>
+                  <a:ext uri="{FF2B5EF4-FFF2-40B4-BE49-F238E27FC236}">
+                    <a16:creationId xmlns:a16="http://schemas.microsoft.com/office/drawing/2014/main" id="{67F02103-5360-36F2-B8A0-757F7A20ED39}"/>
+                  </a:ext>
+                </a:extLst>
+              </p:cNvPr>
+              <p:cNvSpPr txBox="1"/>
+              <p:nvPr/>
+            </p:nvSpPr>
+            <p:spPr>
+              <a:xfrm>
+                <a:off x="1923569" y="5282918"/>
+                <a:ext cx="181588" cy="184666"/>
+              </a:xfrm>
+              <a:prstGeom prst="rect">
+                <a:avLst/>
+              </a:prstGeom>
+              <a:noFill/>
+            </p:spPr>
+            <p:txBody>
+              <a:bodyPr wrap="none" lIns="0" tIns="0" rIns="0" bIns="0" rtlCol="0">
+                <a:spAutoFit/>
+              </a:bodyPr>
+              <a:lstStyle/>
+              <a:p>
+                <a:pPr/>
+                <a14:m>
+                  <m:oMathPara xmlns:m="http://schemas.openxmlformats.org/officeDocument/2006/math">
+                    <m:oMathParaPr>
+                      <m:jc m:val="centerGroup"/>
+                    </m:oMathParaPr>
+                    <m:oMath xmlns:m="http://schemas.openxmlformats.org/officeDocument/2006/math">
+                      <m:sSub>
+                        <m:sSubPr>
+                          <m:ctrlPr>
+                            <a:rPr lang="de-DE" sz="1200" i="1">
+                              <a:latin typeface="Cambria Math" panose="02040503050406030204" pitchFamily="18" charset="0"/>
+                            </a:rPr>
+                          </m:ctrlPr>
+                        </m:sSubPr>
+                        <m:e>
+                          <m:r>
+                            <a:rPr lang="de-DE" sz="1200" b="0" i="1">
+                              <a:latin typeface="Cambria Math" panose="02040503050406030204" pitchFamily="18" charset="0"/>
+                            </a:rPr>
+                            <m:t>𝐹</m:t>
+                          </m:r>
+                        </m:e>
+                        <m:sub>
+                          <m:r>
+                            <a:rPr lang="de-DE" sz="1200" b="0" i="1">
+                              <a:latin typeface="Cambria Math" panose="02040503050406030204" pitchFamily="18" charset="0"/>
+                            </a:rPr>
+                            <m:t>1</m:t>
+                          </m:r>
+                        </m:sub>
+                      </m:sSub>
+                    </m:oMath>
+                  </m:oMathPara>
+                </a14:m>
+                <a:endParaRPr lang="de-DE" sz="1200"/>
+              </a:p>
+            </p:txBody>
+          </p:sp>
+        </mc:Choice>
+        <mc:Fallback xmlns="">
+          <p:sp>
+            <p:nvSpPr>
+              <p:cNvPr id="83" name="Textfeld 82">
+                <a:extLst>
+                  <a:ext uri="{FF2B5EF4-FFF2-40B4-BE49-F238E27FC236}">
+                    <a16:creationId xmlns:a16="http://schemas.microsoft.com/office/drawing/2014/main" id="{67F02103-5360-36F2-B8A0-757F7A20ED39}"/>
+                  </a:ext>
+                </a:extLst>
+              </p:cNvPr>
+              <p:cNvSpPr txBox="1">
+                <a:spLocks noRot="1" noChangeAspect="1" noMove="1" noResize="1" noEditPoints="1" noAdjustHandles="1" noChangeArrowheads="1" noChangeShapeType="1" noTextEdit="1"/>
+              </p:cNvSpPr>
+              <p:nvPr/>
+            </p:nvSpPr>
+            <p:spPr>
+              <a:xfrm>
+                <a:off x="1923569" y="5282918"/>
+                <a:ext cx="181588" cy="184666"/>
+              </a:xfrm>
+              <a:prstGeom prst="rect">
+                <a:avLst/>
+              </a:prstGeom>
+              <a:blipFill>
+                <a:blip r:embed="rId18"/>
+                <a:stretch>
+                  <a:fillRect l="-20000" r="-13333" b="-13333"/>
+                </a:stretch>
+              </a:blipFill>
+            </p:spPr>
+            <p:txBody>
+              <a:bodyPr/>
+              <a:lstStyle/>
+              <a:p>
+                <a:r>
+                  <a:rPr lang="de-DE">
+                    <a:noFill/>
+                  </a:rPr>
+                  <a:t> </a:t>
+                </a:r>
+              </a:p>
+            </p:txBody>
+          </p:sp>
+        </mc:Fallback>
+      </mc:AlternateContent>
+      <p:cxnSp>
+        <p:nvCxnSpPr>
+          <p:cNvPr id="85" name="Gerade Verbindung mit Pfeil 84">
+            <a:extLst>
+              <a:ext uri="{FF2B5EF4-FFF2-40B4-BE49-F238E27FC236}">
+                <a16:creationId xmlns:a16="http://schemas.microsoft.com/office/drawing/2014/main" id="{A9523118-3A2D-989D-20AB-B433EFCB87A1}"/>
+              </a:ext>
+            </a:extLst>
+          </p:cNvPr>
+          <p:cNvCxnSpPr/>
+          <p:nvPr/>
+        </p:nvCxnSpPr>
+        <p:spPr>
+          <a:xfrm>
+            <a:off x="4164306" y="5108940"/>
+            <a:ext cx="0" cy="246993"/>
+          </a:xfrm>
+          <a:prstGeom prst="straightConnector1">
+            <a:avLst/>
+          </a:prstGeom>
+          <a:ln>
+            <a:tailEnd type="triangle"/>
+          </a:ln>
+        </p:spPr>
+        <p:style>
+          <a:lnRef idx="1">
+            <a:schemeClr val="accent1"/>
+          </a:lnRef>
+          <a:fillRef idx="0">
+            <a:schemeClr val="accent1"/>
+          </a:fillRef>
+          <a:effectRef idx="0">
+            <a:schemeClr val="accent1"/>
+          </a:effectRef>
+          <a:fontRef idx="minor">
+            <a:schemeClr val="tx1"/>
+          </a:fontRef>
+        </p:style>
+      </p:cxnSp>
+      <p:cxnSp>
+        <p:nvCxnSpPr>
+          <p:cNvPr id="86" name="Gerade Verbindung mit Pfeil 85">
+            <a:extLst>
+              <a:ext uri="{FF2B5EF4-FFF2-40B4-BE49-F238E27FC236}">
+                <a16:creationId xmlns:a16="http://schemas.microsoft.com/office/drawing/2014/main" id="{0992AB23-3FAA-F253-2370-1111D719F3FD}"/>
+              </a:ext>
+            </a:extLst>
+          </p:cNvPr>
+          <p:cNvCxnSpPr/>
+          <p:nvPr/>
+        </p:nvCxnSpPr>
+        <p:spPr>
+          <a:xfrm>
+            <a:off x="4472154" y="5114140"/>
+            <a:ext cx="0" cy="246993"/>
+          </a:xfrm>
+          <a:prstGeom prst="straightConnector1">
+            <a:avLst/>
+          </a:prstGeom>
+          <a:ln>
+            <a:tailEnd type="triangle"/>
+          </a:ln>
+        </p:spPr>
+        <p:style>
+          <a:lnRef idx="1">
+            <a:schemeClr val="accent1"/>
+          </a:lnRef>
+          <a:fillRef idx="0">
+            <a:schemeClr val="accent1"/>
+          </a:fillRef>
+          <a:effectRef idx="0">
+            <a:schemeClr val="accent1"/>
+          </a:effectRef>
+          <a:fontRef idx="minor">
+            <a:schemeClr val="tx1"/>
+          </a:fontRef>
+        </p:style>
+      </p:cxnSp>
+      <p:cxnSp>
+        <p:nvCxnSpPr>
+          <p:cNvPr id="87" name="Gerade Verbindung mit Pfeil 86">
+            <a:extLst>
+              <a:ext uri="{FF2B5EF4-FFF2-40B4-BE49-F238E27FC236}">
+                <a16:creationId xmlns:a16="http://schemas.microsoft.com/office/drawing/2014/main" id="{CFEC6B5F-FCEE-938B-B45C-3493DB60419B}"/>
+              </a:ext>
+            </a:extLst>
+          </p:cNvPr>
+          <p:cNvCxnSpPr/>
+          <p:nvPr/>
+        </p:nvCxnSpPr>
+        <p:spPr>
+          <a:xfrm>
+            <a:off x="4761714" y="5110196"/>
+            <a:ext cx="0" cy="246993"/>
+          </a:xfrm>
+          <a:prstGeom prst="straightConnector1">
+            <a:avLst/>
+          </a:prstGeom>
+          <a:ln>
+            <a:tailEnd type="triangle"/>
+          </a:ln>
+        </p:spPr>
+        <p:style>
+          <a:lnRef idx="1">
+            <a:schemeClr val="accent1"/>
+          </a:lnRef>
+          <a:fillRef idx="0">
+            <a:schemeClr val="accent1"/>
+          </a:fillRef>
+          <a:effectRef idx="0">
+            <a:schemeClr val="accent1"/>
+          </a:effectRef>
+          <a:fontRef idx="minor">
+            <a:schemeClr val="tx1"/>
+          </a:fontRef>
+        </p:style>
+      </p:cxnSp>
+      <p:cxnSp>
+        <p:nvCxnSpPr>
+          <p:cNvPr id="88" name="Gerade Verbindung mit Pfeil 87">
+            <a:extLst>
+              <a:ext uri="{FF2B5EF4-FFF2-40B4-BE49-F238E27FC236}">
+                <a16:creationId xmlns:a16="http://schemas.microsoft.com/office/drawing/2014/main" id="{FC3AD338-0FA7-38BA-8797-D3BD866BDDB1}"/>
+              </a:ext>
+            </a:extLst>
+          </p:cNvPr>
+          <p:cNvCxnSpPr/>
+          <p:nvPr/>
+        </p:nvCxnSpPr>
+        <p:spPr>
+          <a:xfrm>
+            <a:off x="5069562" y="5124540"/>
+            <a:ext cx="0" cy="246993"/>
+          </a:xfrm>
+          <a:prstGeom prst="straightConnector1">
+            <a:avLst/>
+          </a:prstGeom>
+          <a:ln>
+            <a:tailEnd type="triangle"/>
+          </a:ln>
+        </p:spPr>
+        <p:style>
+          <a:lnRef idx="1">
+            <a:schemeClr val="accent1"/>
+          </a:lnRef>
+          <a:fillRef idx="0">
+            <a:schemeClr val="accent1"/>
+          </a:fillRef>
+          <a:effectRef idx="0">
+            <a:schemeClr val="accent1"/>
+          </a:effectRef>
+          <a:fontRef idx="minor">
+            <a:schemeClr val="tx1"/>
+          </a:fontRef>
+        </p:style>
+      </p:cxnSp>
+      <mc:AlternateContent xmlns:mc="http://schemas.openxmlformats.org/markup-compatibility/2006" xmlns:a14="http://schemas.microsoft.com/office/drawing/2010/main">
+        <mc:Choice Requires="a14">
+          <p:sp>
+            <p:nvSpPr>
+              <p:cNvPr id="89" name="Textfeld 88">
+                <a:extLst>
+                  <a:ext uri="{FF2B5EF4-FFF2-40B4-BE49-F238E27FC236}">
+                    <a16:creationId xmlns:a16="http://schemas.microsoft.com/office/drawing/2014/main" id="{F5B8BFA5-4DE1-460F-CD11-26E78BA8CAD0}"/>
+                  </a:ext>
+                </a:extLst>
+              </p:cNvPr>
+              <p:cNvSpPr txBox="1"/>
+              <p:nvPr/>
+            </p:nvSpPr>
+            <p:spPr>
+              <a:xfrm>
+                <a:off x="4078236" y="4906732"/>
+                <a:ext cx="181588" cy="184666"/>
+              </a:xfrm>
+              <a:prstGeom prst="rect">
+                <a:avLst/>
+              </a:prstGeom>
+              <a:noFill/>
+            </p:spPr>
+            <p:txBody>
+              <a:bodyPr wrap="none" lIns="0" tIns="0" rIns="0" bIns="0" rtlCol="0">
+                <a:spAutoFit/>
+              </a:bodyPr>
+              <a:lstStyle/>
+              <a:p>
+                <a:pPr/>
+                <a14:m>
+                  <m:oMathPara xmlns:m="http://schemas.openxmlformats.org/officeDocument/2006/math">
+                    <m:oMathParaPr>
+                      <m:jc m:val="centerGroup"/>
+                    </m:oMathParaPr>
+                    <m:oMath xmlns:m="http://schemas.openxmlformats.org/officeDocument/2006/math">
+                      <m:sSub>
+                        <m:sSubPr>
+                          <m:ctrlPr>
+                            <a:rPr lang="de-DE" sz="1200" i="1">
+                              <a:latin typeface="Cambria Math" panose="02040503050406030204" pitchFamily="18" charset="0"/>
+                            </a:rPr>
+                          </m:ctrlPr>
+                        </m:sSubPr>
+                        <m:e>
+                          <m:r>
+                            <a:rPr lang="de-DE" sz="1200" b="0" i="1">
+                              <a:latin typeface="Cambria Math" panose="02040503050406030204" pitchFamily="18" charset="0"/>
+                            </a:rPr>
+                            <m:t>𝐹</m:t>
+                          </m:r>
+                        </m:e>
+                        <m:sub>
+                          <m:r>
+                            <a:rPr lang="de-DE" sz="1200" b="0" i="1">
+                              <a:latin typeface="Cambria Math" panose="02040503050406030204" pitchFamily="18" charset="0"/>
+                            </a:rPr>
+                            <m:t>1</m:t>
+                          </m:r>
+                        </m:sub>
+                      </m:sSub>
+                    </m:oMath>
+                  </m:oMathPara>
+                </a14:m>
+                <a:endParaRPr lang="de-DE" sz="1200"/>
+              </a:p>
+            </p:txBody>
+          </p:sp>
+        </mc:Choice>
+        <mc:Fallback xmlns="">
+          <p:sp>
+            <p:nvSpPr>
+              <p:cNvPr id="89" name="Textfeld 88">
+                <a:extLst>
+                  <a:ext uri="{FF2B5EF4-FFF2-40B4-BE49-F238E27FC236}">
+                    <a16:creationId xmlns:a16="http://schemas.microsoft.com/office/drawing/2014/main" id="{F5B8BFA5-4DE1-460F-CD11-26E78BA8CAD0}"/>
+                  </a:ext>
+                </a:extLst>
+              </p:cNvPr>
+              <p:cNvSpPr txBox="1">
+                <a:spLocks noRot="1" noChangeAspect="1" noMove="1" noResize="1" noEditPoints="1" noAdjustHandles="1" noChangeArrowheads="1" noChangeShapeType="1" noTextEdit="1"/>
+              </p:cNvSpPr>
+              <p:nvPr/>
+            </p:nvSpPr>
+            <p:spPr>
+              <a:xfrm>
+                <a:off x="4078236" y="4906732"/>
+                <a:ext cx="181588" cy="184666"/>
+              </a:xfrm>
+              <a:prstGeom prst="rect">
+                <a:avLst/>
+              </a:prstGeom>
+              <a:blipFill>
+                <a:blip r:embed="rId19"/>
+                <a:stretch>
+                  <a:fillRect l="-20000" r="-6667" b="-20000"/>
+                </a:stretch>
+              </a:blipFill>
+            </p:spPr>
+            <p:txBody>
+              <a:bodyPr/>
+              <a:lstStyle/>
+              <a:p>
+                <a:r>
+                  <a:rPr lang="de-DE">
+                    <a:noFill/>
+                  </a:rPr>
+                  <a:t> </a:t>
+                </a:r>
+              </a:p>
+            </p:txBody>
+          </p:sp>
+        </mc:Fallback>
+      </mc:AlternateContent>
+      <mc:AlternateContent xmlns:mc="http://schemas.openxmlformats.org/markup-compatibility/2006" xmlns:a14="http://schemas.microsoft.com/office/drawing/2010/main">
+        <mc:Choice Requires="a14">
+          <p:sp>
+            <p:nvSpPr>
+              <p:cNvPr id="90" name="Textfeld 89">
+                <a:extLst>
+                  <a:ext uri="{FF2B5EF4-FFF2-40B4-BE49-F238E27FC236}">
+                    <a16:creationId xmlns:a16="http://schemas.microsoft.com/office/drawing/2014/main" id="{1C4EF28E-5690-2902-77B4-883D7C182017}"/>
+                  </a:ext>
+                </a:extLst>
+              </p:cNvPr>
+              <p:cNvSpPr txBox="1"/>
+              <p:nvPr/>
+            </p:nvSpPr>
+            <p:spPr>
+              <a:xfrm>
+                <a:off x="4382749" y="4911745"/>
+                <a:ext cx="185179" cy="184666"/>
+              </a:xfrm>
+              <a:prstGeom prst="rect">
+                <a:avLst/>
+              </a:prstGeom>
+              <a:noFill/>
+            </p:spPr>
+            <p:txBody>
+              <a:bodyPr wrap="none" lIns="0" tIns="0" rIns="0" bIns="0" rtlCol="0">
+                <a:spAutoFit/>
+              </a:bodyPr>
+              <a:lstStyle/>
+              <a:p>
+                <a:pPr/>
+                <a14:m>
+                  <m:oMathPara xmlns:m="http://schemas.openxmlformats.org/officeDocument/2006/math">
+                    <m:oMathParaPr>
+                      <m:jc m:val="centerGroup"/>
+                    </m:oMathParaPr>
+                    <m:oMath xmlns:m="http://schemas.openxmlformats.org/officeDocument/2006/math">
+                      <m:sSub>
+                        <m:sSubPr>
+                          <m:ctrlPr>
+                            <a:rPr lang="de-DE" sz="1200" i="1">
+                              <a:latin typeface="Cambria Math" panose="02040503050406030204" pitchFamily="18" charset="0"/>
+                            </a:rPr>
+                          </m:ctrlPr>
+                        </m:sSubPr>
+                        <m:e>
+                          <m:r>
+                            <a:rPr lang="de-DE" sz="1200" b="0" i="1">
+                              <a:latin typeface="Cambria Math" panose="02040503050406030204" pitchFamily="18" charset="0"/>
+                            </a:rPr>
+                            <m:t>𝐹</m:t>
+                          </m:r>
+                        </m:e>
+                        <m:sub>
+                          <m:r>
+                            <a:rPr lang="de-DE" sz="1200" b="0" i="1">
+                              <a:latin typeface="Cambria Math" panose="02040503050406030204" pitchFamily="18" charset="0"/>
+                            </a:rPr>
+                            <m:t>2</m:t>
+                          </m:r>
+                        </m:sub>
+                      </m:sSub>
+                    </m:oMath>
+                  </m:oMathPara>
+                </a14:m>
+                <a:endParaRPr lang="de-DE" sz="1200"/>
+              </a:p>
+            </p:txBody>
+          </p:sp>
+        </mc:Choice>
+        <mc:Fallback xmlns="">
+          <p:sp>
+            <p:nvSpPr>
+              <p:cNvPr id="90" name="Textfeld 89">
+                <a:extLst>
+                  <a:ext uri="{FF2B5EF4-FFF2-40B4-BE49-F238E27FC236}">
+                    <a16:creationId xmlns:a16="http://schemas.microsoft.com/office/drawing/2014/main" id="{1C4EF28E-5690-2902-77B4-883D7C182017}"/>
+                  </a:ext>
+                </a:extLst>
+              </p:cNvPr>
+              <p:cNvSpPr txBox="1">
+                <a:spLocks noRot="1" noChangeAspect="1" noMove="1" noResize="1" noEditPoints="1" noAdjustHandles="1" noChangeArrowheads="1" noChangeShapeType="1" noTextEdit="1"/>
+              </p:cNvSpPr>
+              <p:nvPr/>
+            </p:nvSpPr>
+            <p:spPr>
+              <a:xfrm>
+                <a:off x="4382749" y="4911745"/>
+                <a:ext cx="185179" cy="184666"/>
+              </a:xfrm>
+              <a:prstGeom prst="rect">
+                <a:avLst/>
+              </a:prstGeom>
+              <a:blipFill>
+                <a:blip r:embed="rId20"/>
+                <a:stretch>
+                  <a:fillRect l="-20000" r="-6667" b="-12500"/>
+                </a:stretch>
+              </a:blipFill>
+            </p:spPr>
+            <p:txBody>
+              <a:bodyPr/>
+              <a:lstStyle/>
+              <a:p>
+                <a:r>
+                  <a:rPr lang="de-DE">
+                    <a:noFill/>
+                  </a:rPr>
+                  <a:t> </a:t>
+                </a:r>
+              </a:p>
+            </p:txBody>
+          </p:sp>
+        </mc:Fallback>
+      </mc:AlternateContent>
+      <mc:AlternateContent xmlns:mc="http://schemas.openxmlformats.org/markup-compatibility/2006" xmlns:a14="http://schemas.microsoft.com/office/drawing/2010/main">
+        <mc:Choice Requires="a14">
+          <p:sp>
+            <p:nvSpPr>
+              <p:cNvPr id="91" name="Textfeld 90">
+                <a:extLst>
+                  <a:ext uri="{FF2B5EF4-FFF2-40B4-BE49-F238E27FC236}">
+                    <a16:creationId xmlns:a16="http://schemas.microsoft.com/office/drawing/2014/main" id="{52E46462-E137-ABB7-8690-B0FB4ABA5605}"/>
+                  </a:ext>
+                </a:extLst>
+              </p:cNvPr>
+              <p:cNvSpPr txBox="1"/>
+              <p:nvPr/>
+            </p:nvSpPr>
+            <p:spPr>
+              <a:xfrm>
+                <a:off x="4687262" y="4907614"/>
+                <a:ext cx="185179" cy="184666"/>
+              </a:xfrm>
+              <a:prstGeom prst="rect">
+                <a:avLst/>
+              </a:prstGeom>
+              <a:noFill/>
+            </p:spPr>
+            <p:txBody>
+              <a:bodyPr wrap="none" lIns="0" tIns="0" rIns="0" bIns="0" rtlCol="0">
+                <a:spAutoFit/>
+              </a:bodyPr>
+              <a:lstStyle/>
+              <a:p>
+                <a:pPr/>
+                <a14:m>
+                  <m:oMathPara xmlns:m="http://schemas.openxmlformats.org/officeDocument/2006/math">
+                    <m:oMathParaPr>
+                      <m:jc m:val="centerGroup"/>
+                    </m:oMathParaPr>
+                    <m:oMath xmlns:m="http://schemas.openxmlformats.org/officeDocument/2006/math">
+                      <m:sSub>
+                        <m:sSubPr>
+                          <m:ctrlPr>
+                            <a:rPr lang="de-DE" sz="1200" i="1">
+                              <a:latin typeface="Cambria Math" panose="02040503050406030204" pitchFamily="18" charset="0"/>
+                            </a:rPr>
+                          </m:ctrlPr>
+                        </m:sSubPr>
+                        <m:e>
+                          <m:r>
+                            <a:rPr lang="de-DE" sz="1200" b="0" i="1">
+                              <a:latin typeface="Cambria Math" panose="02040503050406030204" pitchFamily="18" charset="0"/>
+                            </a:rPr>
+                            <m:t>𝐹</m:t>
+                          </m:r>
+                        </m:e>
+                        <m:sub>
+                          <m:r>
+                            <a:rPr lang="de-DE" sz="1200" b="0" i="1">
+                              <a:latin typeface="Cambria Math" panose="02040503050406030204" pitchFamily="18" charset="0"/>
+                            </a:rPr>
+                            <m:t>3</m:t>
+                          </m:r>
+                        </m:sub>
+                      </m:sSub>
+                    </m:oMath>
+                  </m:oMathPara>
+                </a14:m>
+                <a:endParaRPr lang="de-DE" sz="1200"/>
+              </a:p>
+            </p:txBody>
+          </p:sp>
+        </mc:Choice>
+        <mc:Fallback xmlns="">
+          <p:sp>
+            <p:nvSpPr>
+              <p:cNvPr id="91" name="Textfeld 90">
+                <a:extLst>
+                  <a:ext uri="{FF2B5EF4-FFF2-40B4-BE49-F238E27FC236}">
+                    <a16:creationId xmlns:a16="http://schemas.microsoft.com/office/drawing/2014/main" id="{52E46462-E137-ABB7-8690-B0FB4ABA5605}"/>
+                  </a:ext>
+                </a:extLst>
+              </p:cNvPr>
+              <p:cNvSpPr txBox="1">
+                <a:spLocks noRot="1" noChangeAspect="1" noMove="1" noResize="1" noEditPoints="1" noAdjustHandles="1" noChangeArrowheads="1" noChangeShapeType="1" noTextEdit="1"/>
+              </p:cNvSpPr>
+              <p:nvPr/>
+            </p:nvSpPr>
+            <p:spPr>
+              <a:xfrm>
+                <a:off x="4687262" y="4907614"/>
+                <a:ext cx="185179" cy="184666"/>
+              </a:xfrm>
+              <a:prstGeom prst="rect">
+                <a:avLst/>
+              </a:prstGeom>
+              <a:blipFill>
+                <a:blip r:embed="rId21"/>
+                <a:stretch>
+                  <a:fillRect l="-20000" r="-6667" b="-20000"/>
+                </a:stretch>
+              </a:blipFill>
+            </p:spPr>
+            <p:txBody>
+              <a:bodyPr/>
+              <a:lstStyle/>
+              <a:p>
+                <a:r>
+                  <a:rPr lang="de-DE">
+                    <a:noFill/>
+                  </a:rPr>
+                  <a:t> </a:t>
+                </a:r>
+              </a:p>
+            </p:txBody>
+          </p:sp>
+        </mc:Fallback>
+      </mc:AlternateContent>
+      <mc:AlternateContent xmlns:mc="http://schemas.openxmlformats.org/markup-compatibility/2006" xmlns:a14="http://schemas.microsoft.com/office/drawing/2010/main">
+        <mc:Choice Requires="a14">
+          <p:sp>
+            <p:nvSpPr>
+              <p:cNvPr id="92" name="Textfeld 91">
+                <a:extLst>
+                  <a:ext uri="{FF2B5EF4-FFF2-40B4-BE49-F238E27FC236}">
+                    <a16:creationId xmlns:a16="http://schemas.microsoft.com/office/drawing/2014/main" id="{0EDE3FF4-8DF0-D9A4-A5E1-D01767D90568}"/>
+                  </a:ext>
+                </a:extLst>
+              </p:cNvPr>
+              <p:cNvSpPr txBox="1"/>
+              <p:nvPr/>
+            </p:nvSpPr>
+            <p:spPr>
+              <a:xfrm>
+                <a:off x="4991775" y="4903483"/>
+                <a:ext cx="178574" cy="184666"/>
+              </a:xfrm>
+              <a:prstGeom prst="rect">
+                <a:avLst/>
+              </a:prstGeom>
+              <a:noFill/>
+            </p:spPr>
+            <p:txBody>
+              <a:bodyPr wrap="none" lIns="0" tIns="0" rIns="0" bIns="0" rtlCol="0">
+                <a:spAutoFit/>
+              </a:bodyPr>
+              <a:lstStyle/>
+              <a:p>
+                <a:pPr/>
+                <a14:m>
+                  <m:oMathPara xmlns:m="http://schemas.openxmlformats.org/officeDocument/2006/math">
+                    <m:oMathParaPr>
+                      <m:jc m:val="centerGroup"/>
+                    </m:oMathParaPr>
+                    <m:oMath xmlns:m="http://schemas.openxmlformats.org/officeDocument/2006/math">
+                      <m:sSub>
+                        <m:sSubPr>
+                          <m:ctrlPr>
+                            <a:rPr lang="de-DE" sz="1200" i="1">
+                              <a:latin typeface="Cambria Math" panose="02040503050406030204" pitchFamily="18" charset="0"/>
+                            </a:rPr>
+                          </m:ctrlPr>
+                        </m:sSubPr>
+                        <m:e>
+                          <m:r>
+                            <a:rPr lang="de-DE" sz="1200" b="0" i="1">
+                              <a:latin typeface="Cambria Math" panose="02040503050406030204" pitchFamily="18" charset="0"/>
+                            </a:rPr>
+                            <m:t>𝐹</m:t>
+                          </m:r>
+                        </m:e>
+                        <m:sub>
+                          <m:r>
+                            <a:rPr lang="de-DE" sz="1200" b="0" i="1">
+                              <a:latin typeface="Cambria Math" panose="02040503050406030204" pitchFamily="18" charset="0"/>
+                            </a:rPr>
+                            <m:t>4</m:t>
+                          </m:r>
+                        </m:sub>
+                      </m:sSub>
+                    </m:oMath>
+                  </m:oMathPara>
+                </a14:m>
+                <a:endParaRPr lang="de-DE" sz="1200"/>
+              </a:p>
+            </p:txBody>
+          </p:sp>
+        </mc:Choice>
+        <mc:Fallback xmlns="">
+          <p:sp>
+            <p:nvSpPr>
+              <p:cNvPr id="92" name="Textfeld 91">
+                <a:extLst>
+                  <a:ext uri="{FF2B5EF4-FFF2-40B4-BE49-F238E27FC236}">
+                    <a16:creationId xmlns:a16="http://schemas.microsoft.com/office/drawing/2014/main" id="{0EDE3FF4-8DF0-D9A4-A5E1-D01767D90568}"/>
+                  </a:ext>
+                </a:extLst>
+              </p:cNvPr>
+              <p:cNvSpPr txBox="1">
+                <a:spLocks noRot="1" noChangeAspect="1" noMove="1" noResize="1" noEditPoints="1" noAdjustHandles="1" noChangeArrowheads="1" noChangeShapeType="1" noTextEdit="1"/>
+              </p:cNvSpPr>
+              <p:nvPr/>
+            </p:nvSpPr>
+            <p:spPr>
+              <a:xfrm>
+                <a:off x="4991775" y="4903483"/>
+                <a:ext cx="178574" cy="184666"/>
+              </a:xfrm>
+              <a:prstGeom prst="rect">
+                <a:avLst/>
+              </a:prstGeom>
+              <a:blipFill>
+                <a:blip r:embed="rId22"/>
+                <a:stretch>
+                  <a:fillRect l="-20000" r="-6667" b="-12500"/>
+                </a:stretch>
+              </a:blipFill>
+            </p:spPr>
+            <p:txBody>
+              <a:bodyPr/>
+              <a:lstStyle/>
+              <a:p>
+                <a:r>
+                  <a:rPr lang="de-DE">
+                    <a:noFill/>
+                  </a:rPr>
+                  <a:t> </a:t>
+                </a:r>
+              </a:p>
+            </p:txBody>
+          </p:sp>
+        </mc:Fallback>
+      </mc:AlternateContent>
+      <p:sp>
+        <p:nvSpPr>
+          <p:cNvPr id="98" name="Pfeil nach rechts 97">
+            <a:extLst>
+              <a:ext uri="{FF2B5EF4-FFF2-40B4-BE49-F238E27FC236}">
+                <a16:creationId xmlns:a16="http://schemas.microsoft.com/office/drawing/2014/main" id="{40BC861F-CB60-C216-20AC-97F0E4FE6BE6}"/>
+              </a:ext>
+            </a:extLst>
+          </p:cNvPr>
+          <p:cNvSpPr/>
+          <p:nvPr/>
+        </p:nvSpPr>
+        <p:spPr>
+          <a:xfrm rot="1836324">
+            <a:off x="766606" y="2300630"/>
+            <a:ext cx="2227926" cy="241554"/>
+          </a:xfrm>
+          <a:prstGeom prst="rightArrow">
+            <a:avLst>
+              <a:gd name="adj1" fmla="val 27483"/>
+              <a:gd name="adj2" fmla="val 64162"/>
+            </a:avLst>
+          </a:prstGeom>
+          <a:solidFill>
+            <a:srgbClr val="00B0F0"/>
+          </a:solidFill>
+          <a:ln>
+            <a:noFill/>
+          </a:ln>
+        </p:spPr>
+        <p:style>
+          <a:lnRef idx="2">
+            <a:schemeClr val="accent1">
+              <a:shade val="50000"/>
+            </a:schemeClr>
+          </a:lnRef>
+          <a:fillRef idx="1">
+            <a:schemeClr val="accent1"/>
+          </a:fillRef>
+          <a:effectRef idx="0">
+            <a:schemeClr val="accent1"/>
+          </a:effectRef>
+          <a:fontRef idx="minor">
+            <a:schemeClr val="lt1"/>
+          </a:fontRef>
+        </p:style>
+        <p:txBody>
+          <a:bodyPr rtlCol="0" anchor="ctr"/>
+          <a:lstStyle/>
+          <a:p>
+            <a:pPr algn="ctr"/>
+            <a:r>
+              <a:rPr lang="de-DE" b="1">
+                <a:ln>
+                  <a:solidFill>
+                    <a:schemeClr val="bg1"/>
+                  </a:solidFill>
+                </a:ln>
+                <a:solidFill>
+                  <a:schemeClr val="tx1"/>
+                </a:solidFill>
+                <a:effectLst>
+                  <a:glow rad="228600">
+                    <a:schemeClr val="bg1">
+                      <a:alpha val="40000"/>
+                    </a:schemeClr>
+                  </a:glow>
+                </a:effectLst>
+              </a:rPr>
+              <a:t>encoder</a:t>
+            </a:r>
+          </a:p>
+        </p:txBody>
+      </p:sp>
+      <p:sp>
+        <p:nvSpPr>
+          <p:cNvPr id="99" name="Pfeil nach rechts 98">
+            <a:extLst>
+              <a:ext uri="{FF2B5EF4-FFF2-40B4-BE49-F238E27FC236}">
+                <a16:creationId xmlns:a16="http://schemas.microsoft.com/office/drawing/2014/main" id="{FD686302-D6AB-C6A8-CF54-C19471617708}"/>
+              </a:ext>
+            </a:extLst>
+          </p:cNvPr>
+          <p:cNvSpPr/>
+          <p:nvPr/>
+        </p:nvSpPr>
+        <p:spPr>
+          <a:xfrm rot="19830223" flipH="1">
+            <a:off x="729218" y="3699856"/>
+            <a:ext cx="2228400" cy="241200"/>
+          </a:xfrm>
+          <a:prstGeom prst="rightArrow">
+            <a:avLst>
+              <a:gd name="adj1" fmla="val 27483"/>
+              <a:gd name="adj2" fmla="val 64162"/>
+            </a:avLst>
+          </a:prstGeom>
+          <a:solidFill>
+            <a:srgbClr val="00B0F0"/>
+          </a:solidFill>
+          <a:ln>
+            <a:noFill/>
+          </a:ln>
+        </p:spPr>
+        <p:style>
+          <a:lnRef idx="2">
+            <a:schemeClr val="accent1">
+              <a:shade val="50000"/>
+            </a:schemeClr>
+          </a:lnRef>
+          <a:fillRef idx="1">
+            <a:schemeClr val="accent1"/>
+          </a:fillRef>
+          <a:effectRef idx="0">
+            <a:schemeClr val="accent1"/>
+          </a:effectRef>
+          <a:fontRef idx="minor">
+            <a:schemeClr val="lt1"/>
+          </a:fontRef>
+        </p:style>
+        <p:txBody>
+          <a:bodyPr rtlCol="0" anchor="ctr"/>
+          <a:lstStyle/>
+          <a:p>
+            <a:pPr algn="ctr"/>
+            <a:r>
+              <a:rPr lang="de-DE" b="1">
+                <a:ln>
+                  <a:solidFill>
+                    <a:schemeClr val="bg1"/>
+                  </a:solidFill>
+                </a:ln>
+                <a:solidFill>
+                  <a:schemeClr val="tx1"/>
+                </a:solidFill>
+                <a:effectLst>
+                  <a:glow rad="228600">
+                    <a:schemeClr val="bg1">
+                      <a:alpha val="40000"/>
+                    </a:schemeClr>
+                  </a:glow>
+                </a:effectLst>
+              </a:rPr>
+              <a:t>decoder</a:t>
+            </a:r>
+          </a:p>
+        </p:txBody>
+      </p:sp>
     </p:spTree>
     <p:extLst>
       <p:ext uri="{BB962C8B-B14F-4D97-AF65-F5344CB8AC3E}">
         <p14:creationId xmlns:p14="http://schemas.microsoft.com/office/powerpoint/2010/main" val="1535004086"/>
+      </p:ext>
+    </p:extLst>
+  </p:cSld>
+  <p:clrMapOvr>
+    <a:masterClrMapping/>
+  </p:clrMapOvr>
+</p:sld>
+</file>
+
+<file path=ppt/slides/slide3.xml><?xml version="1.0" encoding="utf-8"?>
+<p:sld xmlns:a="http://schemas.openxmlformats.org/drawingml/2006/main" xmlns:r="http://schemas.openxmlformats.org/officeDocument/2006/relationships" xmlns:p="http://schemas.openxmlformats.org/presentationml/2006/main">
+  <p:cSld>
+    <p:spTree>
+      <p:nvGrpSpPr>
+        <p:cNvPr id="1" name=""/>
+        <p:cNvGrpSpPr/>
+        <p:nvPr/>
+      </p:nvGrpSpPr>
+      <p:grpSpPr>
+        <a:xfrm>
+          <a:off x="0" y="0"/>
+          <a:ext cx="0" cy="0"/>
+          <a:chOff x="0" y="0"/>
+          <a:chExt cx="0" cy="0"/>
+        </a:xfrm>
+      </p:grpSpPr>
+      <p:pic>
+        <p:nvPicPr>
+          <p:cNvPr id="1026" name="Picture 2">
+            <a:extLst>
+              <a:ext uri="{FF2B5EF4-FFF2-40B4-BE49-F238E27FC236}">
+                <a16:creationId xmlns:a16="http://schemas.microsoft.com/office/drawing/2014/main" id="{E39BBC6B-07E4-AFDB-A240-E3561AC0825C}"/>
+              </a:ext>
+            </a:extLst>
+          </p:cNvPr>
+          <p:cNvPicPr>
+            <a:picLocks noChangeAspect="1" noChangeArrowheads="1"/>
+          </p:cNvPicPr>
+          <p:nvPr/>
+        </p:nvPicPr>
+        <p:blipFill>
+          <a:blip r:embed="rId3">
+            <a:extLst>
+              <a:ext uri="{28A0092B-C50C-407E-A947-70E740481C1C}">
+                <a14:useLocalDpi xmlns:a14="http://schemas.microsoft.com/office/drawing/2010/main" val="0"/>
+              </a:ext>
+            </a:extLst>
+          </a:blip>
+          <a:srcRect/>
+          <a:stretch>
+            <a:fillRect/>
+          </a:stretch>
+        </p:blipFill>
+        <p:spPr bwMode="auto">
+          <a:xfrm>
+            <a:off x="649588" y="285406"/>
+            <a:ext cx="5727700" cy="2654300"/>
+          </a:xfrm>
+          <a:prstGeom prst="rect">
+            <a:avLst/>
+          </a:prstGeom>
+          <a:noFill/>
+          <a:extLst>
+            <a:ext uri="{909E8E84-426E-40DD-AFC4-6F175D3DCCD1}">
+              <a14:hiddenFill xmlns:a14="http://schemas.microsoft.com/office/drawing/2010/main">
+                <a:solidFill>
+                  <a:srgbClr val="FFFFFF"/>
+                </a:solidFill>
+              </a14:hiddenFill>
+            </a:ext>
+          </a:extLst>
+        </p:spPr>
+      </p:pic>
+      <p:pic>
+        <p:nvPicPr>
+          <p:cNvPr id="1028" name="Picture 4">
+            <a:extLst>
+              <a:ext uri="{FF2B5EF4-FFF2-40B4-BE49-F238E27FC236}">
+                <a16:creationId xmlns:a16="http://schemas.microsoft.com/office/drawing/2014/main" id="{35EBD427-A385-995E-86B0-100A6AAEA9A5}"/>
+              </a:ext>
+            </a:extLst>
+          </p:cNvPr>
+          <p:cNvPicPr>
+            <a:picLocks noChangeAspect="1" noChangeArrowheads="1"/>
+          </p:cNvPicPr>
+          <p:nvPr/>
+        </p:nvPicPr>
+        <p:blipFill>
+          <a:blip r:embed="rId4">
+            <a:extLst>
+              <a:ext uri="{28A0092B-C50C-407E-A947-70E740481C1C}">
+                <a14:useLocalDpi xmlns:a14="http://schemas.microsoft.com/office/drawing/2010/main" val="0"/>
+              </a:ext>
+            </a:extLst>
+          </a:blip>
+          <a:srcRect/>
+          <a:stretch>
+            <a:fillRect/>
+          </a:stretch>
+        </p:blipFill>
+        <p:spPr bwMode="auto">
+          <a:xfrm>
+            <a:off x="5357511" y="285406"/>
+            <a:ext cx="5727700" cy="2654300"/>
+          </a:xfrm>
+          <a:prstGeom prst="rect">
+            <a:avLst/>
+          </a:prstGeom>
+          <a:noFill/>
+          <a:extLst>
+            <a:ext uri="{909E8E84-426E-40DD-AFC4-6F175D3DCCD1}">
+              <a14:hiddenFill xmlns:a14="http://schemas.microsoft.com/office/drawing/2010/main">
+                <a:solidFill>
+                  <a:srgbClr val="FFFFFF"/>
+                </a:solidFill>
+              </a14:hiddenFill>
+            </a:ext>
+          </a:extLst>
+        </p:spPr>
+      </p:pic>
+      <p:pic>
+        <p:nvPicPr>
+          <p:cNvPr id="1030" name="Picture 6">
+            <a:extLst>
+              <a:ext uri="{FF2B5EF4-FFF2-40B4-BE49-F238E27FC236}">
+                <a16:creationId xmlns:a16="http://schemas.microsoft.com/office/drawing/2014/main" id="{9B3DF088-6452-A5CF-95EC-982071286BA2}"/>
+              </a:ext>
+            </a:extLst>
+          </p:cNvPr>
+          <p:cNvPicPr>
+            <a:picLocks noChangeAspect="1" noChangeArrowheads="1"/>
+          </p:cNvPicPr>
+          <p:nvPr/>
+        </p:nvPicPr>
+        <p:blipFill>
+          <a:blip r:embed="rId5">
+            <a:extLst>
+              <a:ext uri="{28A0092B-C50C-407E-A947-70E740481C1C}">
+                <a14:useLocalDpi xmlns:a14="http://schemas.microsoft.com/office/drawing/2010/main" val="0"/>
+              </a:ext>
+            </a:extLst>
+          </a:blip>
+          <a:srcRect/>
+          <a:stretch>
+            <a:fillRect/>
+          </a:stretch>
+        </p:blipFill>
+        <p:spPr bwMode="auto">
+          <a:xfrm>
+            <a:off x="649588" y="2939706"/>
+            <a:ext cx="5727700" cy="2654300"/>
+          </a:xfrm>
+          <a:prstGeom prst="rect">
+            <a:avLst/>
+          </a:prstGeom>
+          <a:noFill/>
+          <a:extLst>
+            <a:ext uri="{909E8E84-426E-40DD-AFC4-6F175D3DCCD1}">
+              <a14:hiddenFill xmlns:a14="http://schemas.microsoft.com/office/drawing/2010/main">
+                <a:solidFill>
+                  <a:srgbClr val="FFFFFF"/>
+                </a:solidFill>
+              </a14:hiddenFill>
+            </a:ext>
+          </a:extLst>
+        </p:spPr>
+      </p:pic>
+      <p:pic>
+        <p:nvPicPr>
+          <p:cNvPr id="1032" name="Picture 8">
+            <a:extLst>
+              <a:ext uri="{FF2B5EF4-FFF2-40B4-BE49-F238E27FC236}">
+                <a16:creationId xmlns:a16="http://schemas.microsoft.com/office/drawing/2014/main" id="{3B8BF334-833D-C755-AC3E-C612B404F097}"/>
+              </a:ext>
+            </a:extLst>
+          </p:cNvPr>
+          <p:cNvPicPr>
+            <a:picLocks noChangeAspect="1" noChangeArrowheads="1"/>
+          </p:cNvPicPr>
+          <p:nvPr/>
+        </p:nvPicPr>
+        <p:blipFill>
+          <a:blip r:embed="rId6">
+            <a:extLst>
+              <a:ext uri="{28A0092B-C50C-407E-A947-70E740481C1C}">
+                <a14:useLocalDpi xmlns:a14="http://schemas.microsoft.com/office/drawing/2010/main" val="0"/>
+              </a:ext>
+            </a:extLst>
+          </a:blip>
+          <a:srcRect/>
+          <a:stretch>
+            <a:fillRect/>
+          </a:stretch>
+        </p:blipFill>
+        <p:spPr bwMode="auto">
+          <a:xfrm>
+            <a:off x="5357511" y="2939706"/>
+            <a:ext cx="5727700" cy="2654300"/>
+          </a:xfrm>
+          <a:prstGeom prst="rect">
+            <a:avLst/>
+          </a:prstGeom>
+          <a:noFill/>
+          <a:extLst>
+            <a:ext uri="{909E8E84-426E-40DD-AFC4-6F175D3DCCD1}">
+              <a14:hiddenFill xmlns:a14="http://schemas.microsoft.com/office/drawing/2010/main">
+                <a:solidFill>
+                  <a:srgbClr val="FFFFFF"/>
+                </a:solidFill>
+              </a14:hiddenFill>
+            </a:ext>
+          </a:extLst>
+        </p:spPr>
+      </p:pic>
+      <p:sp>
+        <p:nvSpPr>
+          <p:cNvPr id="84" name="Rechteck 83">
+            <a:extLst>
+              <a:ext uri="{FF2B5EF4-FFF2-40B4-BE49-F238E27FC236}">
+                <a16:creationId xmlns:a16="http://schemas.microsoft.com/office/drawing/2014/main" id="{08B29C1D-0B14-1411-AA1D-64E319485905}"/>
+              </a:ext>
+            </a:extLst>
+          </p:cNvPr>
+          <p:cNvSpPr/>
+          <p:nvPr/>
+        </p:nvSpPr>
+        <p:spPr>
+          <a:xfrm>
+            <a:off x="4931765" y="577121"/>
+            <a:ext cx="360000" cy="360000"/>
+          </a:xfrm>
+          <a:prstGeom prst="rect">
+            <a:avLst/>
+          </a:prstGeom>
+          <a:solidFill>
+            <a:schemeClr val="bg2"/>
+          </a:solidFill>
+          <a:ln>
+            <a:noFill/>
+          </a:ln>
+        </p:spPr>
+        <p:style>
+          <a:lnRef idx="2">
+            <a:schemeClr val="accent1">
+              <a:shade val="50000"/>
+            </a:schemeClr>
+          </a:lnRef>
+          <a:fillRef idx="1">
+            <a:schemeClr val="accent1"/>
+          </a:fillRef>
+          <a:effectRef idx="0">
+            <a:schemeClr val="accent1"/>
+          </a:effectRef>
+          <a:fontRef idx="minor">
+            <a:schemeClr val="lt1"/>
+          </a:fontRef>
+        </p:style>
+        <p:txBody>
+          <a:bodyPr rtlCol="0" anchor="ctr"/>
+          <a:lstStyle/>
+          <a:p>
+            <a:pPr algn="ctr"/>
+            <a:r>
+              <a:rPr lang="de-DE" sz="2000" b="1">
+                <a:solidFill>
+                  <a:schemeClr val="tx1"/>
+                </a:solidFill>
+              </a:rPr>
+              <a:t>A</a:t>
+            </a:r>
+          </a:p>
+        </p:txBody>
+      </p:sp>
+      <p:sp>
+        <p:nvSpPr>
+          <p:cNvPr id="93" name="Rechteck 92">
+            <a:extLst>
+              <a:ext uri="{FF2B5EF4-FFF2-40B4-BE49-F238E27FC236}">
+                <a16:creationId xmlns:a16="http://schemas.microsoft.com/office/drawing/2014/main" id="{4698E4CB-2DFE-58EA-6660-374011099AE8}"/>
+              </a:ext>
+            </a:extLst>
+          </p:cNvPr>
+          <p:cNvSpPr/>
+          <p:nvPr/>
+        </p:nvSpPr>
+        <p:spPr>
+          <a:xfrm>
+            <a:off x="4931765" y="3231421"/>
+            <a:ext cx="360000" cy="360000"/>
+          </a:xfrm>
+          <a:prstGeom prst="rect">
+            <a:avLst/>
+          </a:prstGeom>
+          <a:solidFill>
+            <a:schemeClr val="bg2"/>
+          </a:solidFill>
+          <a:ln>
+            <a:noFill/>
+          </a:ln>
+        </p:spPr>
+        <p:style>
+          <a:lnRef idx="2">
+            <a:schemeClr val="accent1">
+              <a:shade val="50000"/>
+            </a:schemeClr>
+          </a:lnRef>
+          <a:fillRef idx="1">
+            <a:schemeClr val="accent1"/>
+          </a:fillRef>
+          <a:effectRef idx="0">
+            <a:schemeClr val="accent1"/>
+          </a:effectRef>
+          <a:fontRef idx="minor">
+            <a:schemeClr val="lt1"/>
+          </a:fontRef>
+        </p:style>
+        <p:txBody>
+          <a:bodyPr rtlCol="0" anchor="ctr"/>
+          <a:lstStyle/>
+          <a:p>
+            <a:pPr algn="ctr"/>
+            <a:r>
+              <a:rPr lang="de-DE" sz="2000" b="1">
+                <a:solidFill>
+                  <a:schemeClr val="tx1"/>
+                </a:solidFill>
+              </a:rPr>
+              <a:t>C</a:t>
+            </a:r>
+          </a:p>
+        </p:txBody>
+      </p:sp>
+      <p:sp>
+        <p:nvSpPr>
+          <p:cNvPr id="94" name="Rechteck 93">
+            <a:extLst>
+              <a:ext uri="{FF2B5EF4-FFF2-40B4-BE49-F238E27FC236}">
+                <a16:creationId xmlns:a16="http://schemas.microsoft.com/office/drawing/2014/main" id="{F6BEAEF9-32FD-F96C-6C3D-1AC9268B2163}"/>
+              </a:ext>
+            </a:extLst>
+          </p:cNvPr>
+          <p:cNvSpPr/>
+          <p:nvPr/>
+        </p:nvSpPr>
+        <p:spPr>
+          <a:xfrm>
+            <a:off x="9639688" y="577121"/>
+            <a:ext cx="360000" cy="360000"/>
+          </a:xfrm>
+          <a:prstGeom prst="rect">
+            <a:avLst/>
+          </a:prstGeom>
+          <a:solidFill>
+            <a:schemeClr val="bg2"/>
+          </a:solidFill>
+          <a:ln>
+            <a:noFill/>
+          </a:ln>
+        </p:spPr>
+        <p:style>
+          <a:lnRef idx="2">
+            <a:schemeClr val="accent1">
+              <a:shade val="50000"/>
+            </a:schemeClr>
+          </a:lnRef>
+          <a:fillRef idx="1">
+            <a:schemeClr val="accent1"/>
+          </a:fillRef>
+          <a:effectRef idx="0">
+            <a:schemeClr val="accent1"/>
+          </a:effectRef>
+          <a:fontRef idx="minor">
+            <a:schemeClr val="lt1"/>
+          </a:fontRef>
+        </p:style>
+        <p:txBody>
+          <a:bodyPr rtlCol="0" anchor="ctr"/>
+          <a:lstStyle/>
+          <a:p>
+            <a:pPr algn="ctr"/>
+            <a:r>
+              <a:rPr lang="de-DE" sz="2000" b="1">
+                <a:solidFill>
+                  <a:schemeClr val="tx1"/>
+                </a:solidFill>
+              </a:rPr>
+              <a:t>B</a:t>
+            </a:r>
+          </a:p>
+        </p:txBody>
+      </p:sp>
+      <p:sp>
+        <p:nvSpPr>
+          <p:cNvPr id="95" name="Rechteck 94">
+            <a:extLst>
+              <a:ext uri="{FF2B5EF4-FFF2-40B4-BE49-F238E27FC236}">
+                <a16:creationId xmlns:a16="http://schemas.microsoft.com/office/drawing/2014/main" id="{F85A5654-8FCE-7379-2525-E5CDA628F19C}"/>
+              </a:ext>
+            </a:extLst>
+          </p:cNvPr>
+          <p:cNvSpPr/>
+          <p:nvPr/>
+        </p:nvSpPr>
+        <p:spPr>
+          <a:xfrm>
+            <a:off x="9639688" y="3231421"/>
+            <a:ext cx="360000" cy="360000"/>
+          </a:xfrm>
+          <a:prstGeom prst="rect">
+            <a:avLst/>
+          </a:prstGeom>
+          <a:solidFill>
+            <a:schemeClr val="bg2"/>
+          </a:solidFill>
+          <a:ln>
+            <a:noFill/>
+          </a:ln>
+        </p:spPr>
+        <p:style>
+          <a:lnRef idx="2">
+            <a:schemeClr val="accent1">
+              <a:shade val="50000"/>
+            </a:schemeClr>
+          </a:lnRef>
+          <a:fillRef idx="1">
+            <a:schemeClr val="accent1"/>
+          </a:fillRef>
+          <a:effectRef idx="0">
+            <a:schemeClr val="accent1"/>
+          </a:effectRef>
+          <a:fontRef idx="minor">
+            <a:schemeClr val="lt1"/>
+          </a:fontRef>
+        </p:style>
+        <p:txBody>
+          <a:bodyPr rtlCol="0" anchor="ctr"/>
+          <a:lstStyle/>
+          <a:p>
+            <a:pPr algn="ctr"/>
+            <a:r>
+              <a:rPr lang="de-DE" sz="2000" b="1">
+                <a:solidFill>
+                  <a:schemeClr val="tx1"/>
+                </a:solidFill>
+              </a:rPr>
+              <a:t>D</a:t>
+            </a:r>
+          </a:p>
+        </p:txBody>
+      </p:sp>
+    </p:spTree>
+    <p:extLst>
+      <p:ext uri="{BB962C8B-B14F-4D97-AF65-F5344CB8AC3E}">
+        <p14:creationId xmlns:p14="http://schemas.microsoft.com/office/powerpoint/2010/main" val="1248621883"/>
+      </p:ext>
+    </p:extLst>
+  </p:cSld>
+  <p:clrMapOvr>
+    <a:masterClrMapping/>
+  </p:clrMapOvr>
+</p:sld>
+</file>
+
+<file path=ppt/slides/slide4.xml><?xml version="1.0" encoding="utf-8"?>
+<p:sld xmlns:a="http://schemas.openxmlformats.org/drawingml/2006/main" xmlns:r="http://schemas.openxmlformats.org/officeDocument/2006/relationships" xmlns:p="http://schemas.openxmlformats.org/presentationml/2006/main">
+  <p:cSld>
+    <p:spTree>
+      <p:nvGrpSpPr>
+        <p:cNvPr id="1" name=""/>
+        <p:cNvGrpSpPr/>
+        <p:nvPr/>
+      </p:nvGrpSpPr>
+      <p:grpSpPr>
+        <a:xfrm>
+          <a:off x="0" y="0"/>
+          <a:ext cx="0" cy="0"/>
+          <a:chOff x="0" y="0"/>
+          <a:chExt cx="0" cy="0"/>
+        </a:xfrm>
+      </p:grpSpPr>
+      <p:pic>
+        <p:nvPicPr>
+          <p:cNvPr id="3078" name="Picture 6">
+            <a:extLst>
+              <a:ext uri="{FF2B5EF4-FFF2-40B4-BE49-F238E27FC236}">
+                <a16:creationId xmlns:a16="http://schemas.microsoft.com/office/drawing/2014/main" id="{FD0C47FF-C9FE-A8B6-0752-4F095C9E25E7}"/>
+              </a:ext>
+            </a:extLst>
+          </p:cNvPr>
+          <p:cNvPicPr>
+            <a:picLocks noChangeAspect="1" noChangeArrowheads="1"/>
+          </p:cNvPicPr>
+          <p:nvPr/>
+        </p:nvPicPr>
+        <p:blipFill>
+          <a:blip r:embed="rId3">
+            <a:extLst>
+              <a:ext uri="{28A0092B-C50C-407E-A947-70E740481C1C}">
+                <a14:useLocalDpi xmlns:a14="http://schemas.microsoft.com/office/drawing/2010/main" val="0"/>
+              </a:ext>
+            </a:extLst>
+          </a:blip>
+          <a:srcRect/>
+          <a:stretch>
+            <a:fillRect/>
+          </a:stretch>
+        </p:blipFill>
+        <p:spPr bwMode="auto">
+          <a:xfrm>
+            <a:off x="342900" y="1110729"/>
+            <a:ext cx="5753100" cy="3632200"/>
+          </a:xfrm>
+          <a:prstGeom prst="rect">
+            <a:avLst/>
+          </a:prstGeom>
+          <a:noFill/>
+          <a:extLst>
+            <a:ext uri="{909E8E84-426E-40DD-AFC4-6F175D3DCCD1}">
+              <a14:hiddenFill xmlns:a14="http://schemas.microsoft.com/office/drawing/2010/main">
+                <a:solidFill>
+                  <a:srgbClr val="FFFFFF"/>
+                </a:solidFill>
+              </a14:hiddenFill>
+            </a:ext>
+          </a:extLst>
+        </p:spPr>
+      </p:pic>
+      <p:pic>
+        <p:nvPicPr>
+          <p:cNvPr id="3080" name="Picture 8">
+            <a:extLst>
+              <a:ext uri="{FF2B5EF4-FFF2-40B4-BE49-F238E27FC236}">
+                <a16:creationId xmlns:a16="http://schemas.microsoft.com/office/drawing/2014/main" id="{8BD88D9A-633A-AB85-60B1-8E7A7266374E}"/>
+              </a:ext>
+            </a:extLst>
+          </p:cNvPr>
+          <p:cNvPicPr>
+            <a:picLocks noChangeAspect="1" noChangeArrowheads="1"/>
+          </p:cNvPicPr>
+          <p:nvPr/>
+        </p:nvPicPr>
+        <p:blipFill>
+          <a:blip r:embed="rId4">
+            <a:extLst>
+              <a:ext uri="{28A0092B-C50C-407E-A947-70E740481C1C}">
+                <a14:useLocalDpi xmlns:a14="http://schemas.microsoft.com/office/drawing/2010/main" val="0"/>
+              </a:ext>
+            </a:extLst>
+          </a:blip>
+          <a:srcRect/>
+          <a:stretch>
+            <a:fillRect/>
+          </a:stretch>
+        </p:blipFill>
+        <p:spPr bwMode="auto">
+          <a:xfrm>
+            <a:off x="6096000" y="1110729"/>
+            <a:ext cx="5537200" cy="3632200"/>
+          </a:xfrm>
+          <a:prstGeom prst="rect">
+            <a:avLst/>
+          </a:prstGeom>
+          <a:noFill/>
+          <a:extLst>
+            <a:ext uri="{909E8E84-426E-40DD-AFC4-6F175D3DCCD1}">
+              <a14:hiddenFill xmlns:a14="http://schemas.microsoft.com/office/drawing/2010/main">
+                <a:solidFill>
+                  <a:srgbClr val="FFFFFF"/>
+                </a:solidFill>
+              </a14:hiddenFill>
+            </a:ext>
+          </a:extLst>
+        </p:spPr>
+      </p:pic>
+    </p:spTree>
+    <p:extLst>
+      <p:ext uri="{BB962C8B-B14F-4D97-AF65-F5344CB8AC3E}">
+        <p14:creationId xmlns:p14="http://schemas.microsoft.com/office/powerpoint/2010/main" val="4148036896"/>
       </p:ext>
     </p:extLst>
   </p:cSld>

</xml_diff>

<commit_message>
Add figures for manuscript (#44)
</commit_message>
<xml_diff>
--- a/figures/figures.pptx
+++ b/figures/figures.pptx
@@ -5,11 +5,13 @@
     <p:sldMasterId id="2147483648" r:id="rId1"/>
   </p:sldMasterIdLst>
   <p:notesMasterIdLst>
-    <p:notesMasterId r:id="rId4"/>
+    <p:notesMasterId r:id="rId6"/>
   </p:notesMasterIdLst>
   <p:sldIdLst>
     <p:sldId id="256" r:id="rId2"/>
     <p:sldId id="267" r:id="rId3"/>
+    <p:sldId id="268" r:id="rId4"/>
+    <p:sldId id="269" r:id="rId5"/>
   </p:sldIdLst>
   <p:sldSz cx="12192000" cy="6858000"/>
   <p:notesSz cx="6858000" cy="9144000"/>
@@ -197,7 +199,7 @@
           </a:lstStyle>
           <a:p>
             <a:fld id="{B35BE548-DE05-8149-9395-93E03CC73C13}" type="datetimeFigureOut">
-              <a:t>02.03.23</a:t>
+              <a:t>17.03.23</a:t>
             </a:fld>
             <a:endParaRPr lang="de-DE"/>
           </a:p>
@@ -547,6 +549,174 @@
 </p:notes>
 </file>
 
+<file path=ppt/notesSlides/notesSlide2.xml><?xml version="1.0" encoding="utf-8"?>
+<p:notes xmlns:a="http://schemas.openxmlformats.org/drawingml/2006/main" xmlns:r="http://schemas.openxmlformats.org/officeDocument/2006/relationships" xmlns:p="http://schemas.openxmlformats.org/presentationml/2006/main">
+  <p:cSld>
+    <p:spTree>
+      <p:nvGrpSpPr>
+        <p:cNvPr id="1" name=""/>
+        <p:cNvGrpSpPr/>
+        <p:nvPr/>
+      </p:nvGrpSpPr>
+      <p:grpSpPr>
+        <a:xfrm>
+          <a:off x="0" y="0"/>
+          <a:ext cx="0" cy="0"/>
+          <a:chOff x="0" y="0"/>
+          <a:chExt cx="0" cy="0"/>
+        </a:xfrm>
+      </p:grpSpPr>
+      <p:sp>
+        <p:nvSpPr>
+          <p:cNvPr id="2" name="Folienbildplatzhalter 1"/>
+          <p:cNvSpPr>
+            <a:spLocks noGrp="1" noRot="1" noChangeAspect="1"/>
+          </p:cNvSpPr>
+          <p:nvPr>
+            <p:ph type="sldImg"/>
+          </p:nvPr>
+        </p:nvSpPr>
+        <p:spPr/>
+      </p:sp>
+      <p:sp>
+        <p:nvSpPr>
+          <p:cNvPr id="3" name="Notizenplatzhalter 2"/>
+          <p:cNvSpPr>
+            <a:spLocks noGrp="1"/>
+          </p:cNvSpPr>
+          <p:nvPr>
+            <p:ph type="body" idx="1"/>
+          </p:nvPr>
+        </p:nvSpPr>
+        <p:spPr/>
+        <p:txBody>
+          <a:bodyPr/>
+          <a:lstStyle/>
+          <a:p>
+            <a:endParaRPr lang="de-DE"/>
+          </a:p>
+        </p:txBody>
+      </p:sp>
+      <p:sp>
+        <p:nvSpPr>
+          <p:cNvPr id="4" name="Foliennummernplatzhalter 3"/>
+          <p:cNvSpPr>
+            <a:spLocks noGrp="1"/>
+          </p:cNvSpPr>
+          <p:nvPr>
+            <p:ph type="sldNum" sz="quarter" idx="5"/>
+          </p:nvPr>
+        </p:nvSpPr>
+        <p:spPr/>
+        <p:txBody>
+          <a:bodyPr/>
+          <a:lstStyle/>
+          <a:p>
+            <a:fld id="{8676B46A-5025-BA4D-A49D-5D1F5DB78F39}" type="slidenum">
+              <a:rPr lang="de-DE"/>
+              <a:t>3</a:t>
+            </a:fld>
+            <a:endParaRPr lang="de-DE"/>
+          </a:p>
+        </p:txBody>
+      </p:sp>
+    </p:spTree>
+    <p:extLst>
+      <p:ext uri="{BB962C8B-B14F-4D97-AF65-F5344CB8AC3E}">
+        <p14:creationId xmlns:p14="http://schemas.microsoft.com/office/powerpoint/2010/main" val="1135500833"/>
+      </p:ext>
+    </p:extLst>
+  </p:cSld>
+  <p:clrMapOvr>
+    <a:masterClrMapping/>
+  </p:clrMapOvr>
+</p:notes>
+</file>
+
+<file path=ppt/notesSlides/notesSlide3.xml><?xml version="1.0" encoding="utf-8"?>
+<p:notes xmlns:a="http://schemas.openxmlformats.org/drawingml/2006/main" xmlns:r="http://schemas.openxmlformats.org/officeDocument/2006/relationships" xmlns:p="http://schemas.openxmlformats.org/presentationml/2006/main">
+  <p:cSld>
+    <p:spTree>
+      <p:nvGrpSpPr>
+        <p:cNvPr id="1" name=""/>
+        <p:cNvGrpSpPr/>
+        <p:nvPr/>
+      </p:nvGrpSpPr>
+      <p:grpSpPr>
+        <a:xfrm>
+          <a:off x="0" y="0"/>
+          <a:ext cx="0" cy="0"/>
+          <a:chOff x="0" y="0"/>
+          <a:chExt cx="0" cy="0"/>
+        </a:xfrm>
+      </p:grpSpPr>
+      <p:sp>
+        <p:nvSpPr>
+          <p:cNvPr id="2" name="Folienbildplatzhalter 1"/>
+          <p:cNvSpPr>
+            <a:spLocks noGrp="1" noRot="1" noChangeAspect="1"/>
+          </p:cNvSpPr>
+          <p:nvPr>
+            <p:ph type="sldImg"/>
+          </p:nvPr>
+        </p:nvSpPr>
+        <p:spPr/>
+      </p:sp>
+      <p:sp>
+        <p:nvSpPr>
+          <p:cNvPr id="3" name="Notizenplatzhalter 2"/>
+          <p:cNvSpPr>
+            <a:spLocks noGrp="1"/>
+          </p:cNvSpPr>
+          <p:nvPr>
+            <p:ph type="body" idx="1"/>
+          </p:nvPr>
+        </p:nvSpPr>
+        <p:spPr/>
+        <p:txBody>
+          <a:bodyPr/>
+          <a:lstStyle/>
+          <a:p>
+            <a:endParaRPr lang="de-DE"/>
+          </a:p>
+        </p:txBody>
+      </p:sp>
+      <p:sp>
+        <p:nvSpPr>
+          <p:cNvPr id="4" name="Foliennummernplatzhalter 3"/>
+          <p:cNvSpPr>
+            <a:spLocks noGrp="1"/>
+          </p:cNvSpPr>
+          <p:nvPr>
+            <p:ph type="sldNum" sz="quarter" idx="5"/>
+          </p:nvPr>
+        </p:nvSpPr>
+        <p:spPr/>
+        <p:txBody>
+          <a:bodyPr/>
+          <a:lstStyle/>
+          <a:p>
+            <a:fld id="{8676B46A-5025-BA4D-A49D-5D1F5DB78F39}" type="slidenum">
+              <a:rPr lang="de-DE"/>
+              <a:t>4</a:t>
+            </a:fld>
+            <a:endParaRPr lang="de-DE"/>
+          </a:p>
+        </p:txBody>
+      </p:sp>
+    </p:spTree>
+    <p:extLst>
+      <p:ext uri="{BB962C8B-B14F-4D97-AF65-F5344CB8AC3E}">
+        <p14:creationId xmlns:p14="http://schemas.microsoft.com/office/powerpoint/2010/main" val="4255193168"/>
+      </p:ext>
+    </p:extLst>
+  </p:cSld>
+  <p:clrMapOvr>
+    <a:masterClrMapping/>
+  </p:clrMapOvr>
+</p:notes>
+</file>
+
 <file path=ppt/slideLayouts/slideLayout1.xml><?xml version="1.0" encoding="utf-8"?>
 <p:sldLayout xmlns:a="http://schemas.openxmlformats.org/drawingml/2006/main" xmlns:r="http://schemas.openxmlformats.org/officeDocument/2006/relationships" xmlns:p="http://schemas.openxmlformats.org/presentationml/2006/main" type="title" preserve="1">
   <p:cSld name="Titelfolie">
@@ -693,7 +863,7 @@
           <a:lstStyle/>
           <a:p>
             <a:fld id="{F7A3446A-3617-0E4A-A439-6DD0C73FFDE1}" type="datetimeFigureOut">
-              <a:t>02.03.23</a:t>
+              <a:t>17.03.23</a:t>
             </a:fld>
             <a:endParaRPr lang="de-DE"/>
           </a:p>
@@ -889,7 +1059,7 @@
           <a:lstStyle/>
           <a:p>
             <a:fld id="{F7A3446A-3617-0E4A-A439-6DD0C73FFDE1}" type="datetimeFigureOut">
-              <a:t>02.03.23</a:t>
+              <a:t>17.03.23</a:t>
             </a:fld>
             <a:endParaRPr lang="de-DE"/>
           </a:p>
@@ -1095,7 +1265,7 @@
           <a:lstStyle/>
           <a:p>
             <a:fld id="{F7A3446A-3617-0E4A-A439-6DD0C73FFDE1}" type="datetimeFigureOut">
-              <a:t>02.03.23</a:t>
+              <a:t>17.03.23</a:t>
             </a:fld>
             <a:endParaRPr lang="de-DE"/>
           </a:p>
@@ -1291,7 +1461,7 @@
           <a:lstStyle/>
           <a:p>
             <a:fld id="{F7A3446A-3617-0E4A-A439-6DD0C73FFDE1}" type="datetimeFigureOut">
-              <a:t>02.03.23</a:t>
+              <a:t>17.03.23</a:t>
             </a:fld>
             <a:endParaRPr lang="de-DE"/>
           </a:p>
@@ -1564,7 +1734,7 @@
           <a:lstStyle/>
           <a:p>
             <a:fld id="{F7A3446A-3617-0E4A-A439-6DD0C73FFDE1}" type="datetimeFigureOut">
-              <a:t>02.03.23</a:t>
+              <a:t>17.03.23</a:t>
             </a:fld>
             <a:endParaRPr lang="de-DE"/>
           </a:p>
@@ -1827,7 +1997,7 @@
           <a:lstStyle/>
           <a:p>
             <a:fld id="{F7A3446A-3617-0E4A-A439-6DD0C73FFDE1}" type="datetimeFigureOut">
-              <a:t>02.03.23</a:t>
+              <a:t>17.03.23</a:t>
             </a:fld>
             <a:endParaRPr lang="de-DE"/>
           </a:p>
@@ -2237,7 +2407,7 @@
           <a:lstStyle/>
           <a:p>
             <a:fld id="{F7A3446A-3617-0E4A-A439-6DD0C73FFDE1}" type="datetimeFigureOut">
-              <a:t>02.03.23</a:t>
+              <a:t>17.03.23</a:t>
             </a:fld>
             <a:endParaRPr lang="de-DE"/>
           </a:p>
@@ -2376,7 +2546,7 @@
           <a:lstStyle/>
           <a:p>
             <a:fld id="{F7A3446A-3617-0E4A-A439-6DD0C73FFDE1}" type="datetimeFigureOut">
-              <a:t>02.03.23</a:t>
+              <a:t>17.03.23</a:t>
             </a:fld>
             <a:endParaRPr lang="de-DE"/>
           </a:p>
@@ -2487,7 +2657,7 @@
           <a:lstStyle/>
           <a:p>
             <a:fld id="{F7A3446A-3617-0E4A-A439-6DD0C73FFDE1}" type="datetimeFigureOut">
-              <a:t>02.03.23</a:t>
+              <a:t>17.03.23</a:t>
             </a:fld>
             <a:endParaRPr lang="de-DE"/>
           </a:p>
@@ -2796,7 +2966,7 @@
           <a:lstStyle/>
           <a:p>
             <a:fld id="{F7A3446A-3617-0E4A-A439-6DD0C73FFDE1}" type="datetimeFigureOut">
-              <a:t>02.03.23</a:t>
+              <a:t>17.03.23</a:t>
             </a:fld>
             <a:endParaRPr lang="de-DE"/>
           </a:p>
@@ -3082,7 +3252,7 @@
           <a:lstStyle/>
           <a:p>
             <a:fld id="{F7A3446A-3617-0E4A-A439-6DD0C73FFDE1}" type="datetimeFigureOut">
-              <a:t>02.03.23</a:t>
+              <a:t>17.03.23</a:t>
             </a:fld>
             <a:endParaRPr lang="de-DE"/>
           </a:p>
@@ -3321,7 +3491,7 @@
           </a:lstStyle>
           <a:p>
             <a:fld id="{F7A3446A-3617-0E4A-A439-6DD0C73FFDE1}" type="datetimeFigureOut">
-              <a:t>02.03.23</a:t>
+              <a:t>17.03.23</a:t>
             </a:fld>
             <a:endParaRPr lang="de-DE"/>
           </a:p>
@@ -5438,7 +5608,7 @@
         </p:nvCxnSpPr>
         <p:spPr>
           <a:xfrm>
-            <a:off x="2499185" y="2242630"/>
+            <a:off x="2453465" y="2242630"/>
             <a:ext cx="0" cy="2046119"/>
           </a:xfrm>
           <a:prstGeom prst="straightConnector1">
@@ -6717,7 +6887,7 @@
               </a:pPr>
               <a:r>
                 <a:rPr lang="de-DE" sz="1400"/>
-                <a:t>max Pooling 2x2</a:t>
+                <a:t>max pooling 2x2</a:t>
               </a:r>
             </a:p>
             <a:p>
@@ -6728,7 +6898,7 @@
               </a:pPr>
               <a:r>
                 <a:rPr lang="de-DE" sz="1400"/>
-                <a:t>up-sampling 2x2</a:t>
+                <a:t>upsampling 2x2</a:t>
               </a:r>
             </a:p>
             <a:p>
@@ -6893,10 +7063,10 @@
         </p:nvGrpSpPr>
         <p:grpSpPr>
           <a:xfrm>
-            <a:off x="2977603" y="5298146"/>
-            <a:ext cx="2427229" cy="927273"/>
-            <a:chOff x="2986070" y="4757062"/>
-            <a:chExt cx="2427229" cy="927273"/>
+            <a:off x="2951517" y="5246781"/>
+            <a:ext cx="2453315" cy="1017889"/>
+            <a:chOff x="2959984" y="4705697"/>
+            <a:chExt cx="2453315" cy="1017889"/>
           </a:xfrm>
         </p:grpSpPr>
         <p:sp>
@@ -6913,8 +7083,8 @@
           </p:nvSpPr>
           <p:spPr>
             <a:xfrm>
-              <a:off x="2986070" y="4771878"/>
-              <a:ext cx="2427229" cy="892552"/>
+              <a:off x="2959984" y="4771878"/>
+              <a:ext cx="2453315" cy="892552"/>
             </a:xfrm>
             <a:prstGeom prst="rect">
               <a:avLst/>
@@ -6937,7 +7107,7 @@
               </a:pPr>
               <a:r>
                 <a:rPr lang="de-DE" sz="1400"/>
-                <a:t>CNN filters = [64,128,256,512]</a:t>
+                <a:t> CNN filters = [64,128,256,512]</a:t>
               </a:r>
             </a:p>
             <a:p>
@@ -6948,7 +7118,7 @@
               </a:pPr>
               <a:r>
                 <a:rPr lang="de-DE" sz="1400"/>
-                <a:t>CNN kernel size = 5x5</a:t>
+                <a:t> CNN kernel size = 5x5</a:t>
               </a:r>
             </a:p>
             <a:p>
@@ -6959,7 +7129,7 @@
               </a:pPr>
               <a:r>
                 <a:rPr lang="de-DE" sz="1400"/>
-                <a:t>21.6 Mio trainable parameters</a:t>
+                <a:t> 21.6 Mio trainable parameters</a:t>
               </a:r>
             </a:p>
           </p:txBody>
@@ -6978,8 +7148,8 @@
           </p:nvSpPr>
           <p:spPr>
             <a:xfrm>
-              <a:off x="3023599" y="4757062"/>
-              <a:ext cx="2343125" cy="927273"/>
+              <a:off x="3023599" y="4705697"/>
+              <a:ext cx="2343125" cy="1017889"/>
             </a:xfrm>
             <a:prstGeom prst="rect">
               <a:avLst/>
@@ -7017,10 +7187,3456 @@
           </p:txBody>
         </p:sp>
       </p:grpSp>
+      <mc:AlternateContent xmlns:mc="http://schemas.openxmlformats.org/markup-compatibility/2006" xmlns:a14="http://schemas.microsoft.com/office/drawing/2010/main">
+        <mc:Choice Requires="a14">
+          <p:sp>
+            <p:nvSpPr>
+              <p:cNvPr id="4" name="Textfeld 3">
+                <a:extLst>
+                  <a:ext uri="{FF2B5EF4-FFF2-40B4-BE49-F238E27FC236}">
+                    <a16:creationId xmlns:a16="http://schemas.microsoft.com/office/drawing/2014/main" id="{636E2BB5-56A7-4B28-DD90-B59A96D91442}"/>
+                  </a:ext>
+                </a:extLst>
+              </p:cNvPr>
+              <p:cNvSpPr txBox="1"/>
+              <p:nvPr/>
+            </p:nvSpPr>
+            <p:spPr>
+              <a:xfrm>
+                <a:off x="503003" y="1244217"/>
+                <a:ext cx="702372" cy="184666"/>
+              </a:xfrm>
+              <a:prstGeom prst="rect">
+                <a:avLst/>
+              </a:prstGeom>
+              <a:noFill/>
+            </p:spPr>
+            <p:txBody>
+              <a:bodyPr wrap="none" lIns="0" tIns="0" rIns="0" bIns="0" rtlCol="0">
+                <a:spAutoFit/>
+              </a:bodyPr>
+              <a:lstStyle/>
+              <a:p>
+                <a:pPr/>
+                <a14:m>
+                  <m:oMathPara xmlns:m="http://schemas.openxmlformats.org/officeDocument/2006/math">
+                    <m:oMathParaPr>
+                      <m:jc m:val="centerGroup"/>
+                    </m:oMathParaPr>
+                    <m:oMath xmlns:m="http://schemas.openxmlformats.org/officeDocument/2006/math">
+                      <m:sSub>
+                        <m:sSubPr>
+                          <m:ctrlPr>
+                            <a:rPr lang="de-DE" sz="1200" i="1">
+                              <a:latin typeface="Cambria Math" panose="02040503050406030204" pitchFamily="18" charset="0"/>
+                            </a:rPr>
+                          </m:ctrlPr>
+                        </m:sSubPr>
+                        <m:e>
+                          <m:r>
+                            <a:rPr lang="de-DE" sz="1200" b="0" i="1">
+                              <a:latin typeface="Cambria Math" panose="02040503050406030204" pitchFamily="18" charset="0"/>
+                            </a:rPr>
+                            <m:t>𝑁</m:t>
+                          </m:r>
+                        </m:e>
+                        <m:sub>
+                          <m:r>
+                            <a:rPr lang="de-DE" sz="1200" b="0" i="1">
+                              <a:latin typeface="Cambria Math" panose="02040503050406030204" pitchFamily="18" charset="0"/>
+                            </a:rPr>
+                            <m:t>𝑙𝑎𝑡</m:t>
+                          </m:r>
+                        </m:sub>
+                      </m:sSub>
+                      <m:r>
+                        <a:rPr lang="de-DE" sz="1200" i="1">
+                          <a:latin typeface="Cambria Math" panose="02040503050406030204" pitchFamily="18" charset="0"/>
+                          <a:ea typeface="Cambria Math" panose="02040503050406030204" pitchFamily="18" charset="0"/>
+                        </a:rPr>
+                        <m:t>×</m:t>
+                      </m:r>
+                      <m:sSub>
+                        <m:sSubPr>
+                          <m:ctrlPr>
+                            <a:rPr lang="de-DE" sz="1200" i="1">
+                              <a:latin typeface="Cambria Math" panose="02040503050406030204" pitchFamily="18" charset="0"/>
+                              <a:ea typeface="Cambria Math" panose="02040503050406030204" pitchFamily="18" charset="0"/>
+                            </a:rPr>
+                          </m:ctrlPr>
+                        </m:sSubPr>
+                        <m:e>
+                          <m:r>
+                            <a:rPr lang="de-DE" sz="1200" b="0" i="1">
+                              <a:latin typeface="Cambria Math" panose="02040503050406030204" pitchFamily="18" charset="0"/>
+                              <a:ea typeface="Cambria Math" panose="02040503050406030204" pitchFamily="18" charset="0"/>
+                            </a:rPr>
+                            <m:t>𝑁</m:t>
+                          </m:r>
+                        </m:e>
+                        <m:sub>
+                          <m:r>
+                            <a:rPr lang="de-DE" sz="1200" b="0" i="1">
+                              <a:latin typeface="Cambria Math" panose="02040503050406030204" pitchFamily="18" charset="0"/>
+                              <a:ea typeface="Cambria Math" panose="02040503050406030204" pitchFamily="18" charset="0"/>
+                            </a:rPr>
+                            <m:t>𝑙𝑜𝑛</m:t>
+                          </m:r>
+                        </m:sub>
+                      </m:sSub>
+                    </m:oMath>
+                  </m:oMathPara>
+                </a14:m>
+                <a:endParaRPr lang="de-DE" sz="1200"/>
+              </a:p>
+            </p:txBody>
+          </p:sp>
+        </mc:Choice>
+        <mc:Fallback xmlns="">
+          <p:sp>
+            <p:nvSpPr>
+              <p:cNvPr id="4" name="Textfeld 3">
+                <a:extLst>
+                  <a:ext uri="{FF2B5EF4-FFF2-40B4-BE49-F238E27FC236}">
+                    <a16:creationId xmlns:a16="http://schemas.microsoft.com/office/drawing/2014/main" id="{636E2BB5-56A7-4B28-DD90-B59A96D91442}"/>
+                  </a:ext>
+                </a:extLst>
+              </p:cNvPr>
+              <p:cNvSpPr txBox="1">
+                <a:spLocks noRot="1" noChangeAspect="1" noMove="1" noResize="1" noEditPoints="1" noAdjustHandles="1" noChangeArrowheads="1" noChangeShapeType="1" noTextEdit="1"/>
+              </p:cNvSpPr>
+              <p:nvPr/>
+            </p:nvSpPr>
+            <p:spPr>
+              <a:xfrm>
+                <a:off x="503003" y="1244217"/>
+                <a:ext cx="702372" cy="184666"/>
+              </a:xfrm>
+              <a:prstGeom prst="rect">
+                <a:avLst/>
+              </a:prstGeom>
+              <a:blipFill>
+                <a:blip r:embed="rId5"/>
+                <a:stretch>
+                  <a:fillRect l="-5263" b="-12500"/>
+                </a:stretch>
+              </a:blipFill>
+            </p:spPr>
+            <p:txBody>
+              <a:bodyPr/>
+              <a:lstStyle/>
+              <a:p>
+                <a:r>
+                  <a:rPr lang="de-DE">
+                    <a:noFill/>
+                  </a:rPr>
+                  <a:t> </a:t>
+                </a:r>
+              </a:p>
+            </p:txBody>
+          </p:sp>
+        </mc:Fallback>
+      </mc:AlternateContent>
+      <mc:AlternateContent xmlns:mc="http://schemas.openxmlformats.org/markup-compatibility/2006" xmlns:a14="http://schemas.microsoft.com/office/drawing/2010/main">
+        <mc:Choice Requires="a14">
+          <p:sp>
+            <p:nvSpPr>
+              <p:cNvPr id="5" name="Textfeld 4">
+                <a:extLst>
+                  <a:ext uri="{FF2B5EF4-FFF2-40B4-BE49-F238E27FC236}">
+                    <a16:creationId xmlns:a16="http://schemas.microsoft.com/office/drawing/2014/main" id="{78429FA1-5B62-D75B-7CDA-19F13AD54C8F}"/>
+                  </a:ext>
+                </a:extLst>
+              </p:cNvPr>
+              <p:cNvSpPr txBox="1"/>
+              <p:nvPr/>
+            </p:nvSpPr>
+            <p:spPr>
+              <a:xfrm>
+                <a:off x="2204718" y="1276612"/>
+                <a:ext cx="753668" cy="355803"/>
+              </a:xfrm>
+              <a:prstGeom prst="rect">
+                <a:avLst/>
+              </a:prstGeom>
+              <a:noFill/>
+            </p:spPr>
+            <p:txBody>
+              <a:bodyPr wrap="none" lIns="0" tIns="0" rIns="0" bIns="0" rtlCol="0">
+                <a:spAutoFit/>
+              </a:bodyPr>
+              <a:lstStyle/>
+              <a:p>
+                <a:pPr/>
+                <a14:m>
+                  <m:oMathPara xmlns:m="http://schemas.openxmlformats.org/officeDocument/2006/math">
+                    <m:oMathParaPr>
+                      <m:jc m:val="centerGroup"/>
+                    </m:oMathParaPr>
+                    <m:oMath xmlns:m="http://schemas.openxmlformats.org/officeDocument/2006/math">
+                      <m:f>
+                        <m:fPr>
+                          <m:ctrlPr>
+                            <a:rPr lang="de-DE" sz="1200" i="1">
+                              <a:latin typeface="Cambria Math" panose="02040503050406030204" pitchFamily="18" charset="0"/>
+                              <a:ea typeface="Cambria Math" panose="02040503050406030204" pitchFamily="18" charset="0"/>
+                            </a:rPr>
+                          </m:ctrlPr>
+                        </m:fPr>
+                        <m:num>
+                          <m:sSub>
+                            <m:sSubPr>
+                              <m:ctrlPr>
+                                <a:rPr lang="de-DE" sz="1200" i="1">
+                                  <a:latin typeface="Cambria Math" panose="02040503050406030204" pitchFamily="18" charset="0"/>
+                                  <a:ea typeface="Cambria Math" panose="02040503050406030204" pitchFamily="18" charset="0"/>
+                                </a:rPr>
+                              </m:ctrlPr>
+                            </m:sSubPr>
+                            <m:e>
+                              <m:r>
+                                <a:rPr lang="de-DE" sz="1200" b="0" i="1">
+                                  <a:latin typeface="Cambria Math" panose="02040503050406030204" pitchFamily="18" charset="0"/>
+                                  <a:ea typeface="Cambria Math" panose="02040503050406030204" pitchFamily="18" charset="0"/>
+                                </a:rPr>
+                                <m:t>𝑁</m:t>
+                              </m:r>
+                            </m:e>
+                            <m:sub>
+                              <m:r>
+                                <a:rPr lang="de-DE" sz="1200" b="0" i="1">
+                                  <a:latin typeface="Cambria Math" panose="02040503050406030204" pitchFamily="18" charset="0"/>
+                                  <a:ea typeface="Cambria Math" panose="02040503050406030204" pitchFamily="18" charset="0"/>
+                                </a:rPr>
+                                <m:t>𝑙𝑎𝑡</m:t>
+                              </m:r>
+                            </m:sub>
+                          </m:sSub>
+                        </m:num>
+                        <m:den>
+                          <m:sSup>
+                            <m:sSupPr>
+                              <m:ctrlPr>
+                                <a:rPr lang="de-DE" sz="1200" i="1">
+                                  <a:latin typeface="Cambria Math" panose="02040503050406030204" pitchFamily="18" charset="0"/>
+                                  <a:ea typeface="Cambria Math" panose="02040503050406030204" pitchFamily="18" charset="0"/>
+                                </a:rPr>
+                              </m:ctrlPr>
+                            </m:sSupPr>
+                            <m:e>
+                              <m:r>
+                                <a:rPr lang="de-DE" sz="1200" b="0" i="1">
+                                  <a:latin typeface="Cambria Math" panose="02040503050406030204" pitchFamily="18" charset="0"/>
+                                  <a:ea typeface="Cambria Math" panose="02040503050406030204" pitchFamily="18" charset="0"/>
+                                </a:rPr>
+                                <m:t>2</m:t>
+                              </m:r>
+                            </m:e>
+                            <m:sup>
+                              <m:r>
+                                <a:rPr lang="de-DE" sz="1200" b="0" i="1">
+                                  <a:latin typeface="Cambria Math" panose="02040503050406030204" pitchFamily="18" charset="0"/>
+                                  <a:ea typeface="Cambria Math" panose="02040503050406030204" pitchFamily="18" charset="0"/>
+                                </a:rPr>
+                                <m:t>1</m:t>
+                              </m:r>
+                            </m:sup>
+                          </m:sSup>
+                        </m:den>
+                      </m:f>
+                      <m:r>
+                        <a:rPr lang="de-DE" sz="1200" i="1">
+                          <a:latin typeface="Cambria Math" panose="02040503050406030204" pitchFamily="18" charset="0"/>
+                          <a:ea typeface="Cambria Math" panose="02040503050406030204" pitchFamily="18" charset="0"/>
+                        </a:rPr>
+                        <m:t>×</m:t>
+                      </m:r>
+                      <m:f>
+                        <m:fPr>
+                          <m:ctrlPr>
+                            <a:rPr lang="de-DE" sz="1200" i="1">
+                              <a:latin typeface="Cambria Math" panose="02040503050406030204" pitchFamily="18" charset="0"/>
+                              <a:ea typeface="Cambria Math" panose="02040503050406030204" pitchFamily="18" charset="0"/>
+                            </a:rPr>
+                          </m:ctrlPr>
+                        </m:fPr>
+                        <m:num>
+                          <m:sSub>
+                            <m:sSubPr>
+                              <m:ctrlPr>
+                                <a:rPr lang="de-DE" sz="1200" i="1">
+                                  <a:latin typeface="Cambria Math" panose="02040503050406030204" pitchFamily="18" charset="0"/>
+                                  <a:ea typeface="Cambria Math" panose="02040503050406030204" pitchFamily="18" charset="0"/>
+                                </a:rPr>
+                              </m:ctrlPr>
+                            </m:sSubPr>
+                            <m:e>
+                              <m:r>
+                                <a:rPr lang="de-DE" sz="1200" b="0" i="1">
+                                  <a:latin typeface="Cambria Math" panose="02040503050406030204" pitchFamily="18" charset="0"/>
+                                  <a:ea typeface="Cambria Math" panose="02040503050406030204" pitchFamily="18" charset="0"/>
+                                </a:rPr>
+                                <m:t>𝑁</m:t>
+                              </m:r>
+                            </m:e>
+                            <m:sub>
+                              <m:r>
+                                <a:rPr lang="de-DE" sz="1200" b="0" i="1">
+                                  <a:latin typeface="Cambria Math" panose="02040503050406030204" pitchFamily="18" charset="0"/>
+                                  <a:ea typeface="Cambria Math" panose="02040503050406030204" pitchFamily="18" charset="0"/>
+                                </a:rPr>
+                                <m:t>𝑙𝑜𝑛</m:t>
+                              </m:r>
+                            </m:sub>
+                          </m:sSub>
+                        </m:num>
+                        <m:den>
+                          <m:sSup>
+                            <m:sSupPr>
+                              <m:ctrlPr>
+                                <a:rPr lang="de-DE" sz="1200" i="1">
+                                  <a:latin typeface="Cambria Math" panose="02040503050406030204" pitchFamily="18" charset="0"/>
+                                  <a:ea typeface="Cambria Math" panose="02040503050406030204" pitchFamily="18" charset="0"/>
+                                </a:rPr>
+                              </m:ctrlPr>
+                            </m:sSupPr>
+                            <m:e>
+                              <m:r>
+                                <a:rPr lang="de-DE" sz="1200" b="0" i="1">
+                                  <a:latin typeface="Cambria Math" panose="02040503050406030204" pitchFamily="18" charset="0"/>
+                                  <a:ea typeface="Cambria Math" panose="02040503050406030204" pitchFamily="18" charset="0"/>
+                                </a:rPr>
+                                <m:t>2</m:t>
+                              </m:r>
+                            </m:e>
+                            <m:sup>
+                              <m:r>
+                                <a:rPr lang="de-DE" sz="1200" b="0" i="1">
+                                  <a:latin typeface="Cambria Math" panose="02040503050406030204" pitchFamily="18" charset="0"/>
+                                  <a:ea typeface="Cambria Math" panose="02040503050406030204" pitchFamily="18" charset="0"/>
+                                </a:rPr>
+                                <m:t>1</m:t>
+                              </m:r>
+                            </m:sup>
+                          </m:sSup>
+                        </m:den>
+                      </m:f>
+                    </m:oMath>
+                  </m:oMathPara>
+                </a14:m>
+                <a:endParaRPr lang="de-DE" sz="1200"/>
+              </a:p>
+            </p:txBody>
+          </p:sp>
+        </mc:Choice>
+        <mc:Fallback xmlns="">
+          <p:sp>
+            <p:nvSpPr>
+              <p:cNvPr id="5" name="Textfeld 4">
+                <a:extLst>
+                  <a:ext uri="{FF2B5EF4-FFF2-40B4-BE49-F238E27FC236}">
+                    <a16:creationId xmlns:a16="http://schemas.microsoft.com/office/drawing/2014/main" id="{78429FA1-5B62-D75B-7CDA-19F13AD54C8F}"/>
+                  </a:ext>
+                </a:extLst>
+              </p:cNvPr>
+              <p:cNvSpPr txBox="1">
+                <a:spLocks noRot="1" noChangeAspect="1" noMove="1" noResize="1" noEditPoints="1" noAdjustHandles="1" noChangeArrowheads="1" noChangeShapeType="1" noTextEdit="1"/>
+              </p:cNvSpPr>
+              <p:nvPr/>
+            </p:nvSpPr>
+            <p:spPr>
+              <a:xfrm>
+                <a:off x="2204718" y="1276612"/>
+                <a:ext cx="753668" cy="355803"/>
+              </a:xfrm>
+              <a:prstGeom prst="rect">
+                <a:avLst/>
+              </a:prstGeom>
+              <a:blipFill>
+                <a:blip r:embed="rId6"/>
+                <a:stretch>
+                  <a:fillRect l="-5000" r="-1667" b="-10345"/>
+                </a:stretch>
+              </a:blipFill>
+            </p:spPr>
+            <p:txBody>
+              <a:bodyPr/>
+              <a:lstStyle/>
+              <a:p>
+                <a:r>
+                  <a:rPr lang="de-DE">
+                    <a:noFill/>
+                  </a:rPr>
+                  <a:t> </a:t>
+                </a:r>
+              </a:p>
+            </p:txBody>
+          </p:sp>
+        </mc:Fallback>
+      </mc:AlternateContent>
+      <mc:AlternateContent xmlns:mc="http://schemas.openxmlformats.org/markup-compatibility/2006" xmlns:a14="http://schemas.microsoft.com/office/drawing/2010/main">
+        <mc:Choice Requires="a14">
+          <p:sp>
+            <p:nvSpPr>
+              <p:cNvPr id="7" name="Textfeld 6">
+                <a:extLst>
+                  <a:ext uri="{FF2B5EF4-FFF2-40B4-BE49-F238E27FC236}">
+                    <a16:creationId xmlns:a16="http://schemas.microsoft.com/office/drawing/2014/main" id="{C07D105C-0A59-530C-FF16-B97FFCF76112}"/>
+                  </a:ext>
+                </a:extLst>
+              </p:cNvPr>
+              <p:cNvSpPr txBox="1"/>
+              <p:nvPr/>
+            </p:nvSpPr>
+            <p:spPr>
+              <a:xfrm>
+                <a:off x="2920292" y="1766346"/>
+                <a:ext cx="753668" cy="355803"/>
+              </a:xfrm>
+              <a:prstGeom prst="rect">
+                <a:avLst/>
+              </a:prstGeom>
+              <a:noFill/>
+            </p:spPr>
+            <p:txBody>
+              <a:bodyPr wrap="none" lIns="0" tIns="0" rIns="0" bIns="0" rtlCol="0">
+                <a:spAutoFit/>
+              </a:bodyPr>
+              <a:lstStyle/>
+              <a:p>
+                <a:pPr/>
+                <a14:m>
+                  <m:oMathPara xmlns:m="http://schemas.openxmlformats.org/officeDocument/2006/math">
+                    <m:oMathParaPr>
+                      <m:jc m:val="centerGroup"/>
+                    </m:oMathParaPr>
+                    <m:oMath xmlns:m="http://schemas.openxmlformats.org/officeDocument/2006/math">
+                      <m:f>
+                        <m:fPr>
+                          <m:ctrlPr>
+                            <a:rPr lang="de-DE" sz="1200" i="1">
+                              <a:latin typeface="Cambria Math" panose="02040503050406030204" pitchFamily="18" charset="0"/>
+                              <a:ea typeface="Cambria Math" panose="02040503050406030204" pitchFamily="18" charset="0"/>
+                            </a:rPr>
+                          </m:ctrlPr>
+                        </m:fPr>
+                        <m:num>
+                          <m:sSub>
+                            <m:sSubPr>
+                              <m:ctrlPr>
+                                <a:rPr lang="de-DE" sz="1200" i="1">
+                                  <a:latin typeface="Cambria Math" panose="02040503050406030204" pitchFamily="18" charset="0"/>
+                                  <a:ea typeface="Cambria Math" panose="02040503050406030204" pitchFamily="18" charset="0"/>
+                                </a:rPr>
+                              </m:ctrlPr>
+                            </m:sSubPr>
+                            <m:e>
+                              <m:r>
+                                <a:rPr lang="de-DE" sz="1200" b="0" i="1">
+                                  <a:latin typeface="Cambria Math" panose="02040503050406030204" pitchFamily="18" charset="0"/>
+                                  <a:ea typeface="Cambria Math" panose="02040503050406030204" pitchFamily="18" charset="0"/>
+                                </a:rPr>
+                                <m:t>𝑁</m:t>
+                              </m:r>
+                            </m:e>
+                            <m:sub>
+                              <m:r>
+                                <a:rPr lang="de-DE" sz="1200" b="0" i="1">
+                                  <a:latin typeface="Cambria Math" panose="02040503050406030204" pitchFamily="18" charset="0"/>
+                                  <a:ea typeface="Cambria Math" panose="02040503050406030204" pitchFamily="18" charset="0"/>
+                                </a:rPr>
+                                <m:t>𝑙𝑎𝑡</m:t>
+                              </m:r>
+                            </m:sub>
+                          </m:sSub>
+                        </m:num>
+                        <m:den>
+                          <m:sSup>
+                            <m:sSupPr>
+                              <m:ctrlPr>
+                                <a:rPr lang="de-DE" sz="1200" i="1">
+                                  <a:latin typeface="Cambria Math" panose="02040503050406030204" pitchFamily="18" charset="0"/>
+                                  <a:ea typeface="Cambria Math" panose="02040503050406030204" pitchFamily="18" charset="0"/>
+                                </a:rPr>
+                              </m:ctrlPr>
+                            </m:sSupPr>
+                            <m:e>
+                              <m:r>
+                                <a:rPr lang="de-DE" sz="1200" b="0" i="1">
+                                  <a:latin typeface="Cambria Math" panose="02040503050406030204" pitchFamily="18" charset="0"/>
+                                  <a:ea typeface="Cambria Math" panose="02040503050406030204" pitchFamily="18" charset="0"/>
+                                </a:rPr>
+                                <m:t>2</m:t>
+                              </m:r>
+                            </m:e>
+                            <m:sup>
+                              <m:r>
+                                <a:rPr lang="de-DE" sz="1200" b="0" i="1">
+                                  <a:latin typeface="Cambria Math" panose="02040503050406030204" pitchFamily="18" charset="0"/>
+                                  <a:ea typeface="Cambria Math" panose="02040503050406030204" pitchFamily="18" charset="0"/>
+                                </a:rPr>
+                                <m:t>2</m:t>
+                              </m:r>
+                            </m:sup>
+                          </m:sSup>
+                        </m:den>
+                      </m:f>
+                      <m:r>
+                        <a:rPr lang="de-DE" sz="1200" i="1">
+                          <a:latin typeface="Cambria Math" panose="02040503050406030204" pitchFamily="18" charset="0"/>
+                          <a:ea typeface="Cambria Math" panose="02040503050406030204" pitchFamily="18" charset="0"/>
+                        </a:rPr>
+                        <m:t>×</m:t>
+                      </m:r>
+                      <m:f>
+                        <m:fPr>
+                          <m:ctrlPr>
+                            <a:rPr lang="de-DE" sz="1200" i="1">
+                              <a:latin typeface="Cambria Math" panose="02040503050406030204" pitchFamily="18" charset="0"/>
+                              <a:ea typeface="Cambria Math" panose="02040503050406030204" pitchFamily="18" charset="0"/>
+                            </a:rPr>
+                          </m:ctrlPr>
+                        </m:fPr>
+                        <m:num>
+                          <m:sSub>
+                            <m:sSubPr>
+                              <m:ctrlPr>
+                                <a:rPr lang="de-DE" sz="1200" i="1">
+                                  <a:latin typeface="Cambria Math" panose="02040503050406030204" pitchFamily="18" charset="0"/>
+                                  <a:ea typeface="Cambria Math" panose="02040503050406030204" pitchFamily="18" charset="0"/>
+                                </a:rPr>
+                              </m:ctrlPr>
+                            </m:sSubPr>
+                            <m:e>
+                              <m:r>
+                                <a:rPr lang="de-DE" sz="1200" b="0" i="1">
+                                  <a:latin typeface="Cambria Math" panose="02040503050406030204" pitchFamily="18" charset="0"/>
+                                  <a:ea typeface="Cambria Math" panose="02040503050406030204" pitchFamily="18" charset="0"/>
+                                </a:rPr>
+                                <m:t>𝑁</m:t>
+                              </m:r>
+                            </m:e>
+                            <m:sub>
+                              <m:r>
+                                <a:rPr lang="de-DE" sz="1200" b="0" i="1">
+                                  <a:latin typeface="Cambria Math" panose="02040503050406030204" pitchFamily="18" charset="0"/>
+                                  <a:ea typeface="Cambria Math" panose="02040503050406030204" pitchFamily="18" charset="0"/>
+                                </a:rPr>
+                                <m:t>𝑙𝑜𝑛</m:t>
+                              </m:r>
+                            </m:sub>
+                          </m:sSub>
+                        </m:num>
+                        <m:den>
+                          <m:sSup>
+                            <m:sSupPr>
+                              <m:ctrlPr>
+                                <a:rPr lang="de-DE" sz="1200" i="1">
+                                  <a:latin typeface="Cambria Math" panose="02040503050406030204" pitchFamily="18" charset="0"/>
+                                  <a:ea typeface="Cambria Math" panose="02040503050406030204" pitchFamily="18" charset="0"/>
+                                </a:rPr>
+                              </m:ctrlPr>
+                            </m:sSupPr>
+                            <m:e>
+                              <m:r>
+                                <a:rPr lang="de-DE" sz="1200" b="0" i="1">
+                                  <a:latin typeface="Cambria Math" panose="02040503050406030204" pitchFamily="18" charset="0"/>
+                                  <a:ea typeface="Cambria Math" panose="02040503050406030204" pitchFamily="18" charset="0"/>
+                                </a:rPr>
+                                <m:t>2</m:t>
+                              </m:r>
+                            </m:e>
+                            <m:sup>
+                              <m:r>
+                                <a:rPr lang="de-DE" sz="1200" b="0" i="1">
+                                  <a:latin typeface="Cambria Math" panose="02040503050406030204" pitchFamily="18" charset="0"/>
+                                  <a:ea typeface="Cambria Math" panose="02040503050406030204" pitchFamily="18" charset="0"/>
+                                </a:rPr>
+                                <m:t>2</m:t>
+                              </m:r>
+                            </m:sup>
+                          </m:sSup>
+                        </m:den>
+                      </m:f>
+                    </m:oMath>
+                  </m:oMathPara>
+                </a14:m>
+                <a:endParaRPr lang="de-DE" sz="1200"/>
+              </a:p>
+            </p:txBody>
+          </p:sp>
+        </mc:Choice>
+        <mc:Fallback xmlns="">
+          <p:sp>
+            <p:nvSpPr>
+              <p:cNvPr id="7" name="Textfeld 6">
+                <a:extLst>
+                  <a:ext uri="{FF2B5EF4-FFF2-40B4-BE49-F238E27FC236}">
+                    <a16:creationId xmlns:a16="http://schemas.microsoft.com/office/drawing/2014/main" id="{C07D105C-0A59-530C-FF16-B97FFCF76112}"/>
+                  </a:ext>
+                </a:extLst>
+              </p:cNvPr>
+              <p:cNvSpPr txBox="1">
+                <a:spLocks noRot="1" noChangeAspect="1" noMove="1" noResize="1" noEditPoints="1" noAdjustHandles="1" noChangeArrowheads="1" noChangeShapeType="1" noTextEdit="1"/>
+              </p:cNvSpPr>
+              <p:nvPr/>
+            </p:nvSpPr>
+            <p:spPr>
+              <a:xfrm>
+                <a:off x="2920292" y="1766346"/>
+                <a:ext cx="753668" cy="355803"/>
+              </a:xfrm>
+              <a:prstGeom prst="rect">
+                <a:avLst/>
+              </a:prstGeom>
+              <a:blipFill>
+                <a:blip r:embed="rId7"/>
+                <a:stretch>
+                  <a:fillRect l="-3279" t="-3448" r="-1639" b="-10345"/>
+                </a:stretch>
+              </a:blipFill>
+            </p:spPr>
+            <p:txBody>
+              <a:bodyPr/>
+              <a:lstStyle/>
+              <a:p>
+                <a:r>
+                  <a:rPr lang="de-DE">
+                    <a:noFill/>
+                  </a:rPr>
+                  <a:t> </a:t>
+                </a:r>
+              </a:p>
+            </p:txBody>
+          </p:sp>
+        </mc:Fallback>
+      </mc:AlternateContent>
+      <mc:AlternateContent xmlns:mc="http://schemas.openxmlformats.org/markup-compatibility/2006" xmlns:a14="http://schemas.microsoft.com/office/drawing/2010/main">
+        <mc:Choice Requires="a14">
+          <p:sp>
+            <p:nvSpPr>
+              <p:cNvPr id="45" name="Textfeld 44">
+                <a:extLst>
+                  <a:ext uri="{FF2B5EF4-FFF2-40B4-BE49-F238E27FC236}">
+                    <a16:creationId xmlns:a16="http://schemas.microsoft.com/office/drawing/2014/main" id="{52A64690-B9C5-28B5-A344-3B4F9A343F3B}"/>
+                  </a:ext>
+                </a:extLst>
+              </p:cNvPr>
+              <p:cNvSpPr txBox="1"/>
+              <p:nvPr/>
+            </p:nvSpPr>
+            <p:spPr>
+              <a:xfrm>
+                <a:off x="3532736" y="2339183"/>
+                <a:ext cx="753668" cy="355803"/>
+              </a:xfrm>
+              <a:prstGeom prst="rect">
+                <a:avLst/>
+              </a:prstGeom>
+              <a:noFill/>
+            </p:spPr>
+            <p:txBody>
+              <a:bodyPr wrap="none" lIns="0" tIns="0" rIns="0" bIns="0" rtlCol="0">
+                <a:spAutoFit/>
+              </a:bodyPr>
+              <a:lstStyle/>
+              <a:p>
+                <a:pPr/>
+                <a14:m>
+                  <m:oMathPara xmlns:m="http://schemas.openxmlformats.org/officeDocument/2006/math">
+                    <m:oMathParaPr>
+                      <m:jc m:val="centerGroup"/>
+                    </m:oMathParaPr>
+                    <m:oMath xmlns:m="http://schemas.openxmlformats.org/officeDocument/2006/math">
+                      <m:f>
+                        <m:fPr>
+                          <m:ctrlPr>
+                            <a:rPr lang="de-DE" sz="1200" i="1">
+                              <a:latin typeface="Cambria Math" panose="02040503050406030204" pitchFamily="18" charset="0"/>
+                              <a:ea typeface="Cambria Math" panose="02040503050406030204" pitchFamily="18" charset="0"/>
+                            </a:rPr>
+                          </m:ctrlPr>
+                        </m:fPr>
+                        <m:num>
+                          <m:sSub>
+                            <m:sSubPr>
+                              <m:ctrlPr>
+                                <a:rPr lang="de-DE" sz="1200" i="1">
+                                  <a:latin typeface="Cambria Math" panose="02040503050406030204" pitchFamily="18" charset="0"/>
+                                  <a:ea typeface="Cambria Math" panose="02040503050406030204" pitchFamily="18" charset="0"/>
+                                </a:rPr>
+                              </m:ctrlPr>
+                            </m:sSubPr>
+                            <m:e>
+                              <m:r>
+                                <a:rPr lang="de-DE" sz="1200" b="0" i="1">
+                                  <a:latin typeface="Cambria Math" panose="02040503050406030204" pitchFamily="18" charset="0"/>
+                                  <a:ea typeface="Cambria Math" panose="02040503050406030204" pitchFamily="18" charset="0"/>
+                                </a:rPr>
+                                <m:t>𝑁</m:t>
+                              </m:r>
+                            </m:e>
+                            <m:sub>
+                              <m:r>
+                                <a:rPr lang="de-DE" sz="1200" b="0" i="1">
+                                  <a:latin typeface="Cambria Math" panose="02040503050406030204" pitchFamily="18" charset="0"/>
+                                  <a:ea typeface="Cambria Math" panose="02040503050406030204" pitchFamily="18" charset="0"/>
+                                </a:rPr>
+                                <m:t>𝑙𝑎𝑡</m:t>
+                              </m:r>
+                            </m:sub>
+                          </m:sSub>
+                        </m:num>
+                        <m:den>
+                          <m:sSup>
+                            <m:sSupPr>
+                              <m:ctrlPr>
+                                <a:rPr lang="de-DE" sz="1200" i="1">
+                                  <a:latin typeface="Cambria Math" panose="02040503050406030204" pitchFamily="18" charset="0"/>
+                                  <a:ea typeface="Cambria Math" panose="02040503050406030204" pitchFamily="18" charset="0"/>
+                                </a:rPr>
+                              </m:ctrlPr>
+                            </m:sSupPr>
+                            <m:e>
+                              <m:r>
+                                <a:rPr lang="de-DE" sz="1200" b="0" i="1">
+                                  <a:latin typeface="Cambria Math" panose="02040503050406030204" pitchFamily="18" charset="0"/>
+                                  <a:ea typeface="Cambria Math" panose="02040503050406030204" pitchFamily="18" charset="0"/>
+                                </a:rPr>
+                                <m:t>2</m:t>
+                              </m:r>
+                            </m:e>
+                            <m:sup>
+                              <m:r>
+                                <a:rPr lang="de-DE" sz="1200" b="0" i="1">
+                                  <a:latin typeface="Cambria Math" panose="02040503050406030204" pitchFamily="18" charset="0"/>
+                                  <a:ea typeface="Cambria Math" panose="02040503050406030204" pitchFamily="18" charset="0"/>
+                                </a:rPr>
+                                <m:t>3</m:t>
+                              </m:r>
+                            </m:sup>
+                          </m:sSup>
+                        </m:den>
+                      </m:f>
+                      <m:r>
+                        <a:rPr lang="de-DE" sz="1200" i="1">
+                          <a:latin typeface="Cambria Math" panose="02040503050406030204" pitchFamily="18" charset="0"/>
+                          <a:ea typeface="Cambria Math" panose="02040503050406030204" pitchFamily="18" charset="0"/>
+                        </a:rPr>
+                        <m:t>×</m:t>
+                      </m:r>
+                      <m:f>
+                        <m:fPr>
+                          <m:ctrlPr>
+                            <a:rPr lang="de-DE" sz="1200" i="1">
+                              <a:latin typeface="Cambria Math" panose="02040503050406030204" pitchFamily="18" charset="0"/>
+                              <a:ea typeface="Cambria Math" panose="02040503050406030204" pitchFamily="18" charset="0"/>
+                            </a:rPr>
+                          </m:ctrlPr>
+                        </m:fPr>
+                        <m:num>
+                          <m:sSub>
+                            <m:sSubPr>
+                              <m:ctrlPr>
+                                <a:rPr lang="de-DE" sz="1200" i="1">
+                                  <a:latin typeface="Cambria Math" panose="02040503050406030204" pitchFamily="18" charset="0"/>
+                                  <a:ea typeface="Cambria Math" panose="02040503050406030204" pitchFamily="18" charset="0"/>
+                                </a:rPr>
+                              </m:ctrlPr>
+                            </m:sSubPr>
+                            <m:e>
+                              <m:r>
+                                <a:rPr lang="de-DE" sz="1200" b="0" i="1">
+                                  <a:latin typeface="Cambria Math" panose="02040503050406030204" pitchFamily="18" charset="0"/>
+                                  <a:ea typeface="Cambria Math" panose="02040503050406030204" pitchFamily="18" charset="0"/>
+                                </a:rPr>
+                                <m:t>𝑁</m:t>
+                              </m:r>
+                            </m:e>
+                            <m:sub>
+                              <m:r>
+                                <a:rPr lang="de-DE" sz="1200" b="0" i="1">
+                                  <a:latin typeface="Cambria Math" panose="02040503050406030204" pitchFamily="18" charset="0"/>
+                                  <a:ea typeface="Cambria Math" panose="02040503050406030204" pitchFamily="18" charset="0"/>
+                                </a:rPr>
+                                <m:t>𝑙𝑜𝑛</m:t>
+                              </m:r>
+                            </m:sub>
+                          </m:sSub>
+                        </m:num>
+                        <m:den>
+                          <m:sSup>
+                            <m:sSupPr>
+                              <m:ctrlPr>
+                                <a:rPr lang="de-DE" sz="1200" i="1">
+                                  <a:latin typeface="Cambria Math" panose="02040503050406030204" pitchFamily="18" charset="0"/>
+                                  <a:ea typeface="Cambria Math" panose="02040503050406030204" pitchFamily="18" charset="0"/>
+                                </a:rPr>
+                              </m:ctrlPr>
+                            </m:sSupPr>
+                            <m:e>
+                              <m:r>
+                                <a:rPr lang="de-DE" sz="1200" b="0" i="1">
+                                  <a:latin typeface="Cambria Math" panose="02040503050406030204" pitchFamily="18" charset="0"/>
+                                  <a:ea typeface="Cambria Math" panose="02040503050406030204" pitchFamily="18" charset="0"/>
+                                </a:rPr>
+                                <m:t>2</m:t>
+                              </m:r>
+                            </m:e>
+                            <m:sup>
+                              <m:r>
+                                <a:rPr lang="de-DE" sz="1200" b="0" i="1">
+                                  <a:latin typeface="Cambria Math" panose="02040503050406030204" pitchFamily="18" charset="0"/>
+                                  <a:ea typeface="Cambria Math" panose="02040503050406030204" pitchFamily="18" charset="0"/>
+                                </a:rPr>
+                                <m:t>3</m:t>
+                              </m:r>
+                            </m:sup>
+                          </m:sSup>
+                        </m:den>
+                      </m:f>
+                    </m:oMath>
+                  </m:oMathPara>
+                </a14:m>
+                <a:endParaRPr lang="de-DE" sz="1200"/>
+              </a:p>
+            </p:txBody>
+          </p:sp>
+        </mc:Choice>
+        <mc:Fallback xmlns="">
+          <p:sp>
+            <p:nvSpPr>
+              <p:cNvPr id="45" name="Textfeld 44">
+                <a:extLst>
+                  <a:ext uri="{FF2B5EF4-FFF2-40B4-BE49-F238E27FC236}">
+                    <a16:creationId xmlns:a16="http://schemas.microsoft.com/office/drawing/2014/main" id="{52A64690-B9C5-28B5-A344-3B4F9A343F3B}"/>
+                  </a:ext>
+                </a:extLst>
+              </p:cNvPr>
+              <p:cNvSpPr txBox="1">
+                <a:spLocks noRot="1" noChangeAspect="1" noMove="1" noResize="1" noEditPoints="1" noAdjustHandles="1" noChangeArrowheads="1" noChangeShapeType="1" noTextEdit="1"/>
+              </p:cNvSpPr>
+              <p:nvPr/>
+            </p:nvSpPr>
+            <p:spPr>
+              <a:xfrm>
+                <a:off x="3532736" y="2339183"/>
+                <a:ext cx="753668" cy="355803"/>
+              </a:xfrm>
+              <a:prstGeom prst="rect">
+                <a:avLst/>
+              </a:prstGeom>
+              <a:blipFill>
+                <a:blip r:embed="rId8"/>
+                <a:stretch>
+                  <a:fillRect l="-5000" t="-3448" r="-1667" b="-10345"/>
+                </a:stretch>
+              </a:blipFill>
+            </p:spPr>
+            <p:txBody>
+              <a:bodyPr/>
+              <a:lstStyle/>
+              <a:p>
+                <a:r>
+                  <a:rPr lang="de-DE">
+                    <a:noFill/>
+                  </a:rPr>
+                  <a:t> </a:t>
+                </a:r>
+              </a:p>
+            </p:txBody>
+          </p:sp>
+        </mc:Fallback>
+      </mc:AlternateContent>
+      <mc:AlternateContent xmlns:mc="http://schemas.openxmlformats.org/markup-compatibility/2006" xmlns:a14="http://schemas.microsoft.com/office/drawing/2010/main">
+        <mc:Choice Requires="a14">
+          <p:sp>
+            <p:nvSpPr>
+              <p:cNvPr id="54" name="Textfeld 53">
+                <a:extLst>
+                  <a:ext uri="{FF2B5EF4-FFF2-40B4-BE49-F238E27FC236}">
+                    <a16:creationId xmlns:a16="http://schemas.microsoft.com/office/drawing/2014/main" id="{F2D29C54-571F-00DA-5BA0-52598BFEAC62}"/>
+                  </a:ext>
+                </a:extLst>
+              </p:cNvPr>
+              <p:cNvSpPr txBox="1"/>
+              <p:nvPr/>
+            </p:nvSpPr>
+            <p:spPr>
+              <a:xfrm>
+                <a:off x="1916984" y="1454318"/>
+                <a:ext cx="181588" cy="184666"/>
+              </a:xfrm>
+              <a:prstGeom prst="rect">
+                <a:avLst/>
+              </a:prstGeom>
+              <a:noFill/>
+            </p:spPr>
+            <p:txBody>
+              <a:bodyPr wrap="none" lIns="0" tIns="0" rIns="0" bIns="0" rtlCol="0">
+                <a:spAutoFit/>
+              </a:bodyPr>
+              <a:lstStyle/>
+              <a:p>
+                <a:pPr/>
+                <a14:m>
+                  <m:oMathPara xmlns:m="http://schemas.openxmlformats.org/officeDocument/2006/math">
+                    <m:oMathParaPr>
+                      <m:jc m:val="centerGroup"/>
+                    </m:oMathParaPr>
+                    <m:oMath xmlns:m="http://schemas.openxmlformats.org/officeDocument/2006/math">
+                      <m:sSub>
+                        <m:sSubPr>
+                          <m:ctrlPr>
+                            <a:rPr lang="de-DE" sz="1200" i="1">
+                              <a:latin typeface="Cambria Math" panose="02040503050406030204" pitchFamily="18" charset="0"/>
+                            </a:rPr>
+                          </m:ctrlPr>
+                        </m:sSubPr>
+                        <m:e>
+                          <m:r>
+                            <a:rPr lang="de-DE" sz="1200" b="0" i="1">
+                              <a:latin typeface="Cambria Math" panose="02040503050406030204" pitchFamily="18" charset="0"/>
+                            </a:rPr>
+                            <m:t>𝐹</m:t>
+                          </m:r>
+                        </m:e>
+                        <m:sub>
+                          <m:r>
+                            <a:rPr lang="de-DE" sz="1200" b="0" i="1">
+                              <a:latin typeface="Cambria Math" panose="02040503050406030204" pitchFamily="18" charset="0"/>
+                            </a:rPr>
+                            <m:t>1</m:t>
+                          </m:r>
+                        </m:sub>
+                      </m:sSub>
+                    </m:oMath>
+                  </m:oMathPara>
+                </a14:m>
+                <a:endParaRPr lang="de-DE" sz="1200"/>
+              </a:p>
+            </p:txBody>
+          </p:sp>
+        </mc:Choice>
+        <mc:Fallback xmlns="">
+          <p:sp>
+            <p:nvSpPr>
+              <p:cNvPr id="54" name="Textfeld 53">
+                <a:extLst>
+                  <a:ext uri="{FF2B5EF4-FFF2-40B4-BE49-F238E27FC236}">
+                    <a16:creationId xmlns:a16="http://schemas.microsoft.com/office/drawing/2014/main" id="{F2D29C54-571F-00DA-5BA0-52598BFEAC62}"/>
+                  </a:ext>
+                </a:extLst>
+              </p:cNvPr>
+              <p:cNvSpPr txBox="1">
+                <a:spLocks noRot="1" noChangeAspect="1" noMove="1" noResize="1" noEditPoints="1" noAdjustHandles="1" noChangeArrowheads="1" noChangeShapeType="1" noTextEdit="1"/>
+              </p:cNvSpPr>
+              <p:nvPr/>
+            </p:nvSpPr>
+            <p:spPr>
+              <a:xfrm>
+                <a:off x="1916984" y="1454318"/>
+                <a:ext cx="181588" cy="184666"/>
+              </a:xfrm>
+              <a:prstGeom prst="rect">
+                <a:avLst/>
+              </a:prstGeom>
+              <a:blipFill>
+                <a:blip r:embed="rId9"/>
+                <a:stretch>
+                  <a:fillRect l="-12500" r="-6250" b="-12500"/>
+                </a:stretch>
+              </a:blipFill>
+            </p:spPr>
+            <p:txBody>
+              <a:bodyPr/>
+              <a:lstStyle/>
+              <a:p>
+                <a:r>
+                  <a:rPr lang="de-DE">
+                    <a:noFill/>
+                  </a:rPr>
+                  <a:t> </a:t>
+                </a:r>
+              </a:p>
+            </p:txBody>
+          </p:sp>
+        </mc:Fallback>
+      </mc:AlternateContent>
+      <mc:AlternateContent xmlns:mc="http://schemas.openxmlformats.org/markup-compatibility/2006" xmlns:a14="http://schemas.microsoft.com/office/drawing/2010/main">
+        <mc:Choice Requires="a14">
+          <p:sp>
+            <p:nvSpPr>
+              <p:cNvPr id="61" name="Textfeld 60">
+                <a:extLst>
+                  <a:ext uri="{FF2B5EF4-FFF2-40B4-BE49-F238E27FC236}">
+                    <a16:creationId xmlns:a16="http://schemas.microsoft.com/office/drawing/2014/main" id="{AC09E71D-E9CD-7E3A-92C1-EAD3F70EE334}"/>
+                  </a:ext>
+                </a:extLst>
+              </p:cNvPr>
+              <p:cNvSpPr txBox="1"/>
+              <p:nvPr/>
+            </p:nvSpPr>
+            <p:spPr>
+              <a:xfrm>
+                <a:off x="2025668" y="1937751"/>
+                <a:ext cx="185179" cy="184666"/>
+              </a:xfrm>
+              <a:prstGeom prst="rect">
+                <a:avLst/>
+              </a:prstGeom>
+              <a:noFill/>
+            </p:spPr>
+            <p:txBody>
+              <a:bodyPr wrap="none" lIns="0" tIns="0" rIns="0" bIns="0" rtlCol="0">
+                <a:spAutoFit/>
+              </a:bodyPr>
+              <a:lstStyle/>
+              <a:p>
+                <a:pPr/>
+                <a14:m>
+                  <m:oMathPara xmlns:m="http://schemas.openxmlformats.org/officeDocument/2006/math">
+                    <m:oMathParaPr>
+                      <m:jc m:val="centerGroup"/>
+                    </m:oMathParaPr>
+                    <m:oMath xmlns:m="http://schemas.openxmlformats.org/officeDocument/2006/math">
+                      <m:sSub>
+                        <m:sSubPr>
+                          <m:ctrlPr>
+                            <a:rPr lang="de-DE" sz="1200" i="1">
+                              <a:latin typeface="Cambria Math" panose="02040503050406030204" pitchFamily="18" charset="0"/>
+                            </a:rPr>
+                          </m:ctrlPr>
+                        </m:sSubPr>
+                        <m:e>
+                          <m:r>
+                            <a:rPr lang="de-DE" sz="1200" b="0" i="1">
+                              <a:latin typeface="Cambria Math" panose="02040503050406030204" pitchFamily="18" charset="0"/>
+                            </a:rPr>
+                            <m:t>𝐹</m:t>
+                          </m:r>
+                        </m:e>
+                        <m:sub>
+                          <m:r>
+                            <a:rPr lang="de-DE" sz="1200" b="0" i="1">
+                              <a:latin typeface="Cambria Math" panose="02040503050406030204" pitchFamily="18" charset="0"/>
+                            </a:rPr>
+                            <m:t>2</m:t>
+                          </m:r>
+                        </m:sub>
+                      </m:sSub>
+                    </m:oMath>
+                  </m:oMathPara>
+                </a14:m>
+                <a:endParaRPr lang="de-DE" sz="1200"/>
+              </a:p>
+            </p:txBody>
+          </p:sp>
+        </mc:Choice>
+        <mc:Fallback xmlns="">
+          <p:sp>
+            <p:nvSpPr>
+              <p:cNvPr id="61" name="Textfeld 60">
+                <a:extLst>
+                  <a:ext uri="{FF2B5EF4-FFF2-40B4-BE49-F238E27FC236}">
+                    <a16:creationId xmlns:a16="http://schemas.microsoft.com/office/drawing/2014/main" id="{AC09E71D-E9CD-7E3A-92C1-EAD3F70EE334}"/>
+                  </a:ext>
+                </a:extLst>
+              </p:cNvPr>
+              <p:cNvSpPr txBox="1">
+                <a:spLocks noRot="1" noChangeAspect="1" noMove="1" noResize="1" noEditPoints="1" noAdjustHandles="1" noChangeArrowheads="1" noChangeShapeType="1" noTextEdit="1"/>
+              </p:cNvSpPr>
+              <p:nvPr/>
+            </p:nvSpPr>
+            <p:spPr>
+              <a:xfrm>
+                <a:off x="2025668" y="1937751"/>
+                <a:ext cx="185179" cy="184666"/>
+              </a:xfrm>
+              <a:prstGeom prst="rect">
+                <a:avLst/>
+              </a:prstGeom>
+              <a:blipFill>
+                <a:blip r:embed="rId10"/>
+                <a:stretch>
+                  <a:fillRect l="-18750" r="-6250" b="-12500"/>
+                </a:stretch>
+              </a:blipFill>
+            </p:spPr>
+            <p:txBody>
+              <a:bodyPr/>
+              <a:lstStyle/>
+              <a:p>
+                <a:r>
+                  <a:rPr lang="de-DE">
+                    <a:noFill/>
+                  </a:rPr>
+                  <a:t> </a:t>
+                </a:r>
+              </a:p>
+            </p:txBody>
+          </p:sp>
+        </mc:Fallback>
+      </mc:AlternateContent>
+      <mc:AlternateContent xmlns:mc="http://schemas.openxmlformats.org/markup-compatibility/2006" xmlns:a14="http://schemas.microsoft.com/office/drawing/2010/main">
+        <mc:Choice Requires="a14">
+          <p:sp>
+            <p:nvSpPr>
+              <p:cNvPr id="62" name="Textfeld 61">
+                <a:extLst>
+                  <a:ext uri="{FF2B5EF4-FFF2-40B4-BE49-F238E27FC236}">
+                    <a16:creationId xmlns:a16="http://schemas.microsoft.com/office/drawing/2014/main" id="{D42E6C0F-E344-7B3E-FB62-7F3FB7F8659F}"/>
+                  </a:ext>
+                </a:extLst>
+              </p:cNvPr>
+              <p:cNvSpPr txBox="1"/>
+              <p:nvPr/>
+            </p:nvSpPr>
+            <p:spPr>
+              <a:xfrm>
+                <a:off x="2967530" y="2559664"/>
+                <a:ext cx="185179" cy="184666"/>
+              </a:xfrm>
+              <a:prstGeom prst="rect">
+                <a:avLst/>
+              </a:prstGeom>
+              <a:noFill/>
+            </p:spPr>
+            <p:txBody>
+              <a:bodyPr wrap="none" lIns="0" tIns="0" rIns="0" bIns="0" rtlCol="0">
+                <a:spAutoFit/>
+              </a:bodyPr>
+              <a:lstStyle/>
+              <a:p>
+                <a:pPr/>
+                <a14:m>
+                  <m:oMathPara xmlns:m="http://schemas.openxmlformats.org/officeDocument/2006/math">
+                    <m:oMathParaPr>
+                      <m:jc m:val="centerGroup"/>
+                    </m:oMathParaPr>
+                    <m:oMath xmlns:m="http://schemas.openxmlformats.org/officeDocument/2006/math">
+                      <m:sSub>
+                        <m:sSubPr>
+                          <m:ctrlPr>
+                            <a:rPr lang="de-DE" sz="1200" i="1">
+                              <a:latin typeface="Cambria Math" panose="02040503050406030204" pitchFamily="18" charset="0"/>
+                            </a:rPr>
+                          </m:ctrlPr>
+                        </m:sSubPr>
+                        <m:e>
+                          <m:r>
+                            <a:rPr lang="de-DE" sz="1200" b="0" i="1">
+                              <a:latin typeface="Cambria Math" panose="02040503050406030204" pitchFamily="18" charset="0"/>
+                            </a:rPr>
+                            <m:t>𝐹</m:t>
+                          </m:r>
+                        </m:e>
+                        <m:sub>
+                          <m:r>
+                            <a:rPr lang="de-DE" sz="1200" b="0" i="1">
+                              <a:latin typeface="Cambria Math" panose="02040503050406030204" pitchFamily="18" charset="0"/>
+                            </a:rPr>
+                            <m:t>3</m:t>
+                          </m:r>
+                        </m:sub>
+                      </m:sSub>
+                    </m:oMath>
+                  </m:oMathPara>
+                </a14:m>
+                <a:endParaRPr lang="de-DE" sz="1200"/>
+              </a:p>
+            </p:txBody>
+          </p:sp>
+        </mc:Choice>
+        <mc:Fallback xmlns="">
+          <p:sp>
+            <p:nvSpPr>
+              <p:cNvPr id="62" name="Textfeld 61">
+                <a:extLst>
+                  <a:ext uri="{FF2B5EF4-FFF2-40B4-BE49-F238E27FC236}">
+                    <a16:creationId xmlns:a16="http://schemas.microsoft.com/office/drawing/2014/main" id="{D42E6C0F-E344-7B3E-FB62-7F3FB7F8659F}"/>
+                  </a:ext>
+                </a:extLst>
+              </p:cNvPr>
+              <p:cNvSpPr txBox="1">
+                <a:spLocks noRot="1" noChangeAspect="1" noMove="1" noResize="1" noEditPoints="1" noAdjustHandles="1" noChangeArrowheads="1" noChangeShapeType="1" noTextEdit="1"/>
+              </p:cNvSpPr>
+              <p:nvPr/>
+            </p:nvSpPr>
+            <p:spPr>
+              <a:xfrm>
+                <a:off x="2967530" y="2559664"/>
+                <a:ext cx="185179" cy="184666"/>
+              </a:xfrm>
+              <a:prstGeom prst="rect">
+                <a:avLst/>
+              </a:prstGeom>
+              <a:blipFill>
+                <a:blip r:embed="rId11"/>
+                <a:stretch>
+                  <a:fillRect l="-18750" r="-6250" b="-12500"/>
+                </a:stretch>
+              </a:blipFill>
+            </p:spPr>
+            <p:txBody>
+              <a:bodyPr/>
+              <a:lstStyle/>
+              <a:p>
+                <a:r>
+                  <a:rPr lang="de-DE">
+                    <a:noFill/>
+                  </a:rPr>
+                  <a:t> </a:t>
+                </a:r>
+              </a:p>
+            </p:txBody>
+          </p:sp>
+        </mc:Fallback>
+      </mc:AlternateContent>
+      <mc:AlternateContent xmlns:mc="http://schemas.openxmlformats.org/markup-compatibility/2006" xmlns:a14="http://schemas.microsoft.com/office/drawing/2010/main">
+        <mc:Choice Requires="a14">
+          <p:sp>
+            <p:nvSpPr>
+              <p:cNvPr id="67" name="Textfeld 66">
+                <a:extLst>
+                  <a:ext uri="{FF2B5EF4-FFF2-40B4-BE49-F238E27FC236}">
+                    <a16:creationId xmlns:a16="http://schemas.microsoft.com/office/drawing/2014/main" id="{48ED2C7F-6087-61C4-32BE-A6E55A1E081B}"/>
+                  </a:ext>
+                </a:extLst>
+              </p:cNvPr>
+              <p:cNvSpPr txBox="1"/>
+              <p:nvPr/>
+            </p:nvSpPr>
+            <p:spPr>
+              <a:xfrm>
+                <a:off x="3841694" y="3388940"/>
+                <a:ext cx="178574" cy="184666"/>
+              </a:xfrm>
+              <a:prstGeom prst="rect">
+                <a:avLst/>
+              </a:prstGeom>
+              <a:noFill/>
+            </p:spPr>
+            <p:txBody>
+              <a:bodyPr wrap="none" lIns="0" tIns="0" rIns="0" bIns="0" rtlCol="0">
+                <a:spAutoFit/>
+              </a:bodyPr>
+              <a:lstStyle/>
+              <a:p>
+                <a:pPr/>
+                <a14:m>
+                  <m:oMathPara xmlns:m="http://schemas.openxmlformats.org/officeDocument/2006/math">
+                    <m:oMathParaPr>
+                      <m:jc m:val="centerGroup"/>
+                    </m:oMathParaPr>
+                    <m:oMath xmlns:m="http://schemas.openxmlformats.org/officeDocument/2006/math">
+                      <m:sSub>
+                        <m:sSubPr>
+                          <m:ctrlPr>
+                            <a:rPr lang="de-DE" sz="1200" i="1">
+                              <a:latin typeface="Cambria Math" panose="02040503050406030204" pitchFamily="18" charset="0"/>
+                            </a:rPr>
+                          </m:ctrlPr>
+                        </m:sSubPr>
+                        <m:e>
+                          <m:r>
+                            <a:rPr lang="de-DE" sz="1200" b="0" i="1">
+                              <a:latin typeface="Cambria Math" panose="02040503050406030204" pitchFamily="18" charset="0"/>
+                            </a:rPr>
+                            <m:t>𝐹</m:t>
+                          </m:r>
+                        </m:e>
+                        <m:sub>
+                          <m:r>
+                            <a:rPr lang="de-DE" sz="1200" b="0" i="1">
+                              <a:latin typeface="Cambria Math" panose="02040503050406030204" pitchFamily="18" charset="0"/>
+                            </a:rPr>
+                            <m:t>4</m:t>
+                          </m:r>
+                        </m:sub>
+                      </m:sSub>
+                    </m:oMath>
+                  </m:oMathPara>
+                </a14:m>
+                <a:endParaRPr lang="de-DE" sz="1200"/>
+              </a:p>
+            </p:txBody>
+          </p:sp>
+        </mc:Choice>
+        <mc:Fallback xmlns="">
+          <p:sp>
+            <p:nvSpPr>
+              <p:cNvPr id="67" name="Textfeld 66">
+                <a:extLst>
+                  <a:ext uri="{FF2B5EF4-FFF2-40B4-BE49-F238E27FC236}">
+                    <a16:creationId xmlns:a16="http://schemas.microsoft.com/office/drawing/2014/main" id="{48ED2C7F-6087-61C4-32BE-A6E55A1E081B}"/>
+                  </a:ext>
+                </a:extLst>
+              </p:cNvPr>
+              <p:cNvSpPr txBox="1">
+                <a:spLocks noRot="1" noChangeAspect="1" noMove="1" noResize="1" noEditPoints="1" noAdjustHandles="1" noChangeArrowheads="1" noChangeShapeType="1" noTextEdit="1"/>
+              </p:cNvSpPr>
+              <p:nvPr/>
+            </p:nvSpPr>
+            <p:spPr>
+              <a:xfrm>
+                <a:off x="3841694" y="3388940"/>
+                <a:ext cx="178574" cy="184666"/>
+              </a:xfrm>
+              <a:prstGeom prst="rect">
+                <a:avLst/>
+              </a:prstGeom>
+              <a:blipFill>
+                <a:blip r:embed="rId12"/>
+                <a:stretch>
+                  <a:fillRect l="-20000" r="-6667" b="-12500"/>
+                </a:stretch>
+              </a:blipFill>
+            </p:spPr>
+            <p:txBody>
+              <a:bodyPr/>
+              <a:lstStyle/>
+              <a:p>
+                <a:r>
+                  <a:rPr lang="de-DE">
+                    <a:noFill/>
+                  </a:rPr>
+                  <a:t> </a:t>
+                </a:r>
+              </a:p>
+            </p:txBody>
+          </p:sp>
+        </mc:Fallback>
+      </mc:AlternateContent>
+      <mc:AlternateContent xmlns:mc="http://schemas.openxmlformats.org/markup-compatibility/2006" xmlns:a14="http://schemas.microsoft.com/office/drawing/2010/main">
+        <mc:Choice Requires="a14">
+          <p:sp>
+            <p:nvSpPr>
+              <p:cNvPr id="69" name="Textfeld 68">
+                <a:extLst>
+                  <a:ext uri="{FF2B5EF4-FFF2-40B4-BE49-F238E27FC236}">
+                    <a16:creationId xmlns:a16="http://schemas.microsoft.com/office/drawing/2014/main" id="{3C49DE15-AA41-D2FC-381D-408391DE591F}"/>
+                  </a:ext>
+                </a:extLst>
+              </p:cNvPr>
+              <p:cNvSpPr txBox="1"/>
+              <p:nvPr/>
+            </p:nvSpPr>
+            <p:spPr>
+              <a:xfrm>
+                <a:off x="2473055" y="3548221"/>
+                <a:ext cx="512256" cy="184666"/>
+              </a:xfrm>
+              <a:prstGeom prst="rect">
+                <a:avLst/>
+              </a:prstGeom>
+              <a:noFill/>
+            </p:spPr>
+            <p:txBody>
+              <a:bodyPr wrap="none" lIns="0" tIns="0" rIns="0" bIns="0" rtlCol="0">
+                <a:spAutoFit/>
+              </a:bodyPr>
+              <a:lstStyle/>
+              <a:p>
+                <a:pPr/>
+                <a14:m>
+                  <m:oMathPara xmlns:m="http://schemas.openxmlformats.org/officeDocument/2006/math">
+                    <m:oMathParaPr>
+                      <m:jc m:val="centerGroup"/>
+                    </m:oMathParaPr>
+                    <m:oMath xmlns:m="http://schemas.openxmlformats.org/officeDocument/2006/math">
+                      <m:sSub>
+                        <m:sSubPr>
+                          <m:ctrlPr>
+                            <a:rPr lang="de-DE" sz="1200" i="1">
+                              <a:latin typeface="Cambria Math" panose="02040503050406030204" pitchFamily="18" charset="0"/>
+                            </a:rPr>
+                          </m:ctrlPr>
+                        </m:sSubPr>
+                        <m:e>
+                          <m:r>
+                            <a:rPr lang="de-DE" sz="1200" b="0" i="1">
+                              <a:latin typeface="Cambria Math" panose="02040503050406030204" pitchFamily="18" charset="0"/>
+                            </a:rPr>
+                            <m:t>𝐹</m:t>
+                          </m:r>
+                        </m:e>
+                        <m:sub>
+                          <m:r>
+                            <a:rPr lang="de-DE" sz="1200" b="0" i="1">
+                              <a:latin typeface="Cambria Math" panose="02040503050406030204" pitchFamily="18" charset="0"/>
+                            </a:rPr>
+                            <m:t>3</m:t>
+                          </m:r>
+                        </m:sub>
+                      </m:sSub>
+                      <m:r>
+                        <a:rPr lang="de-DE" sz="1200" b="0" i="1">
+                          <a:latin typeface="Cambria Math" panose="02040503050406030204" pitchFamily="18" charset="0"/>
+                        </a:rPr>
+                        <m:t>+</m:t>
+                      </m:r>
+                      <m:sSub>
+                        <m:sSubPr>
+                          <m:ctrlPr>
+                            <a:rPr lang="de-DE" sz="1200" b="0" i="1">
+                              <a:latin typeface="Cambria Math" panose="02040503050406030204" pitchFamily="18" charset="0"/>
+                            </a:rPr>
+                          </m:ctrlPr>
+                        </m:sSubPr>
+                        <m:e>
+                          <m:r>
+                            <a:rPr lang="de-DE" sz="1200" b="0" i="1">
+                              <a:latin typeface="Cambria Math" panose="02040503050406030204" pitchFamily="18" charset="0"/>
+                            </a:rPr>
+                            <m:t>𝐹</m:t>
+                          </m:r>
+                        </m:e>
+                        <m:sub>
+                          <m:r>
+                            <a:rPr lang="de-DE" sz="1200" b="0" i="1">
+                              <a:latin typeface="Cambria Math" panose="02040503050406030204" pitchFamily="18" charset="0"/>
+                            </a:rPr>
+                            <m:t>4</m:t>
+                          </m:r>
+                        </m:sub>
+                      </m:sSub>
+                    </m:oMath>
+                  </m:oMathPara>
+                </a14:m>
+                <a:endParaRPr lang="de-DE" sz="1200"/>
+              </a:p>
+            </p:txBody>
+          </p:sp>
+        </mc:Choice>
+        <mc:Fallback xmlns="">
+          <p:sp>
+            <p:nvSpPr>
+              <p:cNvPr id="69" name="Textfeld 68">
+                <a:extLst>
+                  <a:ext uri="{FF2B5EF4-FFF2-40B4-BE49-F238E27FC236}">
+                    <a16:creationId xmlns:a16="http://schemas.microsoft.com/office/drawing/2014/main" id="{3C49DE15-AA41-D2FC-381D-408391DE591F}"/>
+                  </a:ext>
+                </a:extLst>
+              </p:cNvPr>
+              <p:cNvSpPr txBox="1">
+                <a:spLocks noRot="1" noChangeAspect="1" noMove="1" noResize="1" noEditPoints="1" noAdjustHandles="1" noChangeArrowheads="1" noChangeShapeType="1" noTextEdit="1"/>
+              </p:cNvSpPr>
+              <p:nvPr/>
+            </p:nvSpPr>
+            <p:spPr>
+              <a:xfrm>
+                <a:off x="2473055" y="3548221"/>
+                <a:ext cx="512256" cy="184666"/>
+              </a:xfrm>
+              <a:prstGeom prst="rect">
+                <a:avLst/>
+              </a:prstGeom>
+              <a:blipFill>
+                <a:blip r:embed="rId13"/>
+                <a:stretch>
+                  <a:fillRect l="-4762" r="-2381" b="-20000"/>
+                </a:stretch>
+              </a:blipFill>
+            </p:spPr>
+            <p:txBody>
+              <a:bodyPr/>
+              <a:lstStyle/>
+              <a:p>
+                <a:r>
+                  <a:rPr lang="de-DE">
+                    <a:noFill/>
+                  </a:rPr>
+                  <a:t> </a:t>
+                </a:r>
+              </a:p>
+            </p:txBody>
+          </p:sp>
+        </mc:Fallback>
+      </mc:AlternateContent>
+      <mc:AlternateContent xmlns:mc="http://schemas.openxmlformats.org/markup-compatibility/2006" xmlns:a14="http://schemas.microsoft.com/office/drawing/2010/main">
+        <mc:Choice Requires="a14">
+          <p:sp>
+            <p:nvSpPr>
+              <p:cNvPr id="78" name="Textfeld 77">
+                <a:extLst>
+                  <a:ext uri="{FF2B5EF4-FFF2-40B4-BE49-F238E27FC236}">
+                    <a16:creationId xmlns:a16="http://schemas.microsoft.com/office/drawing/2014/main" id="{4E3A456B-0B0A-1AA2-2022-197DEFB1F02D}"/>
+                  </a:ext>
+                </a:extLst>
+              </p:cNvPr>
+              <p:cNvSpPr txBox="1"/>
+              <p:nvPr/>
+            </p:nvSpPr>
+            <p:spPr>
+              <a:xfrm>
+                <a:off x="3421858" y="4193794"/>
+                <a:ext cx="185179" cy="184666"/>
+              </a:xfrm>
+              <a:prstGeom prst="rect">
+                <a:avLst/>
+              </a:prstGeom>
+              <a:noFill/>
+            </p:spPr>
+            <p:txBody>
+              <a:bodyPr wrap="none" lIns="0" tIns="0" rIns="0" bIns="0" rtlCol="0">
+                <a:spAutoFit/>
+              </a:bodyPr>
+              <a:lstStyle/>
+              <a:p>
+                <a:pPr/>
+                <a14:m>
+                  <m:oMathPara xmlns:m="http://schemas.openxmlformats.org/officeDocument/2006/math">
+                    <m:oMathParaPr>
+                      <m:jc m:val="centerGroup"/>
+                    </m:oMathParaPr>
+                    <m:oMath xmlns:m="http://schemas.openxmlformats.org/officeDocument/2006/math">
+                      <m:sSub>
+                        <m:sSubPr>
+                          <m:ctrlPr>
+                            <a:rPr lang="de-DE" sz="1200" i="1">
+                              <a:latin typeface="Cambria Math" panose="02040503050406030204" pitchFamily="18" charset="0"/>
+                            </a:rPr>
+                          </m:ctrlPr>
+                        </m:sSubPr>
+                        <m:e>
+                          <m:r>
+                            <a:rPr lang="de-DE" sz="1200" b="0" i="1">
+                              <a:latin typeface="Cambria Math" panose="02040503050406030204" pitchFamily="18" charset="0"/>
+                            </a:rPr>
+                            <m:t>𝐹</m:t>
+                          </m:r>
+                        </m:e>
+                        <m:sub>
+                          <m:r>
+                            <a:rPr lang="de-DE" sz="1200" b="0" i="1">
+                              <a:latin typeface="Cambria Math" panose="02040503050406030204" pitchFamily="18" charset="0"/>
+                            </a:rPr>
+                            <m:t>3</m:t>
+                          </m:r>
+                        </m:sub>
+                      </m:sSub>
+                    </m:oMath>
+                  </m:oMathPara>
+                </a14:m>
+                <a:endParaRPr lang="de-DE" sz="1200"/>
+              </a:p>
+            </p:txBody>
+          </p:sp>
+        </mc:Choice>
+        <mc:Fallback xmlns="">
+          <p:sp>
+            <p:nvSpPr>
+              <p:cNvPr id="78" name="Textfeld 77">
+                <a:extLst>
+                  <a:ext uri="{FF2B5EF4-FFF2-40B4-BE49-F238E27FC236}">
+                    <a16:creationId xmlns:a16="http://schemas.microsoft.com/office/drawing/2014/main" id="{4E3A456B-0B0A-1AA2-2022-197DEFB1F02D}"/>
+                  </a:ext>
+                </a:extLst>
+              </p:cNvPr>
+              <p:cNvSpPr txBox="1">
+                <a:spLocks noRot="1" noChangeAspect="1" noMove="1" noResize="1" noEditPoints="1" noAdjustHandles="1" noChangeArrowheads="1" noChangeShapeType="1" noTextEdit="1"/>
+              </p:cNvSpPr>
+              <p:nvPr/>
+            </p:nvSpPr>
+            <p:spPr>
+              <a:xfrm>
+                <a:off x="3421858" y="4193794"/>
+                <a:ext cx="185179" cy="184666"/>
+              </a:xfrm>
+              <a:prstGeom prst="rect">
+                <a:avLst/>
+              </a:prstGeom>
+              <a:blipFill>
+                <a:blip r:embed="rId14"/>
+                <a:stretch>
+                  <a:fillRect l="-18750" r="-6250" b="-20000"/>
+                </a:stretch>
+              </a:blipFill>
+            </p:spPr>
+            <p:txBody>
+              <a:bodyPr/>
+              <a:lstStyle/>
+              <a:p>
+                <a:r>
+                  <a:rPr lang="de-DE">
+                    <a:noFill/>
+                  </a:rPr>
+                  <a:t> </a:t>
+                </a:r>
+              </a:p>
+            </p:txBody>
+          </p:sp>
+        </mc:Fallback>
+      </mc:AlternateContent>
+      <mc:AlternateContent xmlns:mc="http://schemas.openxmlformats.org/markup-compatibility/2006" xmlns:a14="http://schemas.microsoft.com/office/drawing/2010/main">
+        <mc:Choice Requires="a14">
+          <p:sp>
+            <p:nvSpPr>
+              <p:cNvPr id="80" name="Textfeld 79">
+                <a:extLst>
+                  <a:ext uri="{FF2B5EF4-FFF2-40B4-BE49-F238E27FC236}">
+                    <a16:creationId xmlns:a16="http://schemas.microsoft.com/office/drawing/2014/main" id="{1FDE57B4-D3F3-1D42-338A-AB22E5E07D1D}"/>
+                  </a:ext>
+                </a:extLst>
+              </p:cNvPr>
+              <p:cNvSpPr txBox="1"/>
+              <p:nvPr/>
+            </p:nvSpPr>
+            <p:spPr>
+              <a:xfrm>
+                <a:off x="1485383" y="4292108"/>
+                <a:ext cx="518860" cy="184666"/>
+              </a:xfrm>
+              <a:prstGeom prst="rect">
+                <a:avLst/>
+              </a:prstGeom>
+              <a:noFill/>
+            </p:spPr>
+            <p:txBody>
+              <a:bodyPr wrap="none" lIns="0" tIns="0" rIns="0" bIns="0" rtlCol="0">
+                <a:spAutoFit/>
+              </a:bodyPr>
+              <a:lstStyle/>
+              <a:p>
+                <a:pPr/>
+                <a14:m>
+                  <m:oMathPara xmlns:m="http://schemas.openxmlformats.org/officeDocument/2006/math">
+                    <m:oMathParaPr>
+                      <m:jc m:val="centerGroup"/>
+                    </m:oMathParaPr>
+                    <m:oMath xmlns:m="http://schemas.openxmlformats.org/officeDocument/2006/math">
+                      <m:sSub>
+                        <m:sSubPr>
+                          <m:ctrlPr>
+                            <a:rPr lang="de-DE" sz="1200" i="1">
+                              <a:latin typeface="Cambria Math" panose="02040503050406030204" pitchFamily="18" charset="0"/>
+                            </a:rPr>
+                          </m:ctrlPr>
+                        </m:sSubPr>
+                        <m:e>
+                          <m:r>
+                            <a:rPr lang="de-DE" sz="1200" b="0" i="1">
+                              <a:latin typeface="Cambria Math" panose="02040503050406030204" pitchFamily="18" charset="0"/>
+                            </a:rPr>
+                            <m:t>𝐹</m:t>
+                          </m:r>
+                        </m:e>
+                        <m:sub>
+                          <m:r>
+                            <a:rPr lang="de-DE" sz="1200" b="0" i="1">
+                              <a:latin typeface="Cambria Math" panose="02040503050406030204" pitchFamily="18" charset="0"/>
+                            </a:rPr>
+                            <m:t>2</m:t>
+                          </m:r>
+                        </m:sub>
+                      </m:sSub>
+                      <m:r>
+                        <a:rPr lang="de-DE" sz="1200" b="0" i="1">
+                          <a:latin typeface="Cambria Math" panose="02040503050406030204" pitchFamily="18" charset="0"/>
+                        </a:rPr>
+                        <m:t>+</m:t>
+                      </m:r>
+                      <m:sSub>
+                        <m:sSubPr>
+                          <m:ctrlPr>
+                            <a:rPr lang="de-DE" sz="1200" b="0" i="1">
+                              <a:latin typeface="Cambria Math" panose="02040503050406030204" pitchFamily="18" charset="0"/>
+                            </a:rPr>
+                          </m:ctrlPr>
+                        </m:sSubPr>
+                        <m:e>
+                          <m:r>
+                            <a:rPr lang="de-DE" sz="1200" b="0" i="1">
+                              <a:latin typeface="Cambria Math" panose="02040503050406030204" pitchFamily="18" charset="0"/>
+                            </a:rPr>
+                            <m:t>𝐹</m:t>
+                          </m:r>
+                        </m:e>
+                        <m:sub>
+                          <m:r>
+                            <a:rPr lang="de-DE" sz="1200" b="0" i="1">
+                              <a:latin typeface="Cambria Math" panose="02040503050406030204" pitchFamily="18" charset="0"/>
+                            </a:rPr>
+                            <m:t>3</m:t>
+                          </m:r>
+                        </m:sub>
+                      </m:sSub>
+                    </m:oMath>
+                  </m:oMathPara>
+                </a14:m>
+                <a:endParaRPr lang="de-DE" sz="1200"/>
+              </a:p>
+            </p:txBody>
+          </p:sp>
+        </mc:Choice>
+        <mc:Fallback xmlns="">
+          <p:sp>
+            <p:nvSpPr>
+              <p:cNvPr id="80" name="Textfeld 79">
+                <a:extLst>
+                  <a:ext uri="{FF2B5EF4-FFF2-40B4-BE49-F238E27FC236}">
+                    <a16:creationId xmlns:a16="http://schemas.microsoft.com/office/drawing/2014/main" id="{1FDE57B4-D3F3-1D42-338A-AB22E5E07D1D}"/>
+                  </a:ext>
+                </a:extLst>
+              </p:cNvPr>
+              <p:cNvSpPr txBox="1">
+                <a:spLocks noRot="1" noChangeAspect="1" noMove="1" noResize="1" noEditPoints="1" noAdjustHandles="1" noChangeArrowheads="1" noChangeShapeType="1" noTextEdit="1"/>
+              </p:cNvSpPr>
+              <p:nvPr/>
+            </p:nvSpPr>
+            <p:spPr>
+              <a:xfrm>
+                <a:off x="1485383" y="4292108"/>
+                <a:ext cx="518860" cy="184666"/>
+              </a:xfrm>
+              <a:prstGeom prst="rect">
+                <a:avLst/>
+              </a:prstGeom>
+              <a:blipFill>
+                <a:blip r:embed="rId15"/>
+                <a:stretch>
+                  <a:fillRect l="-7317" r="-2439" b="-12500"/>
+                </a:stretch>
+              </a:blipFill>
+            </p:spPr>
+            <p:txBody>
+              <a:bodyPr/>
+              <a:lstStyle/>
+              <a:p>
+                <a:r>
+                  <a:rPr lang="de-DE">
+                    <a:noFill/>
+                  </a:rPr>
+                  <a:t> </a:t>
+                </a:r>
+              </a:p>
+            </p:txBody>
+          </p:sp>
+        </mc:Fallback>
+      </mc:AlternateContent>
+      <mc:AlternateContent xmlns:mc="http://schemas.openxmlformats.org/markup-compatibility/2006" xmlns:a14="http://schemas.microsoft.com/office/drawing/2010/main">
+        <mc:Choice Requires="a14">
+          <p:sp>
+            <p:nvSpPr>
+              <p:cNvPr id="81" name="Textfeld 80">
+                <a:extLst>
+                  <a:ext uri="{FF2B5EF4-FFF2-40B4-BE49-F238E27FC236}">
+                    <a16:creationId xmlns:a16="http://schemas.microsoft.com/office/drawing/2014/main" id="{24AA4D01-7537-A2A3-BE2B-057C9A5F0BCA}"/>
+                  </a:ext>
+                </a:extLst>
+              </p:cNvPr>
+              <p:cNvSpPr txBox="1"/>
+              <p:nvPr/>
+            </p:nvSpPr>
+            <p:spPr>
+              <a:xfrm>
+                <a:off x="2808124" y="4814970"/>
+                <a:ext cx="185179" cy="184666"/>
+              </a:xfrm>
+              <a:prstGeom prst="rect">
+                <a:avLst/>
+              </a:prstGeom>
+              <a:noFill/>
+            </p:spPr>
+            <p:txBody>
+              <a:bodyPr wrap="none" lIns="0" tIns="0" rIns="0" bIns="0" rtlCol="0">
+                <a:spAutoFit/>
+              </a:bodyPr>
+              <a:lstStyle/>
+              <a:p>
+                <a:pPr/>
+                <a14:m>
+                  <m:oMathPara xmlns:m="http://schemas.openxmlformats.org/officeDocument/2006/math">
+                    <m:oMathParaPr>
+                      <m:jc m:val="centerGroup"/>
+                    </m:oMathParaPr>
+                    <m:oMath xmlns:m="http://schemas.openxmlformats.org/officeDocument/2006/math">
+                      <m:sSub>
+                        <m:sSubPr>
+                          <m:ctrlPr>
+                            <a:rPr lang="de-DE" sz="1200" i="1">
+                              <a:latin typeface="Cambria Math" panose="02040503050406030204" pitchFamily="18" charset="0"/>
+                            </a:rPr>
+                          </m:ctrlPr>
+                        </m:sSubPr>
+                        <m:e>
+                          <m:r>
+                            <a:rPr lang="de-DE" sz="1200" b="0" i="1">
+                              <a:latin typeface="Cambria Math" panose="02040503050406030204" pitchFamily="18" charset="0"/>
+                            </a:rPr>
+                            <m:t>𝐹</m:t>
+                          </m:r>
+                        </m:e>
+                        <m:sub>
+                          <m:r>
+                            <a:rPr lang="de-DE" sz="1200" b="0" i="1">
+                              <a:latin typeface="Cambria Math" panose="02040503050406030204" pitchFamily="18" charset="0"/>
+                            </a:rPr>
+                            <m:t>2</m:t>
+                          </m:r>
+                        </m:sub>
+                      </m:sSub>
+                    </m:oMath>
+                  </m:oMathPara>
+                </a14:m>
+                <a:endParaRPr lang="de-DE" sz="1200"/>
+              </a:p>
+            </p:txBody>
+          </p:sp>
+        </mc:Choice>
+        <mc:Fallback xmlns="">
+          <p:sp>
+            <p:nvSpPr>
+              <p:cNvPr id="81" name="Textfeld 80">
+                <a:extLst>
+                  <a:ext uri="{FF2B5EF4-FFF2-40B4-BE49-F238E27FC236}">
+                    <a16:creationId xmlns:a16="http://schemas.microsoft.com/office/drawing/2014/main" id="{24AA4D01-7537-A2A3-BE2B-057C9A5F0BCA}"/>
+                  </a:ext>
+                </a:extLst>
+              </p:cNvPr>
+              <p:cNvSpPr txBox="1">
+                <a:spLocks noRot="1" noChangeAspect="1" noMove="1" noResize="1" noEditPoints="1" noAdjustHandles="1" noChangeArrowheads="1" noChangeShapeType="1" noTextEdit="1"/>
+              </p:cNvSpPr>
+              <p:nvPr/>
+            </p:nvSpPr>
+            <p:spPr>
+              <a:xfrm>
+                <a:off x="2808124" y="4814970"/>
+                <a:ext cx="185179" cy="184666"/>
+              </a:xfrm>
+              <a:prstGeom prst="rect">
+                <a:avLst/>
+              </a:prstGeom>
+              <a:blipFill>
+                <a:blip r:embed="rId16"/>
+                <a:stretch>
+                  <a:fillRect l="-20000" r="-13333" b="-13333"/>
+                </a:stretch>
+              </a:blipFill>
+            </p:spPr>
+            <p:txBody>
+              <a:bodyPr/>
+              <a:lstStyle/>
+              <a:p>
+                <a:r>
+                  <a:rPr lang="de-DE">
+                    <a:noFill/>
+                  </a:rPr>
+                  <a:t> </a:t>
+                </a:r>
+              </a:p>
+            </p:txBody>
+          </p:sp>
+        </mc:Fallback>
+      </mc:AlternateContent>
+      <mc:AlternateContent xmlns:mc="http://schemas.openxmlformats.org/markup-compatibility/2006" xmlns:a14="http://schemas.microsoft.com/office/drawing/2010/main">
+        <mc:Choice Requires="a14">
+          <p:sp>
+            <p:nvSpPr>
+              <p:cNvPr id="82" name="Textfeld 81">
+                <a:extLst>
+                  <a:ext uri="{FF2B5EF4-FFF2-40B4-BE49-F238E27FC236}">
+                    <a16:creationId xmlns:a16="http://schemas.microsoft.com/office/drawing/2014/main" id="{91B9618C-A0A5-C1DD-724E-2FF36D0E245C}"/>
+                  </a:ext>
+                </a:extLst>
+              </p:cNvPr>
+              <p:cNvSpPr txBox="1"/>
+              <p:nvPr/>
+            </p:nvSpPr>
+            <p:spPr>
+              <a:xfrm>
+                <a:off x="338920" y="4729337"/>
+                <a:ext cx="515269" cy="184666"/>
+              </a:xfrm>
+              <a:prstGeom prst="rect">
+                <a:avLst/>
+              </a:prstGeom>
+              <a:noFill/>
+            </p:spPr>
+            <p:txBody>
+              <a:bodyPr wrap="none" lIns="0" tIns="0" rIns="0" bIns="0" rtlCol="0">
+                <a:spAutoFit/>
+              </a:bodyPr>
+              <a:lstStyle/>
+              <a:p>
+                <a:pPr/>
+                <a14:m>
+                  <m:oMathPara xmlns:m="http://schemas.openxmlformats.org/officeDocument/2006/math">
+                    <m:oMathParaPr>
+                      <m:jc m:val="centerGroup"/>
+                    </m:oMathParaPr>
+                    <m:oMath xmlns:m="http://schemas.openxmlformats.org/officeDocument/2006/math">
+                      <m:sSub>
+                        <m:sSubPr>
+                          <m:ctrlPr>
+                            <a:rPr lang="de-DE" sz="1200" i="1">
+                              <a:latin typeface="Cambria Math" panose="02040503050406030204" pitchFamily="18" charset="0"/>
+                            </a:rPr>
+                          </m:ctrlPr>
+                        </m:sSubPr>
+                        <m:e>
+                          <m:r>
+                            <a:rPr lang="de-DE" sz="1200" b="0" i="1">
+                              <a:latin typeface="Cambria Math" panose="02040503050406030204" pitchFamily="18" charset="0"/>
+                            </a:rPr>
+                            <m:t>𝐹</m:t>
+                          </m:r>
+                        </m:e>
+                        <m:sub>
+                          <m:r>
+                            <a:rPr lang="de-DE" sz="1200" b="0" i="1">
+                              <a:latin typeface="Cambria Math" panose="02040503050406030204" pitchFamily="18" charset="0"/>
+                            </a:rPr>
+                            <m:t>1</m:t>
+                          </m:r>
+                        </m:sub>
+                      </m:sSub>
+                      <m:r>
+                        <a:rPr lang="de-DE" sz="1200" b="0" i="1">
+                          <a:latin typeface="Cambria Math" panose="02040503050406030204" pitchFamily="18" charset="0"/>
+                        </a:rPr>
+                        <m:t>+</m:t>
+                      </m:r>
+                      <m:sSub>
+                        <m:sSubPr>
+                          <m:ctrlPr>
+                            <a:rPr lang="de-DE" sz="1200" b="0" i="1">
+                              <a:latin typeface="Cambria Math" panose="02040503050406030204" pitchFamily="18" charset="0"/>
+                            </a:rPr>
+                          </m:ctrlPr>
+                        </m:sSubPr>
+                        <m:e>
+                          <m:r>
+                            <a:rPr lang="de-DE" sz="1200" b="0" i="1">
+                              <a:latin typeface="Cambria Math" panose="02040503050406030204" pitchFamily="18" charset="0"/>
+                            </a:rPr>
+                            <m:t>𝐹</m:t>
+                          </m:r>
+                        </m:e>
+                        <m:sub>
+                          <m:r>
+                            <a:rPr lang="de-DE" sz="1200" b="0" i="1">
+                              <a:latin typeface="Cambria Math" panose="02040503050406030204" pitchFamily="18" charset="0"/>
+                            </a:rPr>
+                            <m:t>2</m:t>
+                          </m:r>
+                        </m:sub>
+                      </m:sSub>
+                    </m:oMath>
+                  </m:oMathPara>
+                </a14:m>
+                <a:endParaRPr lang="de-DE" sz="1200"/>
+              </a:p>
+            </p:txBody>
+          </p:sp>
+        </mc:Choice>
+        <mc:Fallback xmlns="">
+          <p:sp>
+            <p:nvSpPr>
+              <p:cNvPr id="82" name="Textfeld 81">
+                <a:extLst>
+                  <a:ext uri="{FF2B5EF4-FFF2-40B4-BE49-F238E27FC236}">
+                    <a16:creationId xmlns:a16="http://schemas.microsoft.com/office/drawing/2014/main" id="{91B9618C-A0A5-C1DD-724E-2FF36D0E245C}"/>
+                  </a:ext>
+                </a:extLst>
+              </p:cNvPr>
+              <p:cNvSpPr txBox="1">
+                <a:spLocks noRot="1" noChangeAspect="1" noMove="1" noResize="1" noEditPoints="1" noAdjustHandles="1" noChangeArrowheads="1" noChangeShapeType="1" noTextEdit="1"/>
+              </p:cNvSpPr>
+              <p:nvPr/>
+            </p:nvSpPr>
+            <p:spPr>
+              <a:xfrm>
+                <a:off x="338920" y="4729337"/>
+                <a:ext cx="515269" cy="184666"/>
+              </a:xfrm>
+              <a:prstGeom prst="rect">
+                <a:avLst/>
+              </a:prstGeom>
+              <a:blipFill>
+                <a:blip r:embed="rId17"/>
+                <a:stretch>
+                  <a:fillRect l="-4762" r="-2381" b="-20000"/>
+                </a:stretch>
+              </a:blipFill>
+            </p:spPr>
+            <p:txBody>
+              <a:bodyPr/>
+              <a:lstStyle/>
+              <a:p>
+                <a:r>
+                  <a:rPr lang="de-DE">
+                    <a:noFill/>
+                  </a:rPr>
+                  <a:t> </a:t>
+                </a:r>
+              </a:p>
+            </p:txBody>
+          </p:sp>
+        </mc:Fallback>
+      </mc:AlternateContent>
+      <mc:AlternateContent xmlns:mc="http://schemas.openxmlformats.org/markup-compatibility/2006" xmlns:a14="http://schemas.microsoft.com/office/drawing/2010/main">
+        <mc:Choice Requires="a14">
+          <p:sp>
+            <p:nvSpPr>
+              <p:cNvPr id="83" name="Textfeld 82">
+                <a:extLst>
+                  <a:ext uri="{FF2B5EF4-FFF2-40B4-BE49-F238E27FC236}">
+                    <a16:creationId xmlns:a16="http://schemas.microsoft.com/office/drawing/2014/main" id="{67F02103-5360-36F2-B8A0-757F7A20ED39}"/>
+                  </a:ext>
+                </a:extLst>
+              </p:cNvPr>
+              <p:cNvSpPr txBox="1"/>
+              <p:nvPr/>
+            </p:nvSpPr>
+            <p:spPr>
+              <a:xfrm>
+                <a:off x="1923569" y="5282918"/>
+                <a:ext cx="181588" cy="184666"/>
+              </a:xfrm>
+              <a:prstGeom prst="rect">
+                <a:avLst/>
+              </a:prstGeom>
+              <a:noFill/>
+            </p:spPr>
+            <p:txBody>
+              <a:bodyPr wrap="none" lIns="0" tIns="0" rIns="0" bIns="0" rtlCol="0">
+                <a:spAutoFit/>
+              </a:bodyPr>
+              <a:lstStyle/>
+              <a:p>
+                <a:pPr/>
+                <a14:m>
+                  <m:oMathPara xmlns:m="http://schemas.openxmlformats.org/officeDocument/2006/math">
+                    <m:oMathParaPr>
+                      <m:jc m:val="centerGroup"/>
+                    </m:oMathParaPr>
+                    <m:oMath xmlns:m="http://schemas.openxmlformats.org/officeDocument/2006/math">
+                      <m:sSub>
+                        <m:sSubPr>
+                          <m:ctrlPr>
+                            <a:rPr lang="de-DE" sz="1200" i="1">
+                              <a:latin typeface="Cambria Math" panose="02040503050406030204" pitchFamily="18" charset="0"/>
+                            </a:rPr>
+                          </m:ctrlPr>
+                        </m:sSubPr>
+                        <m:e>
+                          <m:r>
+                            <a:rPr lang="de-DE" sz="1200" b="0" i="1">
+                              <a:latin typeface="Cambria Math" panose="02040503050406030204" pitchFamily="18" charset="0"/>
+                            </a:rPr>
+                            <m:t>𝐹</m:t>
+                          </m:r>
+                        </m:e>
+                        <m:sub>
+                          <m:r>
+                            <a:rPr lang="de-DE" sz="1200" b="0" i="1">
+                              <a:latin typeface="Cambria Math" panose="02040503050406030204" pitchFamily="18" charset="0"/>
+                            </a:rPr>
+                            <m:t>1</m:t>
+                          </m:r>
+                        </m:sub>
+                      </m:sSub>
+                    </m:oMath>
+                  </m:oMathPara>
+                </a14:m>
+                <a:endParaRPr lang="de-DE" sz="1200"/>
+              </a:p>
+            </p:txBody>
+          </p:sp>
+        </mc:Choice>
+        <mc:Fallback xmlns="">
+          <p:sp>
+            <p:nvSpPr>
+              <p:cNvPr id="83" name="Textfeld 82">
+                <a:extLst>
+                  <a:ext uri="{FF2B5EF4-FFF2-40B4-BE49-F238E27FC236}">
+                    <a16:creationId xmlns:a16="http://schemas.microsoft.com/office/drawing/2014/main" id="{67F02103-5360-36F2-B8A0-757F7A20ED39}"/>
+                  </a:ext>
+                </a:extLst>
+              </p:cNvPr>
+              <p:cNvSpPr txBox="1">
+                <a:spLocks noRot="1" noChangeAspect="1" noMove="1" noResize="1" noEditPoints="1" noAdjustHandles="1" noChangeArrowheads="1" noChangeShapeType="1" noTextEdit="1"/>
+              </p:cNvSpPr>
+              <p:nvPr/>
+            </p:nvSpPr>
+            <p:spPr>
+              <a:xfrm>
+                <a:off x="1923569" y="5282918"/>
+                <a:ext cx="181588" cy="184666"/>
+              </a:xfrm>
+              <a:prstGeom prst="rect">
+                <a:avLst/>
+              </a:prstGeom>
+              <a:blipFill>
+                <a:blip r:embed="rId18"/>
+                <a:stretch>
+                  <a:fillRect l="-20000" r="-13333" b="-13333"/>
+                </a:stretch>
+              </a:blipFill>
+            </p:spPr>
+            <p:txBody>
+              <a:bodyPr/>
+              <a:lstStyle/>
+              <a:p>
+                <a:r>
+                  <a:rPr lang="de-DE">
+                    <a:noFill/>
+                  </a:rPr>
+                  <a:t> </a:t>
+                </a:r>
+              </a:p>
+            </p:txBody>
+          </p:sp>
+        </mc:Fallback>
+      </mc:AlternateContent>
+      <p:cxnSp>
+        <p:nvCxnSpPr>
+          <p:cNvPr id="85" name="Gerade Verbindung mit Pfeil 84">
+            <a:extLst>
+              <a:ext uri="{FF2B5EF4-FFF2-40B4-BE49-F238E27FC236}">
+                <a16:creationId xmlns:a16="http://schemas.microsoft.com/office/drawing/2014/main" id="{A9523118-3A2D-989D-20AB-B433EFCB87A1}"/>
+              </a:ext>
+            </a:extLst>
+          </p:cNvPr>
+          <p:cNvCxnSpPr/>
+          <p:nvPr/>
+        </p:nvCxnSpPr>
+        <p:spPr>
+          <a:xfrm>
+            <a:off x="4164306" y="5108940"/>
+            <a:ext cx="0" cy="246993"/>
+          </a:xfrm>
+          <a:prstGeom prst="straightConnector1">
+            <a:avLst/>
+          </a:prstGeom>
+          <a:ln>
+            <a:tailEnd type="triangle"/>
+          </a:ln>
+        </p:spPr>
+        <p:style>
+          <a:lnRef idx="1">
+            <a:schemeClr val="accent1"/>
+          </a:lnRef>
+          <a:fillRef idx="0">
+            <a:schemeClr val="accent1"/>
+          </a:fillRef>
+          <a:effectRef idx="0">
+            <a:schemeClr val="accent1"/>
+          </a:effectRef>
+          <a:fontRef idx="minor">
+            <a:schemeClr val="tx1"/>
+          </a:fontRef>
+        </p:style>
+      </p:cxnSp>
+      <p:cxnSp>
+        <p:nvCxnSpPr>
+          <p:cNvPr id="86" name="Gerade Verbindung mit Pfeil 85">
+            <a:extLst>
+              <a:ext uri="{FF2B5EF4-FFF2-40B4-BE49-F238E27FC236}">
+                <a16:creationId xmlns:a16="http://schemas.microsoft.com/office/drawing/2014/main" id="{0992AB23-3FAA-F253-2370-1111D719F3FD}"/>
+              </a:ext>
+            </a:extLst>
+          </p:cNvPr>
+          <p:cNvCxnSpPr/>
+          <p:nvPr/>
+        </p:nvCxnSpPr>
+        <p:spPr>
+          <a:xfrm>
+            <a:off x="4472154" y="5114140"/>
+            <a:ext cx="0" cy="246993"/>
+          </a:xfrm>
+          <a:prstGeom prst="straightConnector1">
+            <a:avLst/>
+          </a:prstGeom>
+          <a:ln>
+            <a:tailEnd type="triangle"/>
+          </a:ln>
+        </p:spPr>
+        <p:style>
+          <a:lnRef idx="1">
+            <a:schemeClr val="accent1"/>
+          </a:lnRef>
+          <a:fillRef idx="0">
+            <a:schemeClr val="accent1"/>
+          </a:fillRef>
+          <a:effectRef idx="0">
+            <a:schemeClr val="accent1"/>
+          </a:effectRef>
+          <a:fontRef idx="minor">
+            <a:schemeClr val="tx1"/>
+          </a:fontRef>
+        </p:style>
+      </p:cxnSp>
+      <p:cxnSp>
+        <p:nvCxnSpPr>
+          <p:cNvPr id="87" name="Gerade Verbindung mit Pfeil 86">
+            <a:extLst>
+              <a:ext uri="{FF2B5EF4-FFF2-40B4-BE49-F238E27FC236}">
+                <a16:creationId xmlns:a16="http://schemas.microsoft.com/office/drawing/2014/main" id="{CFEC6B5F-FCEE-938B-B45C-3493DB60419B}"/>
+              </a:ext>
+            </a:extLst>
+          </p:cNvPr>
+          <p:cNvCxnSpPr/>
+          <p:nvPr/>
+        </p:nvCxnSpPr>
+        <p:spPr>
+          <a:xfrm>
+            <a:off x="4761714" y="5110196"/>
+            <a:ext cx="0" cy="246993"/>
+          </a:xfrm>
+          <a:prstGeom prst="straightConnector1">
+            <a:avLst/>
+          </a:prstGeom>
+          <a:ln>
+            <a:tailEnd type="triangle"/>
+          </a:ln>
+        </p:spPr>
+        <p:style>
+          <a:lnRef idx="1">
+            <a:schemeClr val="accent1"/>
+          </a:lnRef>
+          <a:fillRef idx="0">
+            <a:schemeClr val="accent1"/>
+          </a:fillRef>
+          <a:effectRef idx="0">
+            <a:schemeClr val="accent1"/>
+          </a:effectRef>
+          <a:fontRef idx="minor">
+            <a:schemeClr val="tx1"/>
+          </a:fontRef>
+        </p:style>
+      </p:cxnSp>
+      <p:cxnSp>
+        <p:nvCxnSpPr>
+          <p:cNvPr id="88" name="Gerade Verbindung mit Pfeil 87">
+            <a:extLst>
+              <a:ext uri="{FF2B5EF4-FFF2-40B4-BE49-F238E27FC236}">
+                <a16:creationId xmlns:a16="http://schemas.microsoft.com/office/drawing/2014/main" id="{FC3AD338-0FA7-38BA-8797-D3BD866BDDB1}"/>
+              </a:ext>
+            </a:extLst>
+          </p:cNvPr>
+          <p:cNvCxnSpPr/>
+          <p:nvPr/>
+        </p:nvCxnSpPr>
+        <p:spPr>
+          <a:xfrm>
+            <a:off x="5069562" y="5124540"/>
+            <a:ext cx="0" cy="246993"/>
+          </a:xfrm>
+          <a:prstGeom prst="straightConnector1">
+            <a:avLst/>
+          </a:prstGeom>
+          <a:ln>
+            <a:tailEnd type="triangle"/>
+          </a:ln>
+        </p:spPr>
+        <p:style>
+          <a:lnRef idx="1">
+            <a:schemeClr val="accent1"/>
+          </a:lnRef>
+          <a:fillRef idx="0">
+            <a:schemeClr val="accent1"/>
+          </a:fillRef>
+          <a:effectRef idx="0">
+            <a:schemeClr val="accent1"/>
+          </a:effectRef>
+          <a:fontRef idx="minor">
+            <a:schemeClr val="tx1"/>
+          </a:fontRef>
+        </p:style>
+      </p:cxnSp>
+      <mc:AlternateContent xmlns:mc="http://schemas.openxmlformats.org/markup-compatibility/2006" xmlns:a14="http://schemas.microsoft.com/office/drawing/2010/main">
+        <mc:Choice Requires="a14">
+          <p:sp>
+            <p:nvSpPr>
+              <p:cNvPr id="89" name="Textfeld 88">
+                <a:extLst>
+                  <a:ext uri="{FF2B5EF4-FFF2-40B4-BE49-F238E27FC236}">
+                    <a16:creationId xmlns:a16="http://schemas.microsoft.com/office/drawing/2014/main" id="{F5B8BFA5-4DE1-460F-CD11-26E78BA8CAD0}"/>
+                  </a:ext>
+                </a:extLst>
+              </p:cNvPr>
+              <p:cNvSpPr txBox="1"/>
+              <p:nvPr/>
+            </p:nvSpPr>
+            <p:spPr>
+              <a:xfrm>
+                <a:off x="4078236" y="4906732"/>
+                <a:ext cx="181588" cy="184666"/>
+              </a:xfrm>
+              <a:prstGeom prst="rect">
+                <a:avLst/>
+              </a:prstGeom>
+              <a:noFill/>
+            </p:spPr>
+            <p:txBody>
+              <a:bodyPr wrap="none" lIns="0" tIns="0" rIns="0" bIns="0" rtlCol="0">
+                <a:spAutoFit/>
+              </a:bodyPr>
+              <a:lstStyle/>
+              <a:p>
+                <a:pPr/>
+                <a14:m>
+                  <m:oMathPara xmlns:m="http://schemas.openxmlformats.org/officeDocument/2006/math">
+                    <m:oMathParaPr>
+                      <m:jc m:val="centerGroup"/>
+                    </m:oMathParaPr>
+                    <m:oMath xmlns:m="http://schemas.openxmlformats.org/officeDocument/2006/math">
+                      <m:sSub>
+                        <m:sSubPr>
+                          <m:ctrlPr>
+                            <a:rPr lang="de-DE" sz="1200" i="1">
+                              <a:latin typeface="Cambria Math" panose="02040503050406030204" pitchFamily="18" charset="0"/>
+                            </a:rPr>
+                          </m:ctrlPr>
+                        </m:sSubPr>
+                        <m:e>
+                          <m:r>
+                            <a:rPr lang="de-DE" sz="1200" b="0" i="1">
+                              <a:latin typeface="Cambria Math" panose="02040503050406030204" pitchFamily="18" charset="0"/>
+                            </a:rPr>
+                            <m:t>𝐹</m:t>
+                          </m:r>
+                        </m:e>
+                        <m:sub>
+                          <m:r>
+                            <a:rPr lang="de-DE" sz="1200" b="0" i="1">
+                              <a:latin typeface="Cambria Math" panose="02040503050406030204" pitchFamily="18" charset="0"/>
+                            </a:rPr>
+                            <m:t>1</m:t>
+                          </m:r>
+                        </m:sub>
+                      </m:sSub>
+                    </m:oMath>
+                  </m:oMathPara>
+                </a14:m>
+                <a:endParaRPr lang="de-DE" sz="1200"/>
+              </a:p>
+            </p:txBody>
+          </p:sp>
+        </mc:Choice>
+        <mc:Fallback xmlns="">
+          <p:sp>
+            <p:nvSpPr>
+              <p:cNvPr id="89" name="Textfeld 88">
+                <a:extLst>
+                  <a:ext uri="{FF2B5EF4-FFF2-40B4-BE49-F238E27FC236}">
+                    <a16:creationId xmlns:a16="http://schemas.microsoft.com/office/drawing/2014/main" id="{F5B8BFA5-4DE1-460F-CD11-26E78BA8CAD0}"/>
+                  </a:ext>
+                </a:extLst>
+              </p:cNvPr>
+              <p:cNvSpPr txBox="1">
+                <a:spLocks noRot="1" noChangeAspect="1" noMove="1" noResize="1" noEditPoints="1" noAdjustHandles="1" noChangeArrowheads="1" noChangeShapeType="1" noTextEdit="1"/>
+              </p:cNvSpPr>
+              <p:nvPr/>
+            </p:nvSpPr>
+            <p:spPr>
+              <a:xfrm>
+                <a:off x="4078236" y="4906732"/>
+                <a:ext cx="181588" cy="184666"/>
+              </a:xfrm>
+              <a:prstGeom prst="rect">
+                <a:avLst/>
+              </a:prstGeom>
+              <a:blipFill>
+                <a:blip r:embed="rId19"/>
+                <a:stretch>
+                  <a:fillRect l="-20000" r="-6667" b="-20000"/>
+                </a:stretch>
+              </a:blipFill>
+            </p:spPr>
+            <p:txBody>
+              <a:bodyPr/>
+              <a:lstStyle/>
+              <a:p>
+                <a:r>
+                  <a:rPr lang="de-DE">
+                    <a:noFill/>
+                  </a:rPr>
+                  <a:t> </a:t>
+                </a:r>
+              </a:p>
+            </p:txBody>
+          </p:sp>
+        </mc:Fallback>
+      </mc:AlternateContent>
+      <mc:AlternateContent xmlns:mc="http://schemas.openxmlformats.org/markup-compatibility/2006" xmlns:a14="http://schemas.microsoft.com/office/drawing/2010/main">
+        <mc:Choice Requires="a14">
+          <p:sp>
+            <p:nvSpPr>
+              <p:cNvPr id="90" name="Textfeld 89">
+                <a:extLst>
+                  <a:ext uri="{FF2B5EF4-FFF2-40B4-BE49-F238E27FC236}">
+                    <a16:creationId xmlns:a16="http://schemas.microsoft.com/office/drawing/2014/main" id="{1C4EF28E-5690-2902-77B4-883D7C182017}"/>
+                  </a:ext>
+                </a:extLst>
+              </p:cNvPr>
+              <p:cNvSpPr txBox="1"/>
+              <p:nvPr/>
+            </p:nvSpPr>
+            <p:spPr>
+              <a:xfrm>
+                <a:off x="4382749" y="4911745"/>
+                <a:ext cx="185179" cy="184666"/>
+              </a:xfrm>
+              <a:prstGeom prst="rect">
+                <a:avLst/>
+              </a:prstGeom>
+              <a:noFill/>
+            </p:spPr>
+            <p:txBody>
+              <a:bodyPr wrap="none" lIns="0" tIns="0" rIns="0" bIns="0" rtlCol="0">
+                <a:spAutoFit/>
+              </a:bodyPr>
+              <a:lstStyle/>
+              <a:p>
+                <a:pPr/>
+                <a14:m>
+                  <m:oMathPara xmlns:m="http://schemas.openxmlformats.org/officeDocument/2006/math">
+                    <m:oMathParaPr>
+                      <m:jc m:val="centerGroup"/>
+                    </m:oMathParaPr>
+                    <m:oMath xmlns:m="http://schemas.openxmlformats.org/officeDocument/2006/math">
+                      <m:sSub>
+                        <m:sSubPr>
+                          <m:ctrlPr>
+                            <a:rPr lang="de-DE" sz="1200" i="1">
+                              <a:latin typeface="Cambria Math" panose="02040503050406030204" pitchFamily="18" charset="0"/>
+                            </a:rPr>
+                          </m:ctrlPr>
+                        </m:sSubPr>
+                        <m:e>
+                          <m:r>
+                            <a:rPr lang="de-DE" sz="1200" b="0" i="1">
+                              <a:latin typeface="Cambria Math" panose="02040503050406030204" pitchFamily="18" charset="0"/>
+                            </a:rPr>
+                            <m:t>𝐹</m:t>
+                          </m:r>
+                        </m:e>
+                        <m:sub>
+                          <m:r>
+                            <a:rPr lang="de-DE" sz="1200" b="0" i="1">
+                              <a:latin typeface="Cambria Math" panose="02040503050406030204" pitchFamily="18" charset="0"/>
+                            </a:rPr>
+                            <m:t>2</m:t>
+                          </m:r>
+                        </m:sub>
+                      </m:sSub>
+                    </m:oMath>
+                  </m:oMathPara>
+                </a14:m>
+                <a:endParaRPr lang="de-DE" sz="1200"/>
+              </a:p>
+            </p:txBody>
+          </p:sp>
+        </mc:Choice>
+        <mc:Fallback xmlns="">
+          <p:sp>
+            <p:nvSpPr>
+              <p:cNvPr id="90" name="Textfeld 89">
+                <a:extLst>
+                  <a:ext uri="{FF2B5EF4-FFF2-40B4-BE49-F238E27FC236}">
+                    <a16:creationId xmlns:a16="http://schemas.microsoft.com/office/drawing/2014/main" id="{1C4EF28E-5690-2902-77B4-883D7C182017}"/>
+                  </a:ext>
+                </a:extLst>
+              </p:cNvPr>
+              <p:cNvSpPr txBox="1">
+                <a:spLocks noRot="1" noChangeAspect="1" noMove="1" noResize="1" noEditPoints="1" noAdjustHandles="1" noChangeArrowheads="1" noChangeShapeType="1" noTextEdit="1"/>
+              </p:cNvSpPr>
+              <p:nvPr/>
+            </p:nvSpPr>
+            <p:spPr>
+              <a:xfrm>
+                <a:off x="4382749" y="4911745"/>
+                <a:ext cx="185179" cy="184666"/>
+              </a:xfrm>
+              <a:prstGeom prst="rect">
+                <a:avLst/>
+              </a:prstGeom>
+              <a:blipFill>
+                <a:blip r:embed="rId20"/>
+                <a:stretch>
+                  <a:fillRect l="-20000" r="-6667" b="-12500"/>
+                </a:stretch>
+              </a:blipFill>
+            </p:spPr>
+            <p:txBody>
+              <a:bodyPr/>
+              <a:lstStyle/>
+              <a:p>
+                <a:r>
+                  <a:rPr lang="de-DE">
+                    <a:noFill/>
+                  </a:rPr>
+                  <a:t> </a:t>
+                </a:r>
+              </a:p>
+            </p:txBody>
+          </p:sp>
+        </mc:Fallback>
+      </mc:AlternateContent>
+      <mc:AlternateContent xmlns:mc="http://schemas.openxmlformats.org/markup-compatibility/2006" xmlns:a14="http://schemas.microsoft.com/office/drawing/2010/main">
+        <mc:Choice Requires="a14">
+          <p:sp>
+            <p:nvSpPr>
+              <p:cNvPr id="91" name="Textfeld 90">
+                <a:extLst>
+                  <a:ext uri="{FF2B5EF4-FFF2-40B4-BE49-F238E27FC236}">
+                    <a16:creationId xmlns:a16="http://schemas.microsoft.com/office/drawing/2014/main" id="{52E46462-E137-ABB7-8690-B0FB4ABA5605}"/>
+                  </a:ext>
+                </a:extLst>
+              </p:cNvPr>
+              <p:cNvSpPr txBox="1"/>
+              <p:nvPr/>
+            </p:nvSpPr>
+            <p:spPr>
+              <a:xfrm>
+                <a:off x="4687262" y="4907614"/>
+                <a:ext cx="185179" cy="184666"/>
+              </a:xfrm>
+              <a:prstGeom prst="rect">
+                <a:avLst/>
+              </a:prstGeom>
+              <a:noFill/>
+            </p:spPr>
+            <p:txBody>
+              <a:bodyPr wrap="none" lIns="0" tIns="0" rIns="0" bIns="0" rtlCol="0">
+                <a:spAutoFit/>
+              </a:bodyPr>
+              <a:lstStyle/>
+              <a:p>
+                <a:pPr/>
+                <a14:m>
+                  <m:oMathPara xmlns:m="http://schemas.openxmlformats.org/officeDocument/2006/math">
+                    <m:oMathParaPr>
+                      <m:jc m:val="centerGroup"/>
+                    </m:oMathParaPr>
+                    <m:oMath xmlns:m="http://schemas.openxmlformats.org/officeDocument/2006/math">
+                      <m:sSub>
+                        <m:sSubPr>
+                          <m:ctrlPr>
+                            <a:rPr lang="de-DE" sz="1200" i="1">
+                              <a:latin typeface="Cambria Math" panose="02040503050406030204" pitchFamily="18" charset="0"/>
+                            </a:rPr>
+                          </m:ctrlPr>
+                        </m:sSubPr>
+                        <m:e>
+                          <m:r>
+                            <a:rPr lang="de-DE" sz="1200" b="0" i="1">
+                              <a:latin typeface="Cambria Math" panose="02040503050406030204" pitchFamily="18" charset="0"/>
+                            </a:rPr>
+                            <m:t>𝐹</m:t>
+                          </m:r>
+                        </m:e>
+                        <m:sub>
+                          <m:r>
+                            <a:rPr lang="de-DE" sz="1200" b="0" i="1">
+                              <a:latin typeface="Cambria Math" panose="02040503050406030204" pitchFamily="18" charset="0"/>
+                            </a:rPr>
+                            <m:t>3</m:t>
+                          </m:r>
+                        </m:sub>
+                      </m:sSub>
+                    </m:oMath>
+                  </m:oMathPara>
+                </a14:m>
+                <a:endParaRPr lang="de-DE" sz="1200"/>
+              </a:p>
+            </p:txBody>
+          </p:sp>
+        </mc:Choice>
+        <mc:Fallback xmlns="">
+          <p:sp>
+            <p:nvSpPr>
+              <p:cNvPr id="91" name="Textfeld 90">
+                <a:extLst>
+                  <a:ext uri="{FF2B5EF4-FFF2-40B4-BE49-F238E27FC236}">
+                    <a16:creationId xmlns:a16="http://schemas.microsoft.com/office/drawing/2014/main" id="{52E46462-E137-ABB7-8690-B0FB4ABA5605}"/>
+                  </a:ext>
+                </a:extLst>
+              </p:cNvPr>
+              <p:cNvSpPr txBox="1">
+                <a:spLocks noRot="1" noChangeAspect="1" noMove="1" noResize="1" noEditPoints="1" noAdjustHandles="1" noChangeArrowheads="1" noChangeShapeType="1" noTextEdit="1"/>
+              </p:cNvSpPr>
+              <p:nvPr/>
+            </p:nvSpPr>
+            <p:spPr>
+              <a:xfrm>
+                <a:off x="4687262" y="4907614"/>
+                <a:ext cx="185179" cy="184666"/>
+              </a:xfrm>
+              <a:prstGeom prst="rect">
+                <a:avLst/>
+              </a:prstGeom>
+              <a:blipFill>
+                <a:blip r:embed="rId21"/>
+                <a:stretch>
+                  <a:fillRect l="-20000" r="-6667" b="-20000"/>
+                </a:stretch>
+              </a:blipFill>
+            </p:spPr>
+            <p:txBody>
+              <a:bodyPr/>
+              <a:lstStyle/>
+              <a:p>
+                <a:r>
+                  <a:rPr lang="de-DE">
+                    <a:noFill/>
+                  </a:rPr>
+                  <a:t> </a:t>
+                </a:r>
+              </a:p>
+            </p:txBody>
+          </p:sp>
+        </mc:Fallback>
+      </mc:AlternateContent>
+      <mc:AlternateContent xmlns:mc="http://schemas.openxmlformats.org/markup-compatibility/2006" xmlns:a14="http://schemas.microsoft.com/office/drawing/2010/main">
+        <mc:Choice Requires="a14">
+          <p:sp>
+            <p:nvSpPr>
+              <p:cNvPr id="92" name="Textfeld 91">
+                <a:extLst>
+                  <a:ext uri="{FF2B5EF4-FFF2-40B4-BE49-F238E27FC236}">
+                    <a16:creationId xmlns:a16="http://schemas.microsoft.com/office/drawing/2014/main" id="{0EDE3FF4-8DF0-D9A4-A5E1-D01767D90568}"/>
+                  </a:ext>
+                </a:extLst>
+              </p:cNvPr>
+              <p:cNvSpPr txBox="1"/>
+              <p:nvPr/>
+            </p:nvSpPr>
+            <p:spPr>
+              <a:xfrm>
+                <a:off x="4991775" y="4903483"/>
+                <a:ext cx="178574" cy="184666"/>
+              </a:xfrm>
+              <a:prstGeom prst="rect">
+                <a:avLst/>
+              </a:prstGeom>
+              <a:noFill/>
+            </p:spPr>
+            <p:txBody>
+              <a:bodyPr wrap="none" lIns="0" tIns="0" rIns="0" bIns="0" rtlCol="0">
+                <a:spAutoFit/>
+              </a:bodyPr>
+              <a:lstStyle/>
+              <a:p>
+                <a:pPr/>
+                <a14:m>
+                  <m:oMathPara xmlns:m="http://schemas.openxmlformats.org/officeDocument/2006/math">
+                    <m:oMathParaPr>
+                      <m:jc m:val="centerGroup"/>
+                    </m:oMathParaPr>
+                    <m:oMath xmlns:m="http://schemas.openxmlformats.org/officeDocument/2006/math">
+                      <m:sSub>
+                        <m:sSubPr>
+                          <m:ctrlPr>
+                            <a:rPr lang="de-DE" sz="1200" i="1">
+                              <a:latin typeface="Cambria Math" panose="02040503050406030204" pitchFamily="18" charset="0"/>
+                            </a:rPr>
+                          </m:ctrlPr>
+                        </m:sSubPr>
+                        <m:e>
+                          <m:r>
+                            <a:rPr lang="de-DE" sz="1200" b="0" i="1">
+                              <a:latin typeface="Cambria Math" panose="02040503050406030204" pitchFamily="18" charset="0"/>
+                            </a:rPr>
+                            <m:t>𝐹</m:t>
+                          </m:r>
+                        </m:e>
+                        <m:sub>
+                          <m:r>
+                            <a:rPr lang="de-DE" sz="1200" b="0" i="1">
+                              <a:latin typeface="Cambria Math" panose="02040503050406030204" pitchFamily="18" charset="0"/>
+                            </a:rPr>
+                            <m:t>4</m:t>
+                          </m:r>
+                        </m:sub>
+                      </m:sSub>
+                    </m:oMath>
+                  </m:oMathPara>
+                </a14:m>
+                <a:endParaRPr lang="de-DE" sz="1200"/>
+              </a:p>
+            </p:txBody>
+          </p:sp>
+        </mc:Choice>
+        <mc:Fallback xmlns="">
+          <p:sp>
+            <p:nvSpPr>
+              <p:cNvPr id="92" name="Textfeld 91">
+                <a:extLst>
+                  <a:ext uri="{FF2B5EF4-FFF2-40B4-BE49-F238E27FC236}">
+                    <a16:creationId xmlns:a16="http://schemas.microsoft.com/office/drawing/2014/main" id="{0EDE3FF4-8DF0-D9A4-A5E1-D01767D90568}"/>
+                  </a:ext>
+                </a:extLst>
+              </p:cNvPr>
+              <p:cNvSpPr txBox="1">
+                <a:spLocks noRot="1" noChangeAspect="1" noMove="1" noResize="1" noEditPoints="1" noAdjustHandles="1" noChangeArrowheads="1" noChangeShapeType="1" noTextEdit="1"/>
+              </p:cNvSpPr>
+              <p:nvPr/>
+            </p:nvSpPr>
+            <p:spPr>
+              <a:xfrm>
+                <a:off x="4991775" y="4903483"/>
+                <a:ext cx="178574" cy="184666"/>
+              </a:xfrm>
+              <a:prstGeom prst="rect">
+                <a:avLst/>
+              </a:prstGeom>
+              <a:blipFill>
+                <a:blip r:embed="rId22"/>
+                <a:stretch>
+                  <a:fillRect l="-20000" r="-6667" b="-12500"/>
+                </a:stretch>
+              </a:blipFill>
+            </p:spPr>
+            <p:txBody>
+              <a:bodyPr/>
+              <a:lstStyle/>
+              <a:p>
+                <a:r>
+                  <a:rPr lang="de-DE">
+                    <a:noFill/>
+                  </a:rPr>
+                  <a:t> </a:t>
+                </a:r>
+              </a:p>
+            </p:txBody>
+          </p:sp>
+        </mc:Fallback>
+      </mc:AlternateContent>
+      <p:sp>
+        <p:nvSpPr>
+          <p:cNvPr id="98" name="Pfeil nach rechts 97">
+            <a:extLst>
+              <a:ext uri="{FF2B5EF4-FFF2-40B4-BE49-F238E27FC236}">
+                <a16:creationId xmlns:a16="http://schemas.microsoft.com/office/drawing/2014/main" id="{40BC861F-CB60-C216-20AC-97F0E4FE6BE6}"/>
+              </a:ext>
+            </a:extLst>
+          </p:cNvPr>
+          <p:cNvSpPr/>
+          <p:nvPr/>
+        </p:nvSpPr>
+        <p:spPr>
+          <a:xfrm rot="1836324">
+            <a:off x="766606" y="2300630"/>
+            <a:ext cx="2227926" cy="241554"/>
+          </a:xfrm>
+          <a:prstGeom prst="rightArrow">
+            <a:avLst>
+              <a:gd name="adj1" fmla="val 27483"/>
+              <a:gd name="adj2" fmla="val 64162"/>
+            </a:avLst>
+          </a:prstGeom>
+          <a:solidFill>
+            <a:srgbClr val="00B0F0"/>
+          </a:solidFill>
+          <a:ln>
+            <a:noFill/>
+          </a:ln>
+        </p:spPr>
+        <p:style>
+          <a:lnRef idx="2">
+            <a:schemeClr val="accent1">
+              <a:shade val="50000"/>
+            </a:schemeClr>
+          </a:lnRef>
+          <a:fillRef idx="1">
+            <a:schemeClr val="accent1"/>
+          </a:fillRef>
+          <a:effectRef idx="0">
+            <a:schemeClr val="accent1"/>
+          </a:effectRef>
+          <a:fontRef idx="minor">
+            <a:schemeClr val="lt1"/>
+          </a:fontRef>
+        </p:style>
+        <p:txBody>
+          <a:bodyPr rtlCol="0" anchor="ctr"/>
+          <a:lstStyle/>
+          <a:p>
+            <a:pPr algn="ctr"/>
+            <a:r>
+              <a:rPr lang="de-DE" b="1">
+                <a:ln>
+                  <a:solidFill>
+                    <a:schemeClr val="bg1"/>
+                  </a:solidFill>
+                </a:ln>
+                <a:solidFill>
+                  <a:schemeClr val="tx1"/>
+                </a:solidFill>
+                <a:effectLst>
+                  <a:glow rad="228600">
+                    <a:schemeClr val="bg1">
+                      <a:alpha val="40000"/>
+                    </a:schemeClr>
+                  </a:glow>
+                </a:effectLst>
+              </a:rPr>
+              <a:t>encoder</a:t>
+            </a:r>
+          </a:p>
+        </p:txBody>
+      </p:sp>
+      <p:sp>
+        <p:nvSpPr>
+          <p:cNvPr id="99" name="Pfeil nach rechts 98">
+            <a:extLst>
+              <a:ext uri="{FF2B5EF4-FFF2-40B4-BE49-F238E27FC236}">
+                <a16:creationId xmlns:a16="http://schemas.microsoft.com/office/drawing/2014/main" id="{FD686302-D6AB-C6A8-CF54-C19471617708}"/>
+              </a:ext>
+            </a:extLst>
+          </p:cNvPr>
+          <p:cNvSpPr/>
+          <p:nvPr/>
+        </p:nvSpPr>
+        <p:spPr>
+          <a:xfrm rot="19830223" flipH="1">
+            <a:off x="729218" y="3699856"/>
+            <a:ext cx="2228400" cy="241200"/>
+          </a:xfrm>
+          <a:prstGeom prst="rightArrow">
+            <a:avLst>
+              <a:gd name="adj1" fmla="val 27483"/>
+              <a:gd name="adj2" fmla="val 64162"/>
+            </a:avLst>
+          </a:prstGeom>
+          <a:solidFill>
+            <a:srgbClr val="00B0F0"/>
+          </a:solidFill>
+          <a:ln>
+            <a:noFill/>
+          </a:ln>
+        </p:spPr>
+        <p:style>
+          <a:lnRef idx="2">
+            <a:schemeClr val="accent1">
+              <a:shade val="50000"/>
+            </a:schemeClr>
+          </a:lnRef>
+          <a:fillRef idx="1">
+            <a:schemeClr val="accent1"/>
+          </a:fillRef>
+          <a:effectRef idx="0">
+            <a:schemeClr val="accent1"/>
+          </a:effectRef>
+          <a:fontRef idx="minor">
+            <a:schemeClr val="lt1"/>
+          </a:fontRef>
+        </p:style>
+        <p:txBody>
+          <a:bodyPr rtlCol="0" anchor="ctr"/>
+          <a:lstStyle/>
+          <a:p>
+            <a:pPr algn="ctr"/>
+            <a:r>
+              <a:rPr lang="de-DE" b="1">
+                <a:ln>
+                  <a:solidFill>
+                    <a:schemeClr val="bg1"/>
+                  </a:solidFill>
+                </a:ln>
+                <a:solidFill>
+                  <a:schemeClr val="tx1"/>
+                </a:solidFill>
+                <a:effectLst>
+                  <a:glow rad="228600">
+                    <a:schemeClr val="bg1">
+                      <a:alpha val="40000"/>
+                    </a:schemeClr>
+                  </a:glow>
+                </a:effectLst>
+              </a:rPr>
+              <a:t>decoder</a:t>
+            </a:r>
+          </a:p>
+        </p:txBody>
+      </p:sp>
     </p:spTree>
     <p:extLst>
       <p:ext uri="{BB962C8B-B14F-4D97-AF65-F5344CB8AC3E}">
         <p14:creationId xmlns:p14="http://schemas.microsoft.com/office/powerpoint/2010/main" val="1535004086"/>
+      </p:ext>
+    </p:extLst>
+  </p:cSld>
+  <p:clrMapOvr>
+    <a:masterClrMapping/>
+  </p:clrMapOvr>
+</p:sld>
+</file>
+
+<file path=ppt/slides/slide3.xml><?xml version="1.0" encoding="utf-8"?>
+<p:sld xmlns:a="http://schemas.openxmlformats.org/drawingml/2006/main" xmlns:r="http://schemas.openxmlformats.org/officeDocument/2006/relationships" xmlns:p="http://schemas.openxmlformats.org/presentationml/2006/main">
+  <p:cSld>
+    <p:spTree>
+      <p:nvGrpSpPr>
+        <p:cNvPr id="1" name=""/>
+        <p:cNvGrpSpPr/>
+        <p:nvPr/>
+      </p:nvGrpSpPr>
+      <p:grpSpPr>
+        <a:xfrm>
+          <a:off x="0" y="0"/>
+          <a:ext cx="0" cy="0"/>
+          <a:chOff x="0" y="0"/>
+          <a:chExt cx="0" cy="0"/>
+        </a:xfrm>
+      </p:grpSpPr>
+      <p:pic>
+        <p:nvPicPr>
+          <p:cNvPr id="1026" name="Picture 2">
+            <a:extLst>
+              <a:ext uri="{FF2B5EF4-FFF2-40B4-BE49-F238E27FC236}">
+                <a16:creationId xmlns:a16="http://schemas.microsoft.com/office/drawing/2014/main" id="{E39BBC6B-07E4-AFDB-A240-E3561AC0825C}"/>
+              </a:ext>
+            </a:extLst>
+          </p:cNvPr>
+          <p:cNvPicPr>
+            <a:picLocks noChangeAspect="1" noChangeArrowheads="1"/>
+          </p:cNvPicPr>
+          <p:nvPr/>
+        </p:nvPicPr>
+        <p:blipFill>
+          <a:blip r:embed="rId3">
+            <a:extLst>
+              <a:ext uri="{28A0092B-C50C-407E-A947-70E740481C1C}">
+                <a14:useLocalDpi xmlns:a14="http://schemas.microsoft.com/office/drawing/2010/main" val="0"/>
+              </a:ext>
+            </a:extLst>
+          </a:blip>
+          <a:srcRect/>
+          <a:stretch>
+            <a:fillRect/>
+          </a:stretch>
+        </p:blipFill>
+        <p:spPr bwMode="auto">
+          <a:xfrm>
+            <a:off x="649588" y="285406"/>
+            <a:ext cx="5727700" cy="2654300"/>
+          </a:xfrm>
+          <a:prstGeom prst="rect">
+            <a:avLst/>
+          </a:prstGeom>
+          <a:noFill/>
+          <a:extLst>
+            <a:ext uri="{909E8E84-426E-40DD-AFC4-6F175D3DCCD1}">
+              <a14:hiddenFill xmlns:a14="http://schemas.microsoft.com/office/drawing/2010/main">
+                <a:solidFill>
+                  <a:srgbClr val="FFFFFF"/>
+                </a:solidFill>
+              </a14:hiddenFill>
+            </a:ext>
+          </a:extLst>
+        </p:spPr>
+      </p:pic>
+      <p:pic>
+        <p:nvPicPr>
+          <p:cNvPr id="1028" name="Picture 4">
+            <a:extLst>
+              <a:ext uri="{FF2B5EF4-FFF2-40B4-BE49-F238E27FC236}">
+                <a16:creationId xmlns:a16="http://schemas.microsoft.com/office/drawing/2014/main" id="{35EBD427-A385-995E-86B0-100A6AAEA9A5}"/>
+              </a:ext>
+            </a:extLst>
+          </p:cNvPr>
+          <p:cNvPicPr>
+            <a:picLocks noChangeAspect="1" noChangeArrowheads="1"/>
+          </p:cNvPicPr>
+          <p:nvPr/>
+        </p:nvPicPr>
+        <p:blipFill>
+          <a:blip r:embed="rId4">
+            <a:extLst>
+              <a:ext uri="{28A0092B-C50C-407E-A947-70E740481C1C}">
+                <a14:useLocalDpi xmlns:a14="http://schemas.microsoft.com/office/drawing/2010/main" val="0"/>
+              </a:ext>
+            </a:extLst>
+          </a:blip>
+          <a:srcRect/>
+          <a:stretch>
+            <a:fillRect/>
+          </a:stretch>
+        </p:blipFill>
+        <p:spPr bwMode="auto">
+          <a:xfrm>
+            <a:off x="5357511" y="285406"/>
+            <a:ext cx="5727700" cy="2654300"/>
+          </a:xfrm>
+          <a:prstGeom prst="rect">
+            <a:avLst/>
+          </a:prstGeom>
+          <a:noFill/>
+          <a:extLst>
+            <a:ext uri="{909E8E84-426E-40DD-AFC4-6F175D3DCCD1}">
+              <a14:hiddenFill xmlns:a14="http://schemas.microsoft.com/office/drawing/2010/main">
+                <a:solidFill>
+                  <a:srgbClr val="FFFFFF"/>
+                </a:solidFill>
+              </a14:hiddenFill>
+            </a:ext>
+          </a:extLst>
+        </p:spPr>
+      </p:pic>
+      <p:pic>
+        <p:nvPicPr>
+          <p:cNvPr id="1030" name="Picture 6">
+            <a:extLst>
+              <a:ext uri="{FF2B5EF4-FFF2-40B4-BE49-F238E27FC236}">
+                <a16:creationId xmlns:a16="http://schemas.microsoft.com/office/drawing/2014/main" id="{9B3DF088-6452-A5CF-95EC-982071286BA2}"/>
+              </a:ext>
+            </a:extLst>
+          </p:cNvPr>
+          <p:cNvPicPr>
+            <a:picLocks noChangeAspect="1" noChangeArrowheads="1"/>
+          </p:cNvPicPr>
+          <p:nvPr/>
+        </p:nvPicPr>
+        <p:blipFill>
+          <a:blip r:embed="rId5">
+            <a:extLst>
+              <a:ext uri="{28A0092B-C50C-407E-A947-70E740481C1C}">
+                <a14:useLocalDpi xmlns:a14="http://schemas.microsoft.com/office/drawing/2010/main" val="0"/>
+              </a:ext>
+            </a:extLst>
+          </a:blip>
+          <a:srcRect/>
+          <a:stretch>
+            <a:fillRect/>
+          </a:stretch>
+        </p:blipFill>
+        <p:spPr bwMode="auto">
+          <a:xfrm>
+            <a:off x="649588" y="2939706"/>
+            <a:ext cx="5727700" cy="2654300"/>
+          </a:xfrm>
+          <a:prstGeom prst="rect">
+            <a:avLst/>
+          </a:prstGeom>
+          <a:noFill/>
+          <a:extLst>
+            <a:ext uri="{909E8E84-426E-40DD-AFC4-6F175D3DCCD1}">
+              <a14:hiddenFill xmlns:a14="http://schemas.microsoft.com/office/drawing/2010/main">
+                <a:solidFill>
+                  <a:srgbClr val="FFFFFF"/>
+                </a:solidFill>
+              </a14:hiddenFill>
+            </a:ext>
+          </a:extLst>
+        </p:spPr>
+      </p:pic>
+      <p:pic>
+        <p:nvPicPr>
+          <p:cNvPr id="1032" name="Picture 8">
+            <a:extLst>
+              <a:ext uri="{FF2B5EF4-FFF2-40B4-BE49-F238E27FC236}">
+                <a16:creationId xmlns:a16="http://schemas.microsoft.com/office/drawing/2014/main" id="{3B8BF334-833D-C755-AC3E-C612B404F097}"/>
+              </a:ext>
+            </a:extLst>
+          </p:cNvPr>
+          <p:cNvPicPr>
+            <a:picLocks noChangeAspect="1" noChangeArrowheads="1"/>
+          </p:cNvPicPr>
+          <p:nvPr/>
+        </p:nvPicPr>
+        <p:blipFill>
+          <a:blip r:embed="rId6">
+            <a:extLst>
+              <a:ext uri="{28A0092B-C50C-407E-A947-70E740481C1C}">
+                <a14:useLocalDpi xmlns:a14="http://schemas.microsoft.com/office/drawing/2010/main" val="0"/>
+              </a:ext>
+            </a:extLst>
+          </a:blip>
+          <a:srcRect/>
+          <a:stretch>
+            <a:fillRect/>
+          </a:stretch>
+        </p:blipFill>
+        <p:spPr bwMode="auto">
+          <a:xfrm>
+            <a:off x="5357511" y="2939706"/>
+            <a:ext cx="5727700" cy="2654300"/>
+          </a:xfrm>
+          <a:prstGeom prst="rect">
+            <a:avLst/>
+          </a:prstGeom>
+          <a:noFill/>
+          <a:extLst>
+            <a:ext uri="{909E8E84-426E-40DD-AFC4-6F175D3DCCD1}">
+              <a14:hiddenFill xmlns:a14="http://schemas.microsoft.com/office/drawing/2010/main">
+                <a:solidFill>
+                  <a:srgbClr val="FFFFFF"/>
+                </a:solidFill>
+              </a14:hiddenFill>
+            </a:ext>
+          </a:extLst>
+        </p:spPr>
+      </p:pic>
+      <p:sp>
+        <p:nvSpPr>
+          <p:cNvPr id="84" name="Rechteck 83">
+            <a:extLst>
+              <a:ext uri="{FF2B5EF4-FFF2-40B4-BE49-F238E27FC236}">
+                <a16:creationId xmlns:a16="http://schemas.microsoft.com/office/drawing/2014/main" id="{08B29C1D-0B14-1411-AA1D-64E319485905}"/>
+              </a:ext>
+            </a:extLst>
+          </p:cNvPr>
+          <p:cNvSpPr/>
+          <p:nvPr/>
+        </p:nvSpPr>
+        <p:spPr>
+          <a:xfrm>
+            <a:off x="4931765" y="577121"/>
+            <a:ext cx="360000" cy="360000"/>
+          </a:xfrm>
+          <a:prstGeom prst="rect">
+            <a:avLst/>
+          </a:prstGeom>
+          <a:solidFill>
+            <a:schemeClr val="bg2"/>
+          </a:solidFill>
+          <a:ln>
+            <a:noFill/>
+          </a:ln>
+        </p:spPr>
+        <p:style>
+          <a:lnRef idx="2">
+            <a:schemeClr val="accent1">
+              <a:shade val="50000"/>
+            </a:schemeClr>
+          </a:lnRef>
+          <a:fillRef idx="1">
+            <a:schemeClr val="accent1"/>
+          </a:fillRef>
+          <a:effectRef idx="0">
+            <a:schemeClr val="accent1"/>
+          </a:effectRef>
+          <a:fontRef idx="minor">
+            <a:schemeClr val="lt1"/>
+          </a:fontRef>
+        </p:style>
+        <p:txBody>
+          <a:bodyPr rtlCol="0" anchor="ctr"/>
+          <a:lstStyle/>
+          <a:p>
+            <a:pPr algn="ctr"/>
+            <a:r>
+              <a:rPr lang="de-DE" sz="2000" b="1">
+                <a:solidFill>
+                  <a:schemeClr val="tx1"/>
+                </a:solidFill>
+              </a:rPr>
+              <a:t>A</a:t>
+            </a:r>
+          </a:p>
+        </p:txBody>
+      </p:sp>
+      <p:sp>
+        <p:nvSpPr>
+          <p:cNvPr id="93" name="Rechteck 92">
+            <a:extLst>
+              <a:ext uri="{FF2B5EF4-FFF2-40B4-BE49-F238E27FC236}">
+                <a16:creationId xmlns:a16="http://schemas.microsoft.com/office/drawing/2014/main" id="{4698E4CB-2DFE-58EA-6660-374011099AE8}"/>
+              </a:ext>
+            </a:extLst>
+          </p:cNvPr>
+          <p:cNvSpPr/>
+          <p:nvPr/>
+        </p:nvSpPr>
+        <p:spPr>
+          <a:xfrm>
+            <a:off x="4931765" y="3231421"/>
+            <a:ext cx="360000" cy="360000"/>
+          </a:xfrm>
+          <a:prstGeom prst="rect">
+            <a:avLst/>
+          </a:prstGeom>
+          <a:solidFill>
+            <a:schemeClr val="bg2"/>
+          </a:solidFill>
+          <a:ln>
+            <a:noFill/>
+          </a:ln>
+        </p:spPr>
+        <p:style>
+          <a:lnRef idx="2">
+            <a:schemeClr val="accent1">
+              <a:shade val="50000"/>
+            </a:schemeClr>
+          </a:lnRef>
+          <a:fillRef idx="1">
+            <a:schemeClr val="accent1"/>
+          </a:fillRef>
+          <a:effectRef idx="0">
+            <a:schemeClr val="accent1"/>
+          </a:effectRef>
+          <a:fontRef idx="minor">
+            <a:schemeClr val="lt1"/>
+          </a:fontRef>
+        </p:style>
+        <p:txBody>
+          <a:bodyPr rtlCol="0" anchor="ctr"/>
+          <a:lstStyle/>
+          <a:p>
+            <a:pPr algn="ctr"/>
+            <a:r>
+              <a:rPr lang="de-DE" sz="2000" b="1">
+                <a:solidFill>
+                  <a:schemeClr val="tx1"/>
+                </a:solidFill>
+              </a:rPr>
+              <a:t>C</a:t>
+            </a:r>
+          </a:p>
+        </p:txBody>
+      </p:sp>
+      <p:sp>
+        <p:nvSpPr>
+          <p:cNvPr id="94" name="Rechteck 93">
+            <a:extLst>
+              <a:ext uri="{FF2B5EF4-FFF2-40B4-BE49-F238E27FC236}">
+                <a16:creationId xmlns:a16="http://schemas.microsoft.com/office/drawing/2014/main" id="{F6BEAEF9-32FD-F96C-6C3D-1AC9268B2163}"/>
+              </a:ext>
+            </a:extLst>
+          </p:cNvPr>
+          <p:cNvSpPr/>
+          <p:nvPr/>
+        </p:nvSpPr>
+        <p:spPr>
+          <a:xfrm>
+            <a:off x="9639688" y="577121"/>
+            <a:ext cx="360000" cy="360000"/>
+          </a:xfrm>
+          <a:prstGeom prst="rect">
+            <a:avLst/>
+          </a:prstGeom>
+          <a:solidFill>
+            <a:schemeClr val="bg2"/>
+          </a:solidFill>
+          <a:ln>
+            <a:noFill/>
+          </a:ln>
+        </p:spPr>
+        <p:style>
+          <a:lnRef idx="2">
+            <a:schemeClr val="accent1">
+              <a:shade val="50000"/>
+            </a:schemeClr>
+          </a:lnRef>
+          <a:fillRef idx="1">
+            <a:schemeClr val="accent1"/>
+          </a:fillRef>
+          <a:effectRef idx="0">
+            <a:schemeClr val="accent1"/>
+          </a:effectRef>
+          <a:fontRef idx="minor">
+            <a:schemeClr val="lt1"/>
+          </a:fontRef>
+        </p:style>
+        <p:txBody>
+          <a:bodyPr rtlCol="0" anchor="ctr"/>
+          <a:lstStyle/>
+          <a:p>
+            <a:pPr algn="ctr"/>
+            <a:r>
+              <a:rPr lang="de-DE" sz="2000" b="1">
+                <a:solidFill>
+                  <a:schemeClr val="tx1"/>
+                </a:solidFill>
+              </a:rPr>
+              <a:t>B</a:t>
+            </a:r>
+          </a:p>
+        </p:txBody>
+      </p:sp>
+      <p:sp>
+        <p:nvSpPr>
+          <p:cNvPr id="95" name="Rechteck 94">
+            <a:extLst>
+              <a:ext uri="{FF2B5EF4-FFF2-40B4-BE49-F238E27FC236}">
+                <a16:creationId xmlns:a16="http://schemas.microsoft.com/office/drawing/2014/main" id="{F85A5654-8FCE-7379-2525-E5CDA628F19C}"/>
+              </a:ext>
+            </a:extLst>
+          </p:cNvPr>
+          <p:cNvSpPr/>
+          <p:nvPr/>
+        </p:nvSpPr>
+        <p:spPr>
+          <a:xfrm>
+            <a:off x="9639688" y="3231421"/>
+            <a:ext cx="360000" cy="360000"/>
+          </a:xfrm>
+          <a:prstGeom prst="rect">
+            <a:avLst/>
+          </a:prstGeom>
+          <a:solidFill>
+            <a:schemeClr val="bg2"/>
+          </a:solidFill>
+          <a:ln>
+            <a:noFill/>
+          </a:ln>
+        </p:spPr>
+        <p:style>
+          <a:lnRef idx="2">
+            <a:schemeClr val="accent1">
+              <a:shade val="50000"/>
+            </a:schemeClr>
+          </a:lnRef>
+          <a:fillRef idx="1">
+            <a:schemeClr val="accent1"/>
+          </a:fillRef>
+          <a:effectRef idx="0">
+            <a:schemeClr val="accent1"/>
+          </a:effectRef>
+          <a:fontRef idx="minor">
+            <a:schemeClr val="lt1"/>
+          </a:fontRef>
+        </p:style>
+        <p:txBody>
+          <a:bodyPr rtlCol="0" anchor="ctr"/>
+          <a:lstStyle/>
+          <a:p>
+            <a:pPr algn="ctr"/>
+            <a:r>
+              <a:rPr lang="de-DE" sz="2000" b="1">
+                <a:solidFill>
+                  <a:schemeClr val="tx1"/>
+                </a:solidFill>
+              </a:rPr>
+              <a:t>D</a:t>
+            </a:r>
+          </a:p>
+        </p:txBody>
+      </p:sp>
+    </p:spTree>
+    <p:extLst>
+      <p:ext uri="{BB962C8B-B14F-4D97-AF65-F5344CB8AC3E}">
+        <p14:creationId xmlns:p14="http://schemas.microsoft.com/office/powerpoint/2010/main" val="1248621883"/>
+      </p:ext>
+    </p:extLst>
+  </p:cSld>
+  <p:clrMapOvr>
+    <a:masterClrMapping/>
+  </p:clrMapOvr>
+</p:sld>
+</file>
+
+<file path=ppt/slides/slide4.xml><?xml version="1.0" encoding="utf-8"?>
+<p:sld xmlns:a="http://schemas.openxmlformats.org/drawingml/2006/main" xmlns:r="http://schemas.openxmlformats.org/officeDocument/2006/relationships" xmlns:p="http://schemas.openxmlformats.org/presentationml/2006/main">
+  <p:cSld>
+    <p:spTree>
+      <p:nvGrpSpPr>
+        <p:cNvPr id="1" name=""/>
+        <p:cNvGrpSpPr/>
+        <p:nvPr/>
+      </p:nvGrpSpPr>
+      <p:grpSpPr>
+        <a:xfrm>
+          <a:off x="0" y="0"/>
+          <a:ext cx="0" cy="0"/>
+          <a:chOff x="0" y="0"/>
+          <a:chExt cx="0" cy="0"/>
+        </a:xfrm>
+      </p:grpSpPr>
+      <p:pic>
+        <p:nvPicPr>
+          <p:cNvPr id="3078" name="Picture 6">
+            <a:extLst>
+              <a:ext uri="{FF2B5EF4-FFF2-40B4-BE49-F238E27FC236}">
+                <a16:creationId xmlns:a16="http://schemas.microsoft.com/office/drawing/2014/main" id="{FD0C47FF-C9FE-A8B6-0752-4F095C9E25E7}"/>
+              </a:ext>
+            </a:extLst>
+          </p:cNvPr>
+          <p:cNvPicPr>
+            <a:picLocks noChangeAspect="1" noChangeArrowheads="1"/>
+          </p:cNvPicPr>
+          <p:nvPr/>
+        </p:nvPicPr>
+        <p:blipFill>
+          <a:blip r:embed="rId3">
+            <a:extLst>
+              <a:ext uri="{28A0092B-C50C-407E-A947-70E740481C1C}">
+                <a14:useLocalDpi xmlns:a14="http://schemas.microsoft.com/office/drawing/2010/main" val="0"/>
+              </a:ext>
+            </a:extLst>
+          </a:blip>
+          <a:srcRect/>
+          <a:stretch>
+            <a:fillRect/>
+          </a:stretch>
+        </p:blipFill>
+        <p:spPr bwMode="auto">
+          <a:xfrm>
+            <a:off x="342900" y="1110729"/>
+            <a:ext cx="5753100" cy="3632200"/>
+          </a:xfrm>
+          <a:prstGeom prst="rect">
+            <a:avLst/>
+          </a:prstGeom>
+          <a:noFill/>
+          <a:extLst>
+            <a:ext uri="{909E8E84-426E-40DD-AFC4-6F175D3DCCD1}">
+              <a14:hiddenFill xmlns:a14="http://schemas.microsoft.com/office/drawing/2010/main">
+                <a:solidFill>
+                  <a:srgbClr val="FFFFFF"/>
+                </a:solidFill>
+              </a14:hiddenFill>
+            </a:ext>
+          </a:extLst>
+        </p:spPr>
+      </p:pic>
+      <p:pic>
+        <p:nvPicPr>
+          <p:cNvPr id="3080" name="Picture 8">
+            <a:extLst>
+              <a:ext uri="{FF2B5EF4-FFF2-40B4-BE49-F238E27FC236}">
+                <a16:creationId xmlns:a16="http://schemas.microsoft.com/office/drawing/2014/main" id="{8BD88D9A-633A-AB85-60B1-8E7A7266374E}"/>
+              </a:ext>
+            </a:extLst>
+          </p:cNvPr>
+          <p:cNvPicPr>
+            <a:picLocks noChangeAspect="1" noChangeArrowheads="1"/>
+          </p:cNvPicPr>
+          <p:nvPr/>
+        </p:nvPicPr>
+        <p:blipFill>
+          <a:blip r:embed="rId4">
+            <a:extLst>
+              <a:ext uri="{28A0092B-C50C-407E-A947-70E740481C1C}">
+                <a14:useLocalDpi xmlns:a14="http://schemas.microsoft.com/office/drawing/2010/main" val="0"/>
+              </a:ext>
+            </a:extLst>
+          </a:blip>
+          <a:srcRect/>
+          <a:stretch>
+            <a:fillRect/>
+          </a:stretch>
+        </p:blipFill>
+        <p:spPr bwMode="auto">
+          <a:xfrm>
+            <a:off x="6096000" y="1110729"/>
+            <a:ext cx="5537200" cy="3632200"/>
+          </a:xfrm>
+          <a:prstGeom prst="rect">
+            <a:avLst/>
+          </a:prstGeom>
+          <a:noFill/>
+          <a:extLst>
+            <a:ext uri="{909E8E84-426E-40DD-AFC4-6F175D3DCCD1}">
+              <a14:hiddenFill xmlns:a14="http://schemas.microsoft.com/office/drawing/2010/main">
+                <a:solidFill>
+                  <a:srgbClr val="FFFFFF"/>
+                </a:solidFill>
+              </a14:hiddenFill>
+            </a:ext>
+          </a:extLst>
+        </p:spPr>
+      </p:pic>
+    </p:spTree>
+    <p:extLst>
+      <p:ext uri="{BB962C8B-B14F-4D97-AF65-F5344CB8AC3E}">
+        <p14:creationId xmlns:p14="http://schemas.microsoft.com/office/powerpoint/2010/main" val="4148036896"/>
       </p:ext>
     </p:extLst>
   </p:cSld>

</xml_diff>